<commit_message>
Adicionado arquivo para pesquisa, diagrama de blocos e slide alterado.
</commit_message>
<xml_diff>
--- a/Slide.pptx
+++ b/Slide.pptx
@@ -13,8 +13,8 @@
     <p:sldId id="258" r:id="rId4"/>
     <p:sldId id="259" r:id="rId5"/>
     <p:sldId id="260" r:id="rId6"/>
-    <p:sldId id="261" r:id="rId7"/>
-    <p:sldId id="262" r:id="rId8"/>
+    <p:sldId id="262" r:id="rId7"/>
+    <p:sldId id="261" r:id="rId8"/>
     <p:sldId id="263" r:id="rId9"/>
     <p:sldId id="264" r:id="rId10"/>
     <p:sldId id="265" r:id="rId11"/>
@@ -5300,31 +5300,6 @@
       </p:grpSpPr>
       <p:sp>
         <p:nvSpPr>
-          <p:cNvPr id="2" name="Espaço Reservado para Conteúdo 1">
-            <a:extLst>
-              <a:ext uri="{FF2B5EF4-FFF2-40B4-BE49-F238E27FC236}">
-                <a16:creationId xmlns:a16="http://schemas.microsoft.com/office/drawing/2014/main" id="{9B176969-9450-481C-9497-E3EA97AC4250}"/>
-              </a:ext>
-            </a:extLst>
-          </p:cNvPr>
-          <p:cNvSpPr>
-            <a:spLocks noGrp="1"/>
-          </p:cNvSpPr>
-          <p:nvPr>
-            <p:ph idx="1"/>
-          </p:nvPr>
-        </p:nvSpPr>
-        <p:spPr/>
-        <p:txBody>
-          <a:bodyPr/>
-          <a:lstStyle/>
-          <a:p>
-            <a:endParaRPr lang="pt-BR" dirty="0"/>
-          </a:p>
-        </p:txBody>
-      </p:sp>
-      <p:sp>
-        <p:nvSpPr>
           <p:cNvPr id="3" name="Espaço Reservado para Número de Slide 2">
             <a:extLst>
               <a:ext uri="{FF2B5EF4-FFF2-40B4-BE49-F238E27FC236}">
@@ -5580,31 +5555,6 @@
       </p:grpSpPr>
       <p:sp>
         <p:nvSpPr>
-          <p:cNvPr id="2" name="Espaço Reservado para Conteúdo 1">
-            <a:extLst>
-              <a:ext uri="{FF2B5EF4-FFF2-40B4-BE49-F238E27FC236}">
-                <a16:creationId xmlns:a16="http://schemas.microsoft.com/office/drawing/2014/main" id="{9B176969-9450-481C-9497-E3EA97AC4250}"/>
-              </a:ext>
-            </a:extLst>
-          </p:cNvPr>
-          <p:cNvSpPr>
-            <a:spLocks noGrp="1"/>
-          </p:cNvSpPr>
-          <p:nvPr>
-            <p:ph idx="1"/>
-          </p:nvPr>
-        </p:nvSpPr>
-        <p:spPr/>
-        <p:txBody>
-          <a:bodyPr/>
-          <a:lstStyle/>
-          <a:p>
-            <a:endParaRPr lang="pt-BR" dirty="0"/>
-          </a:p>
-        </p:txBody>
-      </p:sp>
-      <p:sp>
-        <p:nvSpPr>
           <p:cNvPr id="3" name="Espaço Reservado para Número de Slide 2">
             <a:extLst>
               <a:ext uri="{FF2B5EF4-FFF2-40B4-BE49-F238E27FC236}">
@@ -5655,7 +5605,7 @@
           <a:p>
             <a:r>
               <a:rPr lang="pt-BR" dirty="0"/>
-              <a:t>SOLUÇÃO TECNOLÓGICA</a:t>
+              <a:t>TECNOLOGIAS UTILIZADAS</a:t>
             </a:r>
           </a:p>
         </p:txBody>
@@ -5688,10 +5638,292 @@
           </a:p>
         </p:txBody>
       </p:sp>
+      <p:pic>
+        <p:nvPicPr>
+          <p:cNvPr id="2050" name="Picture 2" descr="Resultado de imagem para python logo png">
+            <a:extLst>
+              <a:ext uri="{FF2B5EF4-FFF2-40B4-BE49-F238E27FC236}">
+                <a16:creationId xmlns:a16="http://schemas.microsoft.com/office/drawing/2014/main" id="{19FB71AD-EBC0-4C6A-9168-4210A859DDDA}"/>
+              </a:ext>
+            </a:extLst>
+          </p:cNvPr>
+          <p:cNvPicPr>
+            <a:picLocks noChangeAspect="1" noChangeArrowheads="1"/>
+          </p:cNvPicPr>
+          <p:nvPr/>
+        </p:nvPicPr>
+        <p:blipFill>
+          <a:blip r:embed="rId2">
+            <a:extLst>
+              <a:ext uri="{28A0092B-C50C-407E-A947-70E740481C1C}">
+                <a14:useLocalDpi xmlns:a14="http://schemas.microsoft.com/office/drawing/2010/main" val="0"/>
+              </a:ext>
+            </a:extLst>
+          </a:blip>
+          <a:srcRect/>
+          <a:stretch>
+            <a:fillRect/>
+          </a:stretch>
+        </p:blipFill>
+        <p:spPr bwMode="auto">
+          <a:xfrm>
+            <a:off x="1300775" y="1607724"/>
+            <a:ext cx="2110946" cy="2110946"/>
+          </a:xfrm>
+          <a:prstGeom prst="rect">
+            <a:avLst/>
+          </a:prstGeom>
+          <a:noFill/>
+          <a:extLst>
+            <a:ext uri="{909E8E84-426E-40DD-AFC4-6F175D3DCCD1}">
+              <a14:hiddenFill xmlns:a14="http://schemas.microsoft.com/office/drawing/2010/main">
+                <a:solidFill>
+                  <a:srgbClr val="FFFFFF"/>
+                </a:solidFill>
+              </a14:hiddenFill>
+            </a:ext>
+          </a:extLst>
+        </p:spPr>
+      </p:pic>
+      <p:pic>
+        <p:nvPicPr>
+          <p:cNvPr id="2054" name="Picture 6" descr="Resultado de imagem para c++ logo png">
+            <a:extLst>
+              <a:ext uri="{FF2B5EF4-FFF2-40B4-BE49-F238E27FC236}">
+                <a16:creationId xmlns:a16="http://schemas.microsoft.com/office/drawing/2014/main" id="{41949343-ED5F-4591-A773-6892D53C6687}"/>
+              </a:ext>
+            </a:extLst>
+          </p:cNvPr>
+          <p:cNvPicPr>
+            <a:picLocks noChangeAspect="1" noChangeArrowheads="1"/>
+          </p:cNvPicPr>
+          <p:nvPr/>
+        </p:nvPicPr>
+        <p:blipFill>
+          <a:blip r:embed="rId3">
+            <a:extLst>
+              <a:ext uri="{28A0092B-C50C-407E-A947-70E740481C1C}">
+                <a14:useLocalDpi xmlns:a14="http://schemas.microsoft.com/office/drawing/2010/main" val="0"/>
+              </a:ext>
+            </a:extLst>
+          </a:blip>
+          <a:srcRect/>
+          <a:stretch>
+            <a:fillRect/>
+          </a:stretch>
+        </p:blipFill>
+        <p:spPr bwMode="auto">
+          <a:xfrm>
+            <a:off x="1482014" y="4390860"/>
+            <a:ext cx="1748467" cy="1965490"/>
+          </a:xfrm>
+          <a:prstGeom prst="rect">
+            <a:avLst/>
+          </a:prstGeom>
+          <a:noFill/>
+          <a:extLst>
+            <a:ext uri="{909E8E84-426E-40DD-AFC4-6F175D3DCCD1}">
+              <a14:hiddenFill xmlns:a14="http://schemas.microsoft.com/office/drawing/2010/main">
+                <a:solidFill>
+                  <a:srgbClr val="FFFFFF"/>
+                </a:solidFill>
+              </a14:hiddenFill>
+            </a:ext>
+          </a:extLst>
+        </p:spPr>
+      </p:pic>
+      <p:pic>
+        <p:nvPicPr>
+          <p:cNvPr id="2056" name="Picture 8" descr="Resultado de imagem para ros logo png">
+            <a:extLst>
+              <a:ext uri="{FF2B5EF4-FFF2-40B4-BE49-F238E27FC236}">
+                <a16:creationId xmlns:a16="http://schemas.microsoft.com/office/drawing/2014/main" id="{FF5A2EE8-AA97-4E20-9B4B-1822F31491F7}"/>
+              </a:ext>
+            </a:extLst>
+          </p:cNvPr>
+          <p:cNvPicPr>
+            <a:picLocks noChangeAspect="1" noChangeArrowheads="1"/>
+          </p:cNvPicPr>
+          <p:nvPr/>
+        </p:nvPicPr>
+        <p:blipFill>
+          <a:blip r:embed="rId4">
+            <a:extLst>
+              <a:ext uri="{28A0092B-C50C-407E-A947-70E740481C1C}">
+                <a14:useLocalDpi xmlns:a14="http://schemas.microsoft.com/office/drawing/2010/main" val="0"/>
+              </a:ext>
+            </a:extLst>
+          </a:blip>
+          <a:srcRect/>
+          <a:stretch>
+            <a:fillRect/>
+          </a:stretch>
+        </p:blipFill>
+        <p:spPr bwMode="auto">
+          <a:xfrm>
+            <a:off x="7709614" y="2116776"/>
+            <a:ext cx="3181611" cy="847601"/>
+          </a:xfrm>
+          <a:prstGeom prst="rect">
+            <a:avLst/>
+          </a:prstGeom>
+          <a:noFill/>
+          <a:extLst>
+            <a:ext uri="{909E8E84-426E-40DD-AFC4-6F175D3DCCD1}">
+              <a14:hiddenFill xmlns:a14="http://schemas.microsoft.com/office/drawing/2010/main">
+                <a:solidFill>
+                  <a:srgbClr val="FFFFFF"/>
+                </a:solidFill>
+              </a14:hiddenFill>
+            </a:ext>
+          </a:extLst>
+        </p:spPr>
+      </p:pic>
+      <p:pic>
+        <p:nvPicPr>
+          <p:cNvPr id="2058" name="Picture 10" descr="Resultado de imagem para arduino logo png">
+            <a:extLst>
+              <a:ext uri="{FF2B5EF4-FFF2-40B4-BE49-F238E27FC236}">
+                <a16:creationId xmlns:a16="http://schemas.microsoft.com/office/drawing/2014/main" id="{EE57963E-D9B9-4352-81EB-9CCC06CE8A0F}"/>
+              </a:ext>
+            </a:extLst>
+          </p:cNvPr>
+          <p:cNvPicPr>
+            <a:picLocks noChangeAspect="1" noChangeArrowheads="1"/>
+          </p:cNvPicPr>
+          <p:nvPr/>
+        </p:nvPicPr>
+        <p:blipFill>
+          <a:blip r:embed="rId5">
+            <a:extLst>
+              <a:ext uri="{28A0092B-C50C-407E-A947-70E740481C1C}">
+                <a14:useLocalDpi xmlns:a14="http://schemas.microsoft.com/office/drawing/2010/main" val="0"/>
+              </a:ext>
+            </a:extLst>
+          </a:blip>
+          <a:srcRect/>
+          <a:stretch>
+            <a:fillRect/>
+          </a:stretch>
+        </p:blipFill>
+        <p:spPr bwMode="auto">
+          <a:xfrm>
+            <a:off x="4703880" y="4630943"/>
+            <a:ext cx="2031682" cy="1382673"/>
+          </a:xfrm>
+          <a:prstGeom prst="rect">
+            <a:avLst/>
+          </a:prstGeom>
+          <a:noFill/>
+          <a:extLst>
+            <a:ext uri="{909E8E84-426E-40DD-AFC4-6F175D3DCCD1}">
+              <a14:hiddenFill xmlns:a14="http://schemas.microsoft.com/office/drawing/2010/main">
+                <a:solidFill>
+                  <a:srgbClr val="FFFFFF"/>
+                </a:solidFill>
+              </a14:hiddenFill>
+            </a:ext>
+          </a:extLst>
+        </p:spPr>
+      </p:pic>
+      <p:pic>
+        <p:nvPicPr>
+          <p:cNvPr id="2060" name="Picture 12" descr="Resultado de imagem para raspberry pi logo png">
+            <a:extLst>
+              <a:ext uri="{FF2B5EF4-FFF2-40B4-BE49-F238E27FC236}">
+                <a16:creationId xmlns:a16="http://schemas.microsoft.com/office/drawing/2014/main" id="{6E62839F-28DD-4B31-B74F-F2EAF28DD759}"/>
+              </a:ext>
+            </a:extLst>
+          </p:cNvPr>
+          <p:cNvPicPr>
+            <a:picLocks noChangeAspect="1" noChangeArrowheads="1"/>
+          </p:cNvPicPr>
+          <p:nvPr/>
+        </p:nvPicPr>
+        <p:blipFill>
+          <a:blip r:embed="rId6">
+            <a:extLst>
+              <a:ext uri="{28A0092B-C50C-407E-A947-70E740481C1C}">
+                <a14:useLocalDpi xmlns:a14="http://schemas.microsoft.com/office/drawing/2010/main" val="0"/>
+              </a:ext>
+            </a:extLst>
+          </a:blip>
+          <a:srcRect/>
+          <a:stretch>
+            <a:fillRect/>
+          </a:stretch>
+        </p:blipFill>
+        <p:spPr bwMode="auto">
+          <a:xfrm>
+            <a:off x="4452876" y="1535720"/>
+            <a:ext cx="2533691" cy="2254954"/>
+          </a:xfrm>
+          <a:prstGeom prst="rect">
+            <a:avLst/>
+          </a:prstGeom>
+          <a:noFill/>
+          <a:extLst>
+            <a:ext uri="{909E8E84-426E-40DD-AFC4-6F175D3DCCD1}">
+              <a14:hiddenFill xmlns:a14="http://schemas.microsoft.com/office/drawing/2010/main">
+                <a:solidFill>
+                  <a:srgbClr val="FFFFFF"/>
+                </a:solidFill>
+              </a14:hiddenFill>
+            </a:ext>
+          </a:extLst>
+        </p:spPr>
+      </p:pic>
+      <p:pic>
+        <p:nvPicPr>
+          <p:cNvPr id="2062" name="Picture 14" descr="Resultado de imagem para opencv pi logo png">
+            <a:extLst>
+              <a:ext uri="{FF2B5EF4-FFF2-40B4-BE49-F238E27FC236}">
+                <a16:creationId xmlns:a16="http://schemas.microsoft.com/office/drawing/2014/main" id="{98A89B97-11FD-4D3D-ABDF-E013AD9AAC49}"/>
+              </a:ext>
+            </a:extLst>
+          </p:cNvPr>
+          <p:cNvPicPr>
+            <a:picLocks noChangeAspect="1" noChangeArrowheads="1"/>
+          </p:cNvPicPr>
+          <p:nvPr/>
+        </p:nvPicPr>
+        <p:blipFill>
+          <a:blip r:embed="rId7">
+            <a:extLst>
+              <a:ext uri="{28A0092B-C50C-407E-A947-70E740481C1C}">
+                <a14:useLocalDpi xmlns:a14="http://schemas.microsoft.com/office/drawing/2010/main" val="0"/>
+              </a:ext>
+            </a:extLst>
+          </a:blip>
+          <a:srcRect/>
+          <a:stretch>
+            <a:fillRect/>
+          </a:stretch>
+        </p:blipFill>
+        <p:spPr bwMode="auto">
+          <a:xfrm>
+            <a:off x="8208961" y="3510798"/>
+            <a:ext cx="2110946" cy="2600310"/>
+          </a:xfrm>
+          <a:prstGeom prst="rect">
+            <a:avLst/>
+          </a:prstGeom>
+          <a:noFill/>
+          <a:extLst>
+            <a:ext uri="{909E8E84-426E-40DD-AFC4-6F175D3DCCD1}">
+              <a14:hiddenFill xmlns:a14="http://schemas.microsoft.com/office/drawing/2010/main">
+                <a:solidFill>
+                  <a:srgbClr val="FFFFFF"/>
+                </a:solidFill>
+              </a14:hiddenFill>
+            </a:ext>
+          </a:extLst>
+        </p:spPr>
+      </p:pic>
     </p:spTree>
     <p:extLst>
       <p:ext uri="{BB962C8B-B14F-4D97-AF65-F5344CB8AC3E}">
-        <p14:creationId xmlns:p14="http://schemas.microsoft.com/office/powerpoint/2010/main" val="3634456873"/>
+        <p14:creationId xmlns:p14="http://schemas.microsoft.com/office/powerpoint/2010/main" val="1423554379"/>
       </p:ext>
     </p:extLst>
   </p:cSld>
@@ -5720,31 +5952,6 @@
       </p:grpSpPr>
       <p:sp>
         <p:nvSpPr>
-          <p:cNvPr id="2" name="Espaço Reservado para Conteúdo 1">
-            <a:extLst>
-              <a:ext uri="{FF2B5EF4-FFF2-40B4-BE49-F238E27FC236}">
-                <a16:creationId xmlns:a16="http://schemas.microsoft.com/office/drawing/2014/main" id="{9B176969-9450-481C-9497-E3EA97AC4250}"/>
-              </a:ext>
-            </a:extLst>
-          </p:cNvPr>
-          <p:cNvSpPr>
-            <a:spLocks noGrp="1"/>
-          </p:cNvSpPr>
-          <p:nvPr>
-            <p:ph idx="1"/>
-          </p:nvPr>
-        </p:nvSpPr>
-        <p:spPr/>
-        <p:txBody>
-          <a:bodyPr/>
-          <a:lstStyle/>
-          <a:p>
-            <a:endParaRPr lang="pt-BR" dirty="0"/>
-          </a:p>
-        </p:txBody>
-      </p:sp>
-      <p:sp>
-        <p:nvSpPr>
           <p:cNvPr id="3" name="Espaço Reservado para Número de Slide 2">
             <a:extLst>
               <a:ext uri="{FF2B5EF4-FFF2-40B4-BE49-F238E27FC236}">
@@ -5795,7 +6002,7 @@
           <a:p>
             <a:r>
               <a:rPr lang="pt-BR" dirty="0"/>
-              <a:t>TECNOLOGIAS UTILIZADAS</a:t>
+              <a:t>SOLUÇÃO TECNOLÓGICA</a:t>
             </a:r>
           </a:p>
         </p:txBody>
@@ -5828,10 +6035,339 @@
           </a:p>
         </p:txBody>
       </p:sp>
+      <p:pic>
+        <p:nvPicPr>
+          <p:cNvPr id="1026" name="Picture 2" descr="Resultado de imagem para cÃ¢mera raspberry pi">
+            <a:extLst>
+              <a:ext uri="{FF2B5EF4-FFF2-40B4-BE49-F238E27FC236}">
+                <a16:creationId xmlns:a16="http://schemas.microsoft.com/office/drawing/2014/main" id="{2591D967-106E-4D53-9A5B-158108D047D7}"/>
+              </a:ext>
+            </a:extLst>
+          </p:cNvPr>
+          <p:cNvPicPr>
+            <a:picLocks noChangeAspect="1" noChangeArrowheads="1"/>
+          </p:cNvPicPr>
+          <p:nvPr/>
+        </p:nvPicPr>
+        <p:blipFill rotWithShape="1">
+          <a:blip r:embed="rId2">
+            <a:extLst>
+              <a:ext uri="{28A0092B-C50C-407E-A947-70E740481C1C}">
+                <a14:useLocalDpi xmlns:a14="http://schemas.microsoft.com/office/drawing/2010/main" val="0"/>
+              </a:ext>
+            </a:extLst>
+          </a:blip>
+          <a:srcRect l="15239" t="16195" r="14697" b="9279"/>
+          <a:stretch/>
+        </p:blipFill>
+        <p:spPr bwMode="auto">
+          <a:xfrm>
+            <a:off x="362946" y="2926064"/>
+            <a:ext cx="1564708" cy="1664371"/>
+          </a:xfrm>
+          <a:prstGeom prst="rect">
+            <a:avLst/>
+          </a:prstGeom>
+          <a:noFill/>
+          <a:extLst>
+            <a:ext uri="{909E8E84-426E-40DD-AFC4-6F175D3DCCD1}">
+              <a14:hiddenFill xmlns:a14="http://schemas.microsoft.com/office/drawing/2010/main">
+                <a:solidFill>
+                  <a:srgbClr val="FFFFFF"/>
+                </a:solidFill>
+              </a14:hiddenFill>
+            </a:ext>
+          </a:extLst>
+        </p:spPr>
+      </p:pic>
+      <p:cxnSp>
+        <p:nvCxnSpPr>
+          <p:cNvPr id="21" name="Conector de Seta Reta 20">
+            <a:extLst>
+              <a:ext uri="{FF2B5EF4-FFF2-40B4-BE49-F238E27FC236}">
+                <a16:creationId xmlns:a16="http://schemas.microsoft.com/office/drawing/2014/main" id="{3BFB8C97-DCD1-4CD1-83A2-0B5A71E82BAB}"/>
+              </a:ext>
+            </a:extLst>
+          </p:cNvPr>
+          <p:cNvCxnSpPr>
+            <a:cxnSpLocks/>
+          </p:cNvCxnSpPr>
+          <p:nvPr/>
+        </p:nvCxnSpPr>
+        <p:spPr>
+          <a:xfrm>
+            <a:off x="1839972" y="3783743"/>
+            <a:ext cx="693246" cy="0"/>
+          </a:xfrm>
+          <a:prstGeom prst="straightConnector1">
+            <a:avLst/>
+          </a:prstGeom>
+          <a:ln w="19050">
+            <a:solidFill>
+              <a:schemeClr val="tx1"/>
+            </a:solidFill>
+            <a:tailEnd type="triangle"/>
+          </a:ln>
+          <a:effectLst>
+            <a:outerShdw blurRad="50800" dist="38100" algn="l" rotWithShape="0">
+              <a:prstClr val="black">
+                <a:alpha val="40000"/>
+              </a:prstClr>
+            </a:outerShdw>
+          </a:effectLst>
+        </p:spPr>
+        <p:style>
+          <a:lnRef idx="1">
+            <a:schemeClr val="accent1"/>
+          </a:lnRef>
+          <a:fillRef idx="0">
+            <a:schemeClr val="accent1"/>
+          </a:fillRef>
+          <a:effectRef idx="0">
+            <a:schemeClr val="accent1"/>
+          </a:effectRef>
+          <a:fontRef idx="minor">
+            <a:schemeClr val="tx1"/>
+          </a:fontRef>
+        </p:style>
+      </p:cxnSp>
+      <p:pic>
+        <p:nvPicPr>
+          <p:cNvPr id="1028" name="Picture 4" descr="Resultado de imagem para raspberry pi 3">
+            <a:extLst>
+              <a:ext uri="{FF2B5EF4-FFF2-40B4-BE49-F238E27FC236}">
+                <a16:creationId xmlns:a16="http://schemas.microsoft.com/office/drawing/2014/main" id="{6AC74F63-38B3-46E8-93F0-31D4C730BDE0}"/>
+              </a:ext>
+            </a:extLst>
+          </p:cNvPr>
+          <p:cNvPicPr>
+            <a:picLocks noChangeAspect="1" noChangeArrowheads="1"/>
+          </p:cNvPicPr>
+          <p:nvPr/>
+        </p:nvPicPr>
+        <p:blipFill>
+          <a:blip r:embed="rId3">
+            <a:extLst>
+              <a:ext uri="{28A0092B-C50C-407E-A947-70E740481C1C}">
+                <a14:useLocalDpi xmlns:a14="http://schemas.microsoft.com/office/drawing/2010/main" val="0"/>
+              </a:ext>
+            </a:extLst>
+          </a:blip>
+          <a:srcRect/>
+          <a:stretch>
+            <a:fillRect/>
+          </a:stretch>
+        </p:blipFill>
+        <p:spPr bwMode="auto">
+          <a:xfrm>
+            <a:off x="2620900" y="3082119"/>
+            <a:ext cx="2427623" cy="1352262"/>
+          </a:xfrm>
+          <a:prstGeom prst="rect">
+            <a:avLst/>
+          </a:prstGeom>
+          <a:noFill/>
+          <a:extLst>
+            <a:ext uri="{909E8E84-426E-40DD-AFC4-6F175D3DCCD1}">
+              <a14:hiddenFill xmlns:a14="http://schemas.microsoft.com/office/drawing/2010/main">
+                <a:solidFill>
+                  <a:srgbClr val="FFFFFF"/>
+                </a:solidFill>
+              </a14:hiddenFill>
+            </a:ext>
+          </a:extLst>
+        </p:spPr>
+      </p:pic>
+      <p:pic>
+        <p:nvPicPr>
+          <p:cNvPr id="1030" name="Picture 6" descr="Resultado de imagem para arduino mega">
+            <a:extLst>
+              <a:ext uri="{FF2B5EF4-FFF2-40B4-BE49-F238E27FC236}">
+                <a16:creationId xmlns:a16="http://schemas.microsoft.com/office/drawing/2014/main" id="{6D98D3E5-00D2-4B8B-BC4B-29D6965F4DDE}"/>
+              </a:ext>
+            </a:extLst>
+          </p:cNvPr>
+          <p:cNvPicPr>
+            <a:picLocks noChangeAspect="1" noChangeArrowheads="1"/>
+          </p:cNvPicPr>
+          <p:nvPr/>
+        </p:nvPicPr>
+        <p:blipFill rotWithShape="1">
+          <a:blip r:embed="rId4">
+            <a:extLst>
+              <a:ext uri="{28A0092B-C50C-407E-A947-70E740481C1C}">
+                <a14:useLocalDpi xmlns:a14="http://schemas.microsoft.com/office/drawing/2010/main" val="0"/>
+              </a:ext>
+            </a:extLst>
+          </a:blip>
+          <a:srcRect l="7863" t="18055" r="7863" b="18822"/>
+          <a:stretch/>
+        </p:blipFill>
+        <p:spPr bwMode="auto">
+          <a:xfrm>
+            <a:off x="5741769" y="2844919"/>
+            <a:ext cx="2452796" cy="1837204"/>
+          </a:xfrm>
+          <a:prstGeom prst="rect">
+            <a:avLst/>
+          </a:prstGeom>
+          <a:noFill/>
+          <a:extLst>
+            <a:ext uri="{909E8E84-426E-40DD-AFC4-6F175D3DCCD1}">
+              <a14:hiddenFill xmlns:a14="http://schemas.microsoft.com/office/drawing/2010/main">
+                <a:solidFill>
+                  <a:srgbClr val="FFFFFF"/>
+                </a:solidFill>
+              </a14:hiddenFill>
+            </a:ext>
+          </a:extLst>
+        </p:spPr>
+      </p:pic>
+      <p:cxnSp>
+        <p:nvCxnSpPr>
+          <p:cNvPr id="34" name="Conector de Seta Reta 33">
+            <a:extLst>
+              <a:ext uri="{FF2B5EF4-FFF2-40B4-BE49-F238E27FC236}">
+                <a16:creationId xmlns:a16="http://schemas.microsoft.com/office/drawing/2014/main" id="{8266F53D-1107-4C54-8976-020F604E8609}"/>
+              </a:ext>
+            </a:extLst>
+          </p:cNvPr>
+          <p:cNvCxnSpPr>
+            <a:cxnSpLocks/>
+            <a:stCxn id="1028" idx="3"/>
+            <a:endCxn id="1030" idx="1"/>
+          </p:cNvCxnSpPr>
+          <p:nvPr/>
+        </p:nvCxnSpPr>
+        <p:spPr>
+          <a:xfrm>
+            <a:off x="5048523" y="3758250"/>
+            <a:ext cx="693246" cy="5271"/>
+          </a:xfrm>
+          <a:prstGeom prst="straightConnector1">
+            <a:avLst/>
+          </a:prstGeom>
+          <a:ln w="19050">
+            <a:solidFill>
+              <a:schemeClr val="tx1"/>
+            </a:solidFill>
+            <a:tailEnd type="triangle"/>
+          </a:ln>
+          <a:effectLst>
+            <a:outerShdw blurRad="50800" dist="38100" algn="l" rotWithShape="0">
+              <a:prstClr val="black">
+                <a:alpha val="40000"/>
+              </a:prstClr>
+            </a:outerShdw>
+          </a:effectLst>
+        </p:spPr>
+        <p:style>
+          <a:lnRef idx="1">
+            <a:schemeClr val="accent1"/>
+          </a:lnRef>
+          <a:fillRef idx="0">
+            <a:schemeClr val="accent1"/>
+          </a:fillRef>
+          <a:effectRef idx="0">
+            <a:schemeClr val="accent1"/>
+          </a:effectRef>
+          <a:fontRef idx="minor">
+            <a:schemeClr val="tx1"/>
+          </a:fontRef>
+        </p:style>
+      </p:cxnSp>
+      <p:cxnSp>
+        <p:nvCxnSpPr>
+          <p:cNvPr id="38" name="Conector de Seta Reta 37">
+            <a:extLst>
+              <a:ext uri="{FF2B5EF4-FFF2-40B4-BE49-F238E27FC236}">
+                <a16:creationId xmlns:a16="http://schemas.microsoft.com/office/drawing/2014/main" id="{01776928-E3A6-4AAB-9EB6-460554FA612E}"/>
+              </a:ext>
+            </a:extLst>
+          </p:cNvPr>
+          <p:cNvCxnSpPr>
+            <a:cxnSpLocks/>
+            <a:stCxn id="1030" idx="3"/>
+            <a:endCxn id="47" idx="1"/>
+          </p:cNvCxnSpPr>
+          <p:nvPr/>
+        </p:nvCxnSpPr>
+        <p:spPr>
+          <a:xfrm flipV="1">
+            <a:off x="8194565" y="3758249"/>
+            <a:ext cx="744252" cy="5272"/>
+          </a:xfrm>
+          <a:prstGeom prst="straightConnector1">
+            <a:avLst/>
+          </a:prstGeom>
+          <a:ln w="19050">
+            <a:solidFill>
+              <a:schemeClr val="tx1"/>
+            </a:solidFill>
+            <a:tailEnd type="triangle"/>
+          </a:ln>
+          <a:effectLst>
+            <a:outerShdw blurRad="50800" dist="38100" algn="l" rotWithShape="0">
+              <a:prstClr val="black">
+                <a:alpha val="40000"/>
+              </a:prstClr>
+            </a:outerShdw>
+          </a:effectLst>
+        </p:spPr>
+        <p:style>
+          <a:lnRef idx="1">
+            <a:schemeClr val="accent1"/>
+          </a:lnRef>
+          <a:fillRef idx="0">
+            <a:schemeClr val="accent1"/>
+          </a:fillRef>
+          <a:effectRef idx="0">
+            <a:schemeClr val="accent1"/>
+          </a:effectRef>
+          <a:fontRef idx="minor">
+            <a:schemeClr val="tx1"/>
+          </a:fontRef>
+        </p:style>
+      </p:cxnSp>
+      <p:pic>
+        <p:nvPicPr>
+          <p:cNvPr id="47" name="Imagem 46" descr="Uma imagem contendo metalúrgico, engrenagem, interior&#10;&#10;Descrição gerada automaticamente">
+            <a:extLst>
+              <a:ext uri="{FF2B5EF4-FFF2-40B4-BE49-F238E27FC236}">
+                <a16:creationId xmlns:a16="http://schemas.microsoft.com/office/drawing/2014/main" id="{0B1A06F9-4F8F-4312-8486-A4F625FD788B}"/>
+              </a:ext>
+            </a:extLst>
+          </p:cNvPr>
+          <p:cNvPicPr>
+            <a:picLocks noChangeAspect="1"/>
+          </p:cNvPicPr>
+          <p:nvPr/>
+        </p:nvPicPr>
+        <p:blipFill rotWithShape="1">
+          <a:blip r:embed="rId5">
+            <a:extLst>
+              <a:ext uri="{28A0092B-C50C-407E-A947-70E740481C1C}">
+                <a14:useLocalDpi xmlns:a14="http://schemas.microsoft.com/office/drawing/2010/main" val="0"/>
+              </a:ext>
+            </a:extLst>
+          </a:blip>
+          <a:srcRect l="13972" t="1869" r="14435" b="3442"/>
+          <a:stretch/>
+        </p:blipFill>
+        <p:spPr>
+          <a:xfrm>
+            <a:off x="8938817" y="2448963"/>
+            <a:ext cx="2968408" cy="2618571"/>
+          </a:xfrm>
+          <a:prstGeom prst="rect">
+            <a:avLst/>
+          </a:prstGeom>
+        </p:spPr>
+      </p:pic>
     </p:spTree>
     <p:extLst>
       <p:ext uri="{BB962C8B-B14F-4D97-AF65-F5344CB8AC3E}">
-        <p14:creationId xmlns:p14="http://schemas.microsoft.com/office/powerpoint/2010/main" val="1423554379"/>
+        <p14:creationId xmlns:p14="http://schemas.microsoft.com/office/powerpoint/2010/main" val="3634456873"/>
       </p:ext>
     </p:extLst>
   </p:cSld>

</xml_diff>

<commit_message>
Adicionadas sugestões de objetivos e algumas referências.
</commit_message>
<xml_diff>
--- a/Slide.pptx
+++ b/Slide.pptx
@@ -207,7 +207,7 @@
           <a:p>
             <a:fld id="{355DB5B6-2099-4182-8370-BE40CE79ECA1}" type="datetimeFigureOut">
               <a:rPr lang="pt-BR" smtClean="0"/>
-              <a:t>13/04/2019</a:t>
+              <a:t>14/04/2019</a:t>
             </a:fld>
             <a:endParaRPr lang="pt-BR"/>
           </a:p>
@@ -1051,7 +1051,7 @@
           <a:p>
             <a:fld id="{4539A389-483A-4E9F-9AAB-6D6A3D56DCF6}" type="datetime1">
               <a:rPr lang="pt-BR" smtClean="0"/>
-              <a:t>13/04/2019</a:t>
+              <a:t>14/04/2019</a:t>
             </a:fld>
             <a:endParaRPr lang="pt-BR"/>
           </a:p>
@@ -1259,7 +1259,7 @@
           <a:p>
             <a:fld id="{FF985126-5AE9-4104-BD84-FF9EDB02A973}" type="datetime1">
               <a:rPr lang="pt-BR" smtClean="0"/>
-              <a:t>13/04/2019</a:t>
+              <a:t>14/04/2019</a:t>
             </a:fld>
             <a:endParaRPr lang="pt-BR"/>
           </a:p>
@@ -1429,7 +1429,7 @@
           <a:p>
             <a:fld id="{C346E3E3-2072-42D8-AE5D-F06D0424005B}" type="datetime1">
               <a:rPr lang="pt-BR" smtClean="0"/>
-              <a:t>13/04/2019</a:t>
+              <a:t>14/04/2019</a:t>
             </a:fld>
             <a:endParaRPr lang="pt-BR"/>
           </a:p>
@@ -1746,7 +1746,7 @@
           <a:p>
             <a:fld id="{E19C2350-4C2B-4882-8B71-1D519621A934}" type="datetime1">
               <a:rPr lang="pt-BR" smtClean="0"/>
-              <a:t>13/04/2019</a:t>
+              <a:t>14/04/2019</a:t>
             </a:fld>
             <a:endParaRPr lang="pt-BR"/>
           </a:p>
@@ -2058,7 +2058,7 @@
           <a:p>
             <a:fld id="{62C1FAA8-89AE-4E7D-A200-C08DFE01393F}" type="datetime1">
               <a:rPr lang="pt-BR" smtClean="0"/>
-              <a:t>13/04/2019</a:t>
+              <a:t>14/04/2019</a:t>
             </a:fld>
             <a:endParaRPr lang="pt-BR"/>
           </a:p>
@@ -2470,7 +2470,7 @@
           <a:p>
             <a:fld id="{48AFFE0E-9767-4588-A361-7E006DEE2CC4}" type="datetime1">
               <a:rPr lang="pt-BR" smtClean="0"/>
-              <a:t>13/04/2019</a:t>
+              <a:t>14/04/2019</a:t>
             </a:fld>
             <a:endParaRPr lang="pt-BR"/>
           </a:p>
@@ -2611,7 +2611,7 @@
           <a:p>
             <a:fld id="{D14657F0-A892-42D8-9C26-D1730EC81330}" type="datetime1">
               <a:rPr lang="pt-BR" smtClean="0"/>
-              <a:t>13/04/2019</a:t>
+              <a:t>14/04/2019</a:t>
             </a:fld>
             <a:endParaRPr lang="pt-BR"/>
           </a:p>
@@ -2724,7 +2724,7 @@
           <a:p>
             <a:fld id="{B4972C2A-9C12-4B5C-8BB0-8A51A2CBCCE7}" type="datetime1">
               <a:rPr lang="pt-BR" smtClean="0"/>
-              <a:t>13/04/2019</a:t>
+              <a:t>14/04/2019</a:t>
             </a:fld>
             <a:endParaRPr lang="pt-BR"/>
           </a:p>
@@ -3035,7 +3035,7 @@
           <a:p>
             <a:fld id="{0B0607DD-BDC6-4187-96EB-482D6E26C5A4}" type="datetime1">
               <a:rPr lang="pt-BR" smtClean="0"/>
-              <a:t>13/04/2019</a:t>
+              <a:t>14/04/2019</a:t>
             </a:fld>
             <a:endParaRPr lang="pt-BR"/>
           </a:p>
@@ -3323,7 +3323,7 @@
           <a:p>
             <a:fld id="{F412D6E7-6296-4A22-98F7-939D137D1CF6}" type="datetime1">
               <a:rPr lang="pt-BR" smtClean="0"/>
-              <a:t>13/04/2019</a:t>
+              <a:t>14/04/2019</a:t>
             </a:fld>
             <a:endParaRPr lang="pt-BR"/>
           </a:p>
@@ -3946,7 +3946,7 @@
           <a:p>
             <a:fld id="{55887BB8-E30A-4046-95CD-0643E512C401}" type="datetime1">
               <a:rPr lang="pt-BR" smtClean="0"/>
-              <a:t>13/04/2019</a:t>
+              <a:t>14/04/2019</a:t>
             </a:fld>
             <a:endParaRPr lang="pt-BR"/>
           </a:p>
@@ -4616,7 +4616,69 @@
           <a:p>
             <a:r>
               <a:rPr lang="pt-BR" dirty="0"/>
-              <a:t>Referências amplas sobre o projeto;</a:t>
+              <a:t>EDNO, Francisco. </a:t>
+            </a:r>
+            <a:r>
+              <a:rPr lang="pt-BR" b="1" dirty="0"/>
+              <a:t>Tutoriais sobre ROS</a:t>
+            </a:r>
+            <a:r>
+              <a:rPr lang="pt-BR" dirty="0"/>
+              <a:t>. [</a:t>
+            </a:r>
+            <a:r>
+              <a:rPr lang="pt-BR" i="1" dirty="0"/>
+              <a:t>S. l.</a:t>
+            </a:r>
+            <a:r>
+              <a:rPr lang="pt-BR" dirty="0"/>
+              <a:t>], 14 dez. 2014. Disponível em: http://wiki.ros.org/</a:t>
+            </a:r>
+            <a:r>
+              <a:rPr lang="pt-BR" dirty="0" err="1"/>
+              <a:t>pt_BR</a:t>
+            </a:r>
+            <a:r>
+              <a:rPr lang="pt-BR" dirty="0"/>
+              <a:t>/ROS/</a:t>
+            </a:r>
+            <a:r>
+              <a:rPr lang="pt-BR" dirty="0" err="1"/>
+              <a:t>Tutorials</a:t>
+            </a:r>
+            <a:r>
+              <a:rPr lang="pt-BR" dirty="0"/>
+              <a:t>. Acesso em: 15 mar. 2019.</a:t>
+            </a:r>
+          </a:p>
+          <a:p>
+            <a:r>
+              <a:rPr lang="pt-BR" dirty="0"/>
+              <a:t>OPENCV DEV TEAM. </a:t>
+            </a:r>
+            <a:r>
+              <a:rPr lang="pt-BR" b="1" dirty="0" err="1"/>
+              <a:t>OpenCV</a:t>
+            </a:r>
+            <a:r>
+              <a:rPr lang="pt-BR" b="1" dirty="0"/>
+              <a:t> 2.4.13.7 </a:t>
+            </a:r>
+            <a:r>
+              <a:rPr lang="pt-BR" b="1" dirty="0" err="1"/>
+              <a:t>documentation</a:t>
+            </a:r>
+            <a:r>
+              <a:rPr lang="pt-BR" dirty="0"/>
+              <a:t>. [</a:t>
+            </a:r>
+            <a:r>
+              <a:rPr lang="pt-BR" i="1" dirty="0"/>
+              <a:t>S. l.</a:t>
+            </a:r>
+            <a:r>
+              <a:rPr lang="pt-BR" dirty="0"/>
+              <a:t>], 12 jul. 2018. Disponível em: https://docs.opencv.org/2.4.13.7/. Acesso em: 15 mar. 2019.</a:t>
             </a:r>
           </a:p>
           <a:p>
@@ -5379,6 +5441,84 @@
             <a:r>
               <a:rPr lang="pt-BR" dirty="0"/>
               <a:t>Byakugan: Visão Computacional</a:t>
+            </a:r>
+          </a:p>
+        </p:txBody>
+      </p:sp>
+      <p:sp>
+        <p:nvSpPr>
+          <p:cNvPr id="6" name="Espaço Reservado para Conteúdo 1">
+            <a:extLst>
+              <a:ext uri="{FF2B5EF4-FFF2-40B4-BE49-F238E27FC236}">
+                <a16:creationId xmlns:a16="http://schemas.microsoft.com/office/drawing/2014/main" id="{169D8511-74FE-4D3D-A6C6-DE86275964BC}"/>
+              </a:ext>
+            </a:extLst>
+          </p:cNvPr>
+          <p:cNvSpPr>
+            <a:spLocks noGrp="1"/>
+          </p:cNvSpPr>
+          <p:nvPr>
+            <p:ph idx="1"/>
+          </p:nvPr>
+        </p:nvSpPr>
+        <p:spPr>
+          <a:xfrm>
+            <a:off x="838200" y="1825625"/>
+            <a:ext cx="10515600" cy="4351338"/>
+          </a:xfrm>
+        </p:spPr>
+        <p:txBody>
+          <a:bodyPr/>
+          <a:lstStyle/>
+          <a:p>
+            <a:r>
+              <a:rPr lang="pt-BR" dirty="0"/>
+              <a:t>Objetivo geral:</a:t>
+            </a:r>
+          </a:p>
+          <a:p>
+            <a:r>
+              <a:rPr lang="pt-BR" sz="2000" dirty="0"/>
+              <a:t>Complexidade do acesso a áreas de desastre;</a:t>
+            </a:r>
+          </a:p>
+          <a:p>
+            <a:r>
+              <a:rPr lang="pt-BR" sz="2000" dirty="0"/>
+              <a:t>Olimpíada Brasileira de Robótica (OBR);</a:t>
+            </a:r>
+          </a:p>
+          <a:p>
+            <a:r>
+              <a:rPr lang="pt-BR" sz="2000" dirty="0"/>
+              <a:t>Emulação de resgate de vítimas em áreas de desastre;</a:t>
+            </a:r>
+          </a:p>
+          <a:p>
+            <a:endParaRPr lang="pt-BR" sz="2000" dirty="0"/>
+          </a:p>
+          <a:p>
+            <a:r>
+              <a:rPr lang="pt-BR" dirty="0"/>
+              <a:t>Objetivo específico:</a:t>
+            </a:r>
+          </a:p>
+          <a:p>
+            <a:r>
+              <a:rPr lang="pt-BR" sz="2000" dirty="0"/>
+              <a:t>Desenvolver uma solução para um dos desafios propostos pela OBR;</a:t>
+            </a:r>
+          </a:p>
+          <a:p>
+            <a:r>
+              <a:rPr lang="pt-BR" sz="2000" dirty="0"/>
+              <a:t>Resgate das vítimas;</a:t>
+            </a:r>
+          </a:p>
+          <a:p>
+            <a:r>
+              <a:rPr lang="pt-BR" sz="2000" dirty="0"/>
+              <a:t>Implementar métodos de tratamento de imagem ao robô;</a:t>
             </a:r>
           </a:p>
         </p:txBody>

</xml_diff>

<commit_message>
Adicionado o tópido "Disciplinas Integradas"
</commit_message>
<xml_diff>
--- a/Slide.pptx
+++ b/Slide.pptx
@@ -12,10 +12,10 @@
     <p:sldId id="257" r:id="rId3"/>
     <p:sldId id="258" r:id="rId4"/>
     <p:sldId id="259" r:id="rId5"/>
-    <p:sldId id="260" r:id="rId6"/>
-    <p:sldId id="262" r:id="rId7"/>
-    <p:sldId id="261" r:id="rId8"/>
-    <p:sldId id="263" r:id="rId9"/>
+    <p:sldId id="267" r:id="rId6"/>
+    <p:sldId id="260" r:id="rId7"/>
+    <p:sldId id="262" r:id="rId8"/>
+    <p:sldId id="261" r:id="rId9"/>
     <p:sldId id="264" r:id="rId10"/>
     <p:sldId id="265" r:id="rId11"/>
     <p:sldId id="266" r:id="rId12"/>
@@ -207,7 +207,7 @@
           <a:p>
             <a:fld id="{355DB5B6-2099-4182-8370-BE40CE79ECA1}" type="datetimeFigureOut">
               <a:rPr lang="pt-BR" smtClean="0"/>
-              <a:t>14/04/2019</a:t>
+              <a:t>15/04/2019</a:t>
             </a:fld>
             <a:endParaRPr lang="pt-BR"/>
           </a:p>
@@ -1051,7 +1051,7 @@
           <a:p>
             <a:fld id="{4539A389-483A-4E9F-9AAB-6D6A3D56DCF6}" type="datetime1">
               <a:rPr lang="pt-BR" smtClean="0"/>
-              <a:t>14/04/2019</a:t>
+              <a:t>15/04/2019</a:t>
             </a:fld>
             <a:endParaRPr lang="pt-BR"/>
           </a:p>
@@ -1259,7 +1259,7 @@
           <a:p>
             <a:fld id="{FF985126-5AE9-4104-BD84-FF9EDB02A973}" type="datetime1">
               <a:rPr lang="pt-BR" smtClean="0"/>
-              <a:t>14/04/2019</a:t>
+              <a:t>15/04/2019</a:t>
             </a:fld>
             <a:endParaRPr lang="pt-BR"/>
           </a:p>
@@ -1429,7 +1429,7 @@
           <a:p>
             <a:fld id="{C346E3E3-2072-42D8-AE5D-F06D0424005B}" type="datetime1">
               <a:rPr lang="pt-BR" smtClean="0"/>
-              <a:t>14/04/2019</a:t>
+              <a:t>15/04/2019</a:t>
             </a:fld>
             <a:endParaRPr lang="pt-BR"/>
           </a:p>
@@ -1746,7 +1746,7 @@
           <a:p>
             <a:fld id="{E19C2350-4C2B-4882-8B71-1D519621A934}" type="datetime1">
               <a:rPr lang="pt-BR" smtClean="0"/>
-              <a:t>14/04/2019</a:t>
+              <a:t>15/04/2019</a:t>
             </a:fld>
             <a:endParaRPr lang="pt-BR"/>
           </a:p>
@@ -2058,7 +2058,7 @@
           <a:p>
             <a:fld id="{62C1FAA8-89AE-4E7D-A200-C08DFE01393F}" type="datetime1">
               <a:rPr lang="pt-BR" smtClean="0"/>
-              <a:t>14/04/2019</a:t>
+              <a:t>15/04/2019</a:t>
             </a:fld>
             <a:endParaRPr lang="pt-BR"/>
           </a:p>
@@ -2470,7 +2470,7 @@
           <a:p>
             <a:fld id="{48AFFE0E-9767-4588-A361-7E006DEE2CC4}" type="datetime1">
               <a:rPr lang="pt-BR" smtClean="0"/>
-              <a:t>14/04/2019</a:t>
+              <a:t>15/04/2019</a:t>
             </a:fld>
             <a:endParaRPr lang="pt-BR"/>
           </a:p>
@@ -2611,7 +2611,7 @@
           <a:p>
             <a:fld id="{D14657F0-A892-42D8-9C26-D1730EC81330}" type="datetime1">
               <a:rPr lang="pt-BR" smtClean="0"/>
-              <a:t>14/04/2019</a:t>
+              <a:t>15/04/2019</a:t>
             </a:fld>
             <a:endParaRPr lang="pt-BR"/>
           </a:p>
@@ -2724,7 +2724,7 @@
           <a:p>
             <a:fld id="{B4972C2A-9C12-4B5C-8BB0-8A51A2CBCCE7}" type="datetime1">
               <a:rPr lang="pt-BR" smtClean="0"/>
-              <a:t>14/04/2019</a:t>
+              <a:t>15/04/2019</a:t>
             </a:fld>
             <a:endParaRPr lang="pt-BR"/>
           </a:p>
@@ -3035,7 +3035,7 @@
           <a:p>
             <a:fld id="{0B0607DD-BDC6-4187-96EB-482D6E26C5A4}" type="datetime1">
               <a:rPr lang="pt-BR" smtClean="0"/>
-              <a:t>14/04/2019</a:t>
+              <a:t>15/04/2019</a:t>
             </a:fld>
             <a:endParaRPr lang="pt-BR"/>
           </a:p>
@@ -3323,7 +3323,7 @@
           <a:p>
             <a:fld id="{F412D6E7-6296-4A22-98F7-939D137D1CF6}" type="datetime1">
               <a:rPr lang="pt-BR" smtClean="0"/>
-              <a:t>14/04/2019</a:t>
+              <a:t>15/04/2019</a:t>
             </a:fld>
             <a:endParaRPr lang="pt-BR"/>
           </a:p>
@@ -3946,7 +3946,7 @@
           <a:p>
             <a:fld id="{55887BB8-E30A-4046-95CD-0643E512C401}" type="datetime1">
               <a:rPr lang="pt-BR" smtClean="0"/>
-              <a:t>14/04/2019</a:t>
+              <a:t>15/04/2019</a:t>
             </a:fld>
             <a:endParaRPr lang="pt-BR"/>
           </a:p>
@@ -5011,6 +5011,12 @@
           <a:p>
             <a:r>
               <a:rPr lang="pt-BR" dirty="0"/>
+              <a:t>Disciplinas Integradas;</a:t>
+            </a:r>
+          </a:p>
+          <a:p>
+            <a:r>
+              <a:rPr lang="pt-BR" dirty="0"/>
               <a:t>Soluções Similares;</a:t>
             </a:r>
           </a:p>
@@ -5558,7 +5564,7 @@
           <p:cNvPr id="2" name="Espaço Reservado para Conteúdo 1">
             <a:extLst>
               <a:ext uri="{FF2B5EF4-FFF2-40B4-BE49-F238E27FC236}">
-                <a16:creationId xmlns:a16="http://schemas.microsoft.com/office/drawing/2014/main" id="{9B176969-9450-481C-9497-E3EA97AC4250}"/>
+                <a16:creationId xmlns:a16="http://schemas.microsoft.com/office/drawing/2014/main" id="{42C16D62-E4F4-4D6E-9D13-862B9469A03E}"/>
               </a:ext>
             </a:extLst>
           </p:cNvPr>
@@ -5580,10 +5586,42 @@
       </p:sp>
       <p:sp>
         <p:nvSpPr>
-          <p:cNvPr id="3" name="Espaço Reservado para Número de Slide 2">
-            <a:extLst>
-              <a:ext uri="{FF2B5EF4-FFF2-40B4-BE49-F238E27FC236}">
-                <a16:creationId xmlns:a16="http://schemas.microsoft.com/office/drawing/2014/main" id="{D0D742AF-C764-436B-8667-282022DBEB2D}"/>
+          <p:cNvPr id="3" name="Espaço Reservado para Rodapé 2">
+            <a:extLst>
+              <a:ext uri="{FF2B5EF4-FFF2-40B4-BE49-F238E27FC236}">
+                <a16:creationId xmlns:a16="http://schemas.microsoft.com/office/drawing/2014/main" id="{75D1B8D1-7B2A-4F21-BCEF-C6AA443A529B}"/>
+              </a:ext>
+            </a:extLst>
+          </p:cNvPr>
+          <p:cNvSpPr>
+            <a:spLocks noGrp="1"/>
+          </p:cNvSpPr>
+          <p:nvPr>
+            <p:ph type="ftr" sz="quarter" idx="11"/>
+          </p:nvPr>
+        </p:nvSpPr>
+        <p:spPr/>
+        <p:txBody>
+          <a:bodyPr/>
+          <a:lstStyle/>
+          <a:p>
+            <a:r>
+              <a:rPr lang="pt-BR" dirty="0" err="1"/>
+              <a:t>Byakugan</a:t>
+            </a:r>
+            <a:r>
+              <a:rPr lang="pt-BR" dirty="0"/>
+              <a:t>: Visão Computacional</a:t>
+            </a:r>
+          </a:p>
+        </p:txBody>
+      </p:sp>
+      <p:sp>
+        <p:nvSpPr>
+          <p:cNvPr id="4" name="Espaço Reservado para Número de Slide 3">
+            <a:extLst>
+              <a:ext uri="{FF2B5EF4-FFF2-40B4-BE49-F238E27FC236}">
+                <a16:creationId xmlns:a16="http://schemas.microsoft.com/office/drawing/2014/main" id="{CBDD1A5A-0080-4215-9BFF-DB5F86754687}"/>
               </a:ext>
             </a:extLst>
           </p:cNvPr>
@@ -5609,10 +5647,10 @@
       </p:sp>
       <p:sp>
         <p:nvSpPr>
-          <p:cNvPr id="4" name="Título 3">
-            <a:extLst>
-              <a:ext uri="{FF2B5EF4-FFF2-40B4-BE49-F238E27FC236}">
-                <a16:creationId xmlns:a16="http://schemas.microsoft.com/office/drawing/2014/main" id="{D2587431-3788-4EB1-BE7F-072A4FA3AF46}"/>
+          <p:cNvPr id="5" name="Título 4">
+            <a:extLst>
+              <a:ext uri="{FF2B5EF4-FFF2-40B4-BE49-F238E27FC236}">
+                <a16:creationId xmlns:a16="http://schemas.microsoft.com/office/drawing/2014/main" id="{1566DED6-B701-41ED-84A3-B6543908B6EE}"/>
               </a:ext>
             </a:extLst>
           </p:cNvPr>
@@ -5630,35 +5668,7 @@
           <a:p>
             <a:r>
               <a:rPr lang="pt-BR" dirty="0"/>
-              <a:t>SOLUÇÕES SIMILARES</a:t>
-            </a:r>
-          </a:p>
-        </p:txBody>
-      </p:sp>
-      <p:sp>
-        <p:nvSpPr>
-          <p:cNvPr id="5" name="Espaço Reservado para Rodapé 4">
-            <a:extLst>
-              <a:ext uri="{FF2B5EF4-FFF2-40B4-BE49-F238E27FC236}">
-                <a16:creationId xmlns:a16="http://schemas.microsoft.com/office/drawing/2014/main" id="{8ECB9C2D-4478-45CF-9486-69530DA50C59}"/>
-              </a:ext>
-            </a:extLst>
-          </p:cNvPr>
-          <p:cNvSpPr>
-            <a:spLocks noGrp="1"/>
-          </p:cNvSpPr>
-          <p:nvPr>
-            <p:ph type="ftr" sz="quarter" idx="11"/>
-          </p:nvPr>
-        </p:nvSpPr>
-        <p:spPr/>
-        <p:txBody>
-          <a:bodyPr/>
-          <a:lstStyle/>
-          <a:p>
-            <a:r>
-              <a:rPr lang="pt-BR" dirty="0"/>
-              <a:t>Byakugan: Visão Computacional</a:t>
+              <a:t>Disciplinas Integradas</a:t>
             </a:r>
           </a:p>
         </p:txBody>
@@ -5666,7 +5676,7 @@
     </p:spTree>
     <p:extLst>
       <p:ext uri="{BB962C8B-B14F-4D97-AF65-F5344CB8AC3E}">
-        <p14:creationId xmlns:p14="http://schemas.microsoft.com/office/powerpoint/2010/main" val="3357810014"/>
+        <p14:creationId xmlns:p14="http://schemas.microsoft.com/office/powerpoint/2010/main" val="1225811333"/>
       </p:ext>
     </p:extLst>
   </p:cSld>
@@ -5695,6 +5705,31 @@
       </p:grpSpPr>
       <p:sp>
         <p:nvSpPr>
+          <p:cNvPr id="2" name="Espaço Reservado para Conteúdo 1">
+            <a:extLst>
+              <a:ext uri="{FF2B5EF4-FFF2-40B4-BE49-F238E27FC236}">
+                <a16:creationId xmlns:a16="http://schemas.microsoft.com/office/drawing/2014/main" id="{9B176969-9450-481C-9497-E3EA97AC4250}"/>
+              </a:ext>
+            </a:extLst>
+          </p:cNvPr>
+          <p:cNvSpPr>
+            <a:spLocks noGrp="1"/>
+          </p:cNvSpPr>
+          <p:nvPr>
+            <p:ph idx="1"/>
+          </p:nvPr>
+        </p:nvSpPr>
+        <p:spPr/>
+        <p:txBody>
+          <a:bodyPr/>
+          <a:lstStyle/>
+          <a:p>
+            <a:endParaRPr lang="pt-BR" dirty="0"/>
+          </a:p>
+        </p:txBody>
+      </p:sp>
+      <p:sp>
+        <p:nvSpPr>
           <p:cNvPr id="3" name="Espaço Reservado para Número de Slide 2">
             <a:extLst>
               <a:ext uri="{FF2B5EF4-FFF2-40B4-BE49-F238E27FC236}">
@@ -5717,6 +5752,121 @@
             <a:fld id="{00CBB334-6205-492F-9410-6332D321FA39}" type="slidenum">
               <a:rPr lang="pt-BR" smtClean="0"/>
               <a:t>6</a:t>
+            </a:fld>
+            <a:endParaRPr lang="pt-BR"/>
+          </a:p>
+        </p:txBody>
+      </p:sp>
+      <p:sp>
+        <p:nvSpPr>
+          <p:cNvPr id="4" name="Título 3">
+            <a:extLst>
+              <a:ext uri="{FF2B5EF4-FFF2-40B4-BE49-F238E27FC236}">
+                <a16:creationId xmlns:a16="http://schemas.microsoft.com/office/drawing/2014/main" id="{D2587431-3788-4EB1-BE7F-072A4FA3AF46}"/>
+              </a:ext>
+            </a:extLst>
+          </p:cNvPr>
+          <p:cNvSpPr>
+            <a:spLocks noGrp="1"/>
+          </p:cNvSpPr>
+          <p:nvPr>
+            <p:ph type="title"/>
+          </p:nvPr>
+        </p:nvSpPr>
+        <p:spPr/>
+        <p:txBody>
+          <a:bodyPr/>
+          <a:lstStyle/>
+          <a:p>
+            <a:r>
+              <a:rPr lang="pt-BR" dirty="0"/>
+              <a:t>SOLUÇÕES SIMILARES</a:t>
+            </a:r>
+          </a:p>
+        </p:txBody>
+      </p:sp>
+      <p:sp>
+        <p:nvSpPr>
+          <p:cNvPr id="5" name="Espaço Reservado para Rodapé 4">
+            <a:extLst>
+              <a:ext uri="{FF2B5EF4-FFF2-40B4-BE49-F238E27FC236}">
+                <a16:creationId xmlns:a16="http://schemas.microsoft.com/office/drawing/2014/main" id="{8ECB9C2D-4478-45CF-9486-69530DA50C59}"/>
+              </a:ext>
+            </a:extLst>
+          </p:cNvPr>
+          <p:cNvSpPr>
+            <a:spLocks noGrp="1"/>
+          </p:cNvSpPr>
+          <p:nvPr>
+            <p:ph type="ftr" sz="quarter" idx="11"/>
+          </p:nvPr>
+        </p:nvSpPr>
+        <p:spPr/>
+        <p:txBody>
+          <a:bodyPr/>
+          <a:lstStyle/>
+          <a:p>
+            <a:r>
+              <a:rPr lang="pt-BR" dirty="0"/>
+              <a:t>Byakugan: Visão Computacional</a:t>
+            </a:r>
+          </a:p>
+        </p:txBody>
+      </p:sp>
+    </p:spTree>
+    <p:extLst>
+      <p:ext uri="{BB962C8B-B14F-4D97-AF65-F5344CB8AC3E}">
+        <p14:creationId xmlns:p14="http://schemas.microsoft.com/office/powerpoint/2010/main" val="3357810014"/>
+      </p:ext>
+    </p:extLst>
+  </p:cSld>
+  <p:clrMapOvr>
+    <a:masterClrMapping/>
+  </p:clrMapOvr>
+</p:sld>
+</file>
+
+<file path=ppt/slides/slide7.xml><?xml version="1.0" encoding="utf-8"?>
+<p:sld xmlns:a="http://schemas.openxmlformats.org/drawingml/2006/main" xmlns:r="http://schemas.openxmlformats.org/officeDocument/2006/relationships" xmlns:p="http://schemas.openxmlformats.org/presentationml/2006/main">
+  <p:cSld>
+    <p:spTree>
+      <p:nvGrpSpPr>
+        <p:cNvPr id="1" name=""/>
+        <p:cNvGrpSpPr/>
+        <p:nvPr/>
+      </p:nvGrpSpPr>
+      <p:grpSpPr>
+        <a:xfrm>
+          <a:off x="0" y="0"/>
+          <a:ext cx="0" cy="0"/>
+          <a:chOff x="0" y="0"/>
+          <a:chExt cx="0" cy="0"/>
+        </a:xfrm>
+      </p:grpSpPr>
+      <p:sp>
+        <p:nvSpPr>
+          <p:cNvPr id="3" name="Espaço Reservado para Número de Slide 2">
+            <a:extLst>
+              <a:ext uri="{FF2B5EF4-FFF2-40B4-BE49-F238E27FC236}">
+                <a16:creationId xmlns:a16="http://schemas.microsoft.com/office/drawing/2014/main" id="{D0D742AF-C764-436B-8667-282022DBEB2D}"/>
+              </a:ext>
+            </a:extLst>
+          </p:cNvPr>
+          <p:cNvSpPr>
+            <a:spLocks noGrp="1"/>
+          </p:cNvSpPr>
+          <p:nvPr>
+            <p:ph type="sldNum" sz="quarter" idx="12"/>
+          </p:nvPr>
+        </p:nvSpPr>
+        <p:spPr/>
+        <p:txBody>
+          <a:bodyPr/>
+          <a:lstStyle/>
+          <a:p>
+            <a:fld id="{00CBB334-6205-492F-9410-6332D321FA39}" type="slidenum">
+              <a:rPr lang="pt-BR" smtClean="0"/>
+              <a:t>7</a:t>
             </a:fld>
             <a:endParaRPr lang="pt-BR"/>
           </a:p>
@@ -6073,7 +6223,7 @@
 </p:sld>
 </file>
 
-<file path=ppt/slides/slide7.xml><?xml version="1.0" encoding="utf-8"?>
+<file path=ppt/slides/slide8.xml><?xml version="1.0" encoding="utf-8"?>
 <p:sld xmlns:a="http://schemas.openxmlformats.org/drawingml/2006/main" xmlns:r="http://schemas.openxmlformats.org/officeDocument/2006/relationships" xmlns:p="http://schemas.openxmlformats.org/presentationml/2006/main">
   <p:cSld>
     <p:spTree>
@@ -6113,7 +6263,7 @@
           <a:p>
             <a:fld id="{00CBB334-6205-492F-9410-6332D321FA39}" type="slidenum">
               <a:rPr lang="pt-BR" smtClean="0"/>
-              <a:t>7</a:t>
+              <a:t>8</a:t>
             </a:fld>
             <a:endParaRPr lang="pt-BR"/>
           </a:p>
@@ -6236,13 +6386,13 @@
         </p:nvCxnSpPr>
         <p:spPr>
           <a:xfrm>
-            <a:off x="1839972" y="3783743"/>
+            <a:off x="1764816" y="3708587"/>
             <a:ext cx="693246" cy="0"/>
           </a:xfrm>
           <a:prstGeom prst="straightConnector1">
             <a:avLst/>
           </a:prstGeom>
-          <a:ln w="19050">
+          <a:ln w="57150">
             <a:solidFill>
               <a:schemeClr val="tx1"/>
             </a:solidFill>
@@ -6363,12 +6513,47 @@
           </a:extLst>
         </p:spPr>
       </p:pic>
+      <p:pic>
+        <p:nvPicPr>
+          <p:cNvPr id="47" name="Imagem 46" descr="Uma imagem contendo metalúrgico, engrenagem, interior&#10;&#10;Descrição gerada automaticamente">
+            <a:extLst>
+              <a:ext uri="{FF2B5EF4-FFF2-40B4-BE49-F238E27FC236}">
+                <a16:creationId xmlns:a16="http://schemas.microsoft.com/office/drawing/2014/main" id="{0B1A06F9-4F8F-4312-8486-A4F625FD788B}"/>
+              </a:ext>
+            </a:extLst>
+          </p:cNvPr>
+          <p:cNvPicPr>
+            <a:picLocks noChangeAspect="1"/>
+          </p:cNvPicPr>
+          <p:nvPr/>
+        </p:nvPicPr>
+        <p:blipFill rotWithShape="1">
+          <a:blip r:embed="rId5">
+            <a:extLst>
+              <a:ext uri="{28A0092B-C50C-407E-A947-70E740481C1C}">
+                <a14:useLocalDpi xmlns:a14="http://schemas.microsoft.com/office/drawing/2010/main" val="0"/>
+              </a:ext>
+            </a:extLst>
+          </a:blip>
+          <a:srcRect l="13972" t="1869" r="14435" b="3442"/>
+          <a:stretch/>
+        </p:blipFill>
+        <p:spPr>
+          <a:xfrm>
+            <a:off x="8938817" y="2448963"/>
+            <a:ext cx="2968408" cy="2618571"/>
+          </a:xfrm>
+          <a:prstGeom prst="rect">
+            <a:avLst/>
+          </a:prstGeom>
+        </p:spPr>
+      </p:pic>
       <p:cxnSp>
         <p:nvCxnSpPr>
-          <p:cNvPr id="34" name="Conector de Seta Reta 33">
-            <a:extLst>
-              <a:ext uri="{FF2B5EF4-FFF2-40B4-BE49-F238E27FC236}">
-                <a16:creationId xmlns:a16="http://schemas.microsoft.com/office/drawing/2014/main" id="{8266F53D-1107-4C54-8976-020F604E8609}"/>
+          <p:cNvPr id="12" name="Conector de Seta Reta 11">
+            <a:extLst>
+              <a:ext uri="{FF2B5EF4-FFF2-40B4-BE49-F238E27FC236}">
+                <a16:creationId xmlns:a16="http://schemas.microsoft.com/office/drawing/2014/main" id="{441A86EB-3EC5-43C9-8367-313130A0EE7F}"/>
               </a:ext>
             </a:extLst>
           </p:cNvPr>
@@ -6387,7 +6572,7 @@
           <a:prstGeom prst="straightConnector1">
             <a:avLst/>
           </a:prstGeom>
-          <a:ln w="19050">
+          <a:ln w="57150">
             <a:solidFill>
               <a:schemeClr val="tx1"/>
             </a:solidFill>
@@ -6418,10 +6603,10 @@
       </p:cxnSp>
       <p:cxnSp>
         <p:nvCxnSpPr>
-          <p:cNvPr id="38" name="Conector de Seta Reta 37">
-            <a:extLst>
-              <a:ext uri="{FF2B5EF4-FFF2-40B4-BE49-F238E27FC236}">
-                <a16:creationId xmlns:a16="http://schemas.microsoft.com/office/drawing/2014/main" id="{01776928-E3A6-4AAB-9EB6-460554FA612E}"/>
+          <p:cNvPr id="13" name="Conector de Seta Reta 12">
+            <a:extLst>
+              <a:ext uri="{FF2B5EF4-FFF2-40B4-BE49-F238E27FC236}">
+                <a16:creationId xmlns:a16="http://schemas.microsoft.com/office/drawing/2014/main" id="{BB7E3651-88A7-415E-83AE-911FF46EA05F}"/>
               </a:ext>
             </a:extLst>
           </p:cNvPr>
@@ -6440,7 +6625,7 @@
           <a:prstGeom prst="straightConnector1">
             <a:avLst/>
           </a:prstGeom>
-          <a:ln w="19050">
+          <a:ln w="57150">
             <a:solidFill>
               <a:schemeClr val="tx1"/>
             </a:solidFill>
@@ -6469,185 +6654,10 @@
           </a:fontRef>
         </p:style>
       </p:cxnSp>
-      <p:pic>
-        <p:nvPicPr>
-          <p:cNvPr id="47" name="Imagem 46" descr="Uma imagem contendo metalúrgico, engrenagem, interior&#10;&#10;Descrição gerada automaticamente">
-            <a:extLst>
-              <a:ext uri="{FF2B5EF4-FFF2-40B4-BE49-F238E27FC236}">
-                <a16:creationId xmlns:a16="http://schemas.microsoft.com/office/drawing/2014/main" id="{0B1A06F9-4F8F-4312-8486-A4F625FD788B}"/>
-              </a:ext>
-            </a:extLst>
-          </p:cNvPr>
-          <p:cNvPicPr>
-            <a:picLocks noChangeAspect="1"/>
-          </p:cNvPicPr>
-          <p:nvPr/>
-        </p:nvPicPr>
-        <p:blipFill rotWithShape="1">
-          <a:blip r:embed="rId5">
-            <a:extLst>
-              <a:ext uri="{28A0092B-C50C-407E-A947-70E740481C1C}">
-                <a14:useLocalDpi xmlns:a14="http://schemas.microsoft.com/office/drawing/2010/main" val="0"/>
-              </a:ext>
-            </a:extLst>
-          </a:blip>
-          <a:srcRect l="13972" t="1869" r="14435" b="3442"/>
-          <a:stretch/>
-        </p:blipFill>
-        <p:spPr>
-          <a:xfrm>
-            <a:off x="8938817" y="2448963"/>
-            <a:ext cx="2968408" cy="2618571"/>
-          </a:xfrm>
-          <a:prstGeom prst="rect">
-            <a:avLst/>
-          </a:prstGeom>
-        </p:spPr>
-      </p:pic>
     </p:spTree>
     <p:extLst>
       <p:ext uri="{BB962C8B-B14F-4D97-AF65-F5344CB8AC3E}">
         <p14:creationId xmlns:p14="http://schemas.microsoft.com/office/powerpoint/2010/main" val="3634456873"/>
-      </p:ext>
-    </p:extLst>
-  </p:cSld>
-  <p:clrMapOvr>
-    <a:masterClrMapping/>
-  </p:clrMapOvr>
-</p:sld>
-</file>
-
-<file path=ppt/slides/slide8.xml><?xml version="1.0" encoding="utf-8"?>
-<p:sld xmlns:a="http://schemas.openxmlformats.org/drawingml/2006/main" xmlns:r="http://schemas.openxmlformats.org/officeDocument/2006/relationships" xmlns:p="http://schemas.openxmlformats.org/presentationml/2006/main">
-  <p:cSld>
-    <p:spTree>
-      <p:nvGrpSpPr>
-        <p:cNvPr id="1" name=""/>
-        <p:cNvGrpSpPr/>
-        <p:nvPr/>
-      </p:nvGrpSpPr>
-      <p:grpSpPr>
-        <a:xfrm>
-          <a:off x="0" y="0"/>
-          <a:ext cx="0" cy="0"/>
-          <a:chOff x="0" y="0"/>
-          <a:chExt cx="0" cy="0"/>
-        </a:xfrm>
-      </p:grpSpPr>
-      <p:sp>
-        <p:nvSpPr>
-          <p:cNvPr id="2" name="Espaço Reservado para Conteúdo 1">
-            <a:extLst>
-              <a:ext uri="{FF2B5EF4-FFF2-40B4-BE49-F238E27FC236}">
-                <a16:creationId xmlns:a16="http://schemas.microsoft.com/office/drawing/2014/main" id="{9B176969-9450-481C-9497-E3EA97AC4250}"/>
-              </a:ext>
-            </a:extLst>
-          </p:cNvPr>
-          <p:cNvSpPr>
-            <a:spLocks noGrp="1"/>
-          </p:cNvSpPr>
-          <p:nvPr>
-            <p:ph idx="1"/>
-          </p:nvPr>
-        </p:nvSpPr>
-        <p:spPr/>
-        <p:txBody>
-          <a:bodyPr/>
-          <a:lstStyle/>
-          <a:p>
-            <a:endParaRPr lang="pt-BR" dirty="0"/>
-          </a:p>
-        </p:txBody>
-      </p:sp>
-      <p:sp>
-        <p:nvSpPr>
-          <p:cNvPr id="3" name="Espaço Reservado para Número de Slide 2">
-            <a:extLst>
-              <a:ext uri="{FF2B5EF4-FFF2-40B4-BE49-F238E27FC236}">
-                <a16:creationId xmlns:a16="http://schemas.microsoft.com/office/drawing/2014/main" id="{D0D742AF-C764-436B-8667-282022DBEB2D}"/>
-              </a:ext>
-            </a:extLst>
-          </p:cNvPr>
-          <p:cNvSpPr>
-            <a:spLocks noGrp="1"/>
-          </p:cNvSpPr>
-          <p:nvPr>
-            <p:ph type="sldNum" sz="quarter" idx="12"/>
-          </p:nvPr>
-        </p:nvSpPr>
-        <p:spPr/>
-        <p:txBody>
-          <a:bodyPr/>
-          <a:lstStyle/>
-          <a:p>
-            <a:fld id="{00CBB334-6205-492F-9410-6332D321FA39}" type="slidenum">
-              <a:rPr lang="pt-BR" smtClean="0"/>
-              <a:t>8</a:t>
-            </a:fld>
-            <a:endParaRPr lang="pt-BR"/>
-          </a:p>
-        </p:txBody>
-      </p:sp>
-      <p:sp>
-        <p:nvSpPr>
-          <p:cNvPr id="4" name="Título 3">
-            <a:extLst>
-              <a:ext uri="{FF2B5EF4-FFF2-40B4-BE49-F238E27FC236}">
-                <a16:creationId xmlns:a16="http://schemas.microsoft.com/office/drawing/2014/main" id="{D2587431-3788-4EB1-BE7F-072A4FA3AF46}"/>
-              </a:ext>
-            </a:extLst>
-          </p:cNvPr>
-          <p:cNvSpPr>
-            <a:spLocks noGrp="1"/>
-          </p:cNvSpPr>
-          <p:nvPr>
-            <p:ph type="title"/>
-          </p:nvPr>
-        </p:nvSpPr>
-        <p:spPr/>
-        <p:txBody>
-          <a:bodyPr/>
-          <a:lstStyle/>
-          <a:p>
-            <a:r>
-              <a:rPr lang="pt-BR" dirty="0"/>
-              <a:t>DIAGRAMA DE BLOCOS</a:t>
-            </a:r>
-          </a:p>
-        </p:txBody>
-      </p:sp>
-      <p:sp>
-        <p:nvSpPr>
-          <p:cNvPr id="5" name="Espaço Reservado para Rodapé 4">
-            <a:extLst>
-              <a:ext uri="{FF2B5EF4-FFF2-40B4-BE49-F238E27FC236}">
-                <a16:creationId xmlns:a16="http://schemas.microsoft.com/office/drawing/2014/main" id="{8ECB9C2D-4478-45CF-9486-69530DA50C59}"/>
-              </a:ext>
-            </a:extLst>
-          </p:cNvPr>
-          <p:cNvSpPr>
-            <a:spLocks noGrp="1"/>
-          </p:cNvSpPr>
-          <p:nvPr>
-            <p:ph type="ftr" sz="quarter" idx="11"/>
-          </p:nvPr>
-        </p:nvSpPr>
-        <p:spPr/>
-        <p:txBody>
-          <a:bodyPr/>
-          <a:lstStyle/>
-          <a:p>
-            <a:r>
-              <a:rPr lang="pt-BR" dirty="0"/>
-              <a:t>Byakugan: Visão Computacional</a:t>
-            </a:r>
-          </a:p>
-        </p:txBody>
-      </p:sp>
-    </p:spTree>
-    <p:extLst>
-      <p:ext uri="{BB962C8B-B14F-4D97-AF65-F5344CB8AC3E}">
-        <p14:creationId xmlns:p14="http://schemas.microsoft.com/office/powerpoint/2010/main" val="2788467585"/>
       </p:ext>
     </p:extLst>
   </p:cSld>

</xml_diff>

<commit_message>
Adicionado conteudo ao slide "solucoes similares" e as referencias dos artigos.
</commit_message>
<xml_diff>
--- a/Slide.pptx
+++ b/Slide.pptx
@@ -4609,80 +4609,128 @@
             <p:ph idx="1"/>
           </p:nvPr>
         </p:nvSpPr>
-        <p:spPr/>
-        <p:txBody>
-          <a:bodyPr/>
+        <p:spPr>
+          <a:xfrm>
+            <a:off x="1051143" y="1512473"/>
+            <a:ext cx="10515600" cy="4712962"/>
+          </a:xfrm>
+        </p:spPr>
+        <p:txBody>
+          <a:bodyPr>
+            <a:normAutofit lnSpcReduction="10000"/>
+          </a:bodyPr>
           <a:lstStyle/>
           <a:p>
             <a:r>
+              <a:rPr lang="pt-BR" sz="2700" dirty="0"/>
+              <a:t>EDNO, Francisco. </a:t>
+            </a:r>
+            <a:r>
+              <a:rPr lang="pt-BR" sz="2700" b="1" dirty="0"/>
+              <a:t>Tutoriais sobre ROS</a:t>
+            </a:r>
+            <a:r>
+              <a:rPr lang="pt-BR" sz="2700" dirty="0"/>
+              <a:t>. [</a:t>
+            </a:r>
+            <a:r>
+              <a:rPr lang="pt-BR" sz="2700" i="1" dirty="0"/>
+              <a:t>S. l.</a:t>
+            </a:r>
+            <a:r>
+              <a:rPr lang="pt-BR" sz="2700" dirty="0"/>
+              <a:t>], 14 dez. 2014. Disponível em: http://wiki.ros.org/</a:t>
+            </a:r>
+            <a:r>
+              <a:rPr lang="pt-BR" sz="2700" dirty="0" err="1"/>
+              <a:t>pt_BR</a:t>
+            </a:r>
+            <a:r>
+              <a:rPr lang="pt-BR" sz="2700" dirty="0"/>
+              <a:t>/ROS/</a:t>
+            </a:r>
+            <a:r>
+              <a:rPr lang="pt-BR" sz="2700" dirty="0" err="1"/>
+              <a:t>Tutorials</a:t>
+            </a:r>
+            <a:r>
+              <a:rPr lang="pt-BR" sz="2700" dirty="0"/>
+              <a:t>. Acesso em: 15 mar. 2019.</a:t>
+            </a:r>
+          </a:p>
+          <a:p>
+            <a:r>
+              <a:rPr lang="pt-BR" sz="2700" dirty="0"/>
+              <a:t>OPENCV DEV TEAM. </a:t>
+            </a:r>
+            <a:r>
+              <a:rPr lang="pt-BR" sz="2700" b="1" dirty="0" err="1"/>
+              <a:t>OpenCV</a:t>
+            </a:r>
+            <a:r>
+              <a:rPr lang="pt-BR" sz="2700" b="1" dirty="0"/>
+              <a:t> 2.4.13.7 </a:t>
+            </a:r>
+            <a:r>
+              <a:rPr lang="pt-BR" sz="2700" b="1" dirty="0" err="1"/>
+              <a:t>documentation</a:t>
+            </a:r>
+            <a:r>
+              <a:rPr lang="pt-BR" sz="2700" dirty="0"/>
+              <a:t>. [</a:t>
+            </a:r>
+            <a:r>
+              <a:rPr lang="pt-BR" sz="2700" i="1" dirty="0"/>
+              <a:t>S. l.</a:t>
+            </a:r>
+            <a:r>
+              <a:rPr lang="pt-BR" sz="2700" dirty="0"/>
+              <a:t>], 12 jul. 2018. Disponível em: https://docs.opencv.org/2.4.13.7/. Acesso em: 15 mar. 2019.</a:t>
+            </a:r>
+          </a:p>
+          <a:p>
+            <a:r>
+              <a:rPr lang="pt-BR" sz="2700" dirty="0"/>
+              <a:t>AMORIM, Junior Aguilar </a:t>
+            </a:r>
+            <a:r>
+              <a:rPr lang="pt-BR" sz="2700" i="1" dirty="0"/>
+              <a:t>et al</a:t>
+            </a:r>
+            <a:r>
+              <a:rPr lang="pt-BR" sz="2700" dirty="0"/>
+              <a:t>. IMPLEMENTAÇÃO DE UM ROBÔ PARA COMPETIÇÃO BASEADO EM VISÃO COMPUTACIONAL. </a:t>
+            </a:r>
+            <a:r>
+              <a:rPr lang="pt-BR" sz="2700" b="1" dirty="0"/>
+              <a:t>Anais da Mostra Nacional de Robótica</a:t>
+            </a:r>
+            <a:r>
+              <a:rPr lang="pt-BR" sz="2700" dirty="0"/>
+              <a:t>, http://www.mnr.org.br/, 2018.</a:t>
+            </a:r>
+          </a:p>
+          <a:p>
+            <a:r>
               <a:rPr lang="pt-BR" dirty="0"/>
-              <a:t>EDNO, Francisco. </a:t>
+              <a:t>ANDRADE, Beatriz </a:t>
+            </a:r>
+            <a:r>
+              <a:rPr lang="pt-BR" dirty="0" err="1"/>
+              <a:t>Trinchão</a:t>
+            </a:r>
+            <a:r>
+              <a:rPr lang="pt-BR" dirty="0"/>
+              <a:t>; MATOS, Leonardo Nogueira; FREIRE, Eduardo Oliveira. Um Sistema de Visão Computacional para Robôs Móveis. </a:t>
             </a:r>
             <a:r>
               <a:rPr lang="pt-BR" b="1" dirty="0"/>
-              <a:t>Tutoriais sobre ROS</a:t>
+              <a:t>Anais do XXVI Congresso da SBC</a:t>
             </a:r>
             <a:r>
               <a:rPr lang="pt-BR" dirty="0"/>
-              <a:t>. [</a:t>
-            </a:r>
-            <a:r>
-              <a:rPr lang="pt-BR" i="1" dirty="0"/>
-              <a:t>S. l.</a:t>
-            </a:r>
-            <a:r>
-              <a:rPr lang="pt-BR" dirty="0"/>
-              <a:t>], 14 dez. 2014. Disponível em: http://wiki.ros.org/</a:t>
-            </a:r>
-            <a:r>
-              <a:rPr lang="pt-BR" dirty="0" err="1"/>
-              <a:t>pt_BR</a:t>
-            </a:r>
-            <a:r>
-              <a:rPr lang="pt-BR" dirty="0"/>
-              <a:t>/ROS/</a:t>
-            </a:r>
-            <a:r>
-              <a:rPr lang="pt-BR" dirty="0" err="1"/>
-              <a:t>Tutorials</a:t>
-            </a:r>
-            <a:r>
-              <a:rPr lang="pt-BR" dirty="0"/>
-              <a:t>. Acesso em: 15 mar. 2019.</a:t>
-            </a:r>
-          </a:p>
-          <a:p>
-            <a:r>
-              <a:rPr lang="pt-BR" dirty="0"/>
-              <a:t>OPENCV DEV TEAM. </a:t>
-            </a:r>
-            <a:r>
-              <a:rPr lang="pt-BR" b="1" dirty="0" err="1"/>
-              <a:t>OpenCV</a:t>
-            </a:r>
-            <a:r>
-              <a:rPr lang="pt-BR" b="1" dirty="0"/>
-              <a:t> 2.4.13.7 </a:t>
-            </a:r>
-            <a:r>
-              <a:rPr lang="pt-BR" b="1" dirty="0" err="1"/>
-              <a:t>documentation</a:t>
-            </a:r>
-            <a:r>
-              <a:rPr lang="pt-BR" dirty="0"/>
-              <a:t>. [</a:t>
-            </a:r>
-            <a:r>
-              <a:rPr lang="pt-BR" i="1" dirty="0"/>
-              <a:t>S. l.</a:t>
-            </a:r>
-            <a:r>
-              <a:rPr lang="pt-BR" dirty="0"/>
-              <a:t>], 12 jul. 2018. Disponível em: https://docs.opencv.org/2.4.13.7/. Acesso em: 15 mar. 2019.</a:t>
-            </a:r>
-          </a:p>
-          <a:p>
-            <a:endParaRPr lang="pt-BR" dirty="0"/>
+              <a:t>, http://wcga.lncc.br/, janeiro 2006.</a:t>
+            </a:r>
           </a:p>
         </p:txBody>
       </p:sp>
@@ -5719,12 +5767,24 @@
             <p:ph idx="1"/>
           </p:nvPr>
         </p:nvSpPr>
-        <p:spPr/>
-        <p:txBody>
-          <a:bodyPr/>
+        <p:spPr>
+          <a:xfrm>
+            <a:off x="838199" y="1825627"/>
+            <a:ext cx="4114800" cy="917574"/>
+          </a:xfrm>
+        </p:spPr>
+        <p:txBody>
+          <a:bodyPr>
+            <a:noAutofit/>
+          </a:bodyPr>
           <a:lstStyle/>
           <a:p>
-            <a:endParaRPr lang="pt-BR" dirty="0"/>
+            <a:r>
+              <a:rPr lang="pt-BR" sz="2000" b="1" dirty="0">
+                <a:cs typeface="Arial" panose="020B0604020202020204" pitchFamily="34" charset="0"/>
+              </a:rPr>
+              <a:t>IMPLEMENTAÇÃO DE UM ROBÔ PARA OBR BASEADO EM VISÃO COMPUTACIONAL </a:t>
+            </a:r>
           </a:p>
         </p:txBody>
       </p:sp>
@@ -5813,6 +5873,117 @@
           </a:p>
         </p:txBody>
       </p:sp>
+      <p:pic>
+        <p:nvPicPr>
+          <p:cNvPr id="7" name="Imagem 6" descr="Uma imagem contendo chão, interior&#10;&#10;Descrição gerada com muito alta confiança">
+            <a:extLst>
+              <a:ext uri="{FF2B5EF4-FFF2-40B4-BE49-F238E27FC236}">
+                <a16:creationId xmlns:a16="http://schemas.microsoft.com/office/drawing/2014/main" id="{9EF9418B-7B5D-4092-AD48-EA65F586D3CF}"/>
+              </a:ext>
+            </a:extLst>
+          </p:cNvPr>
+          <p:cNvPicPr>
+            <a:picLocks noChangeAspect="1"/>
+          </p:cNvPicPr>
+          <p:nvPr/>
+        </p:nvPicPr>
+        <p:blipFill>
+          <a:blip r:embed="rId2">
+            <a:extLst>
+              <a:ext uri="{28A0092B-C50C-407E-A947-70E740481C1C}">
+                <a14:useLocalDpi xmlns:a14="http://schemas.microsoft.com/office/drawing/2010/main" val="0"/>
+              </a:ext>
+            </a:extLst>
+          </a:blip>
+          <a:stretch>
+            <a:fillRect/>
+          </a:stretch>
+        </p:blipFill>
+        <p:spPr>
+          <a:xfrm>
+            <a:off x="1002616" y="2917661"/>
+            <a:ext cx="3159115" cy="2394277"/>
+          </a:xfrm>
+          <a:prstGeom prst="rect">
+            <a:avLst/>
+          </a:prstGeom>
+        </p:spPr>
+      </p:pic>
+      <p:sp>
+        <p:nvSpPr>
+          <p:cNvPr id="8" name="CaixaDeTexto 7">
+            <a:extLst>
+              <a:ext uri="{FF2B5EF4-FFF2-40B4-BE49-F238E27FC236}">
+                <a16:creationId xmlns:a16="http://schemas.microsoft.com/office/drawing/2014/main" id="{F82AB182-A500-4722-B477-74068A570B22}"/>
+              </a:ext>
+            </a:extLst>
+          </p:cNvPr>
+          <p:cNvSpPr txBox="1"/>
+          <p:nvPr/>
+        </p:nvSpPr>
+        <p:spPr>
+          <a:xfrm>
+            <a:off x="5456131" y="1776582"/>
+            <a:ext cx="4114800" cy="1015663"/>
+          </a:xfrm>
+          <a:prstGeom prst="rect">
+            <a:avLst/>
+          </a:prstGeom>
+          <a:noFill/>
+        </p:spPr>
+        <p:txBody>
+          <a:bodyPr wrap="square" rtlCol="0">
+            <a:spAutoFit/>
+          </a:bodyPr>
+          <a:lstStyle/>
+          <a:p>
+            <a:pPr marL="342900" indent="-342900">
+              <a:buFont typeface="Arial" panose="020B0604020202020204" pitchFamily="34" charset="0"/>
+              <a:buChar char="•"/>
+            </a:pPr>
+            <a:r>
+              <a:rPr lang="pt-BR" sz="2000" b="1" dirty="0"/>
+              <a:t>UM SISTEMA DE VISÃO COMPUTACIONAL PARA ROBÔS MÓVEIS</a:t>
+            </a:r>
+          </a:p>
+        </p:txBody>
+      </p:sp>
+      <p:pic>
+        <p:nvPicPr>
+          <p:cNvPr id="10" name="Imagem 9">
+            <a:extLst>
+              <a:ext uri="{FF2B5EF4-FFF2-40B4-BE49-F238E27FC236}">
+                <a16:creationId xmlns:a16="http://schemas.microsoft.com/office/drawing/2014/main" id="{42128860-5F73-418B-BC46-5C9BC8D23629}"/>
+              </a:ext>
+            </a:extLst>
+          </p:cNvPr>
+          <p:cNvPicPr>
+            <a:picLocks noChangeAspect="1"/>
+          </p:cNvPicPr>
+          <p:nvPr/>
+        </p:nvPicPr>
+        <p:blipFill>
+          <a:blip r:embed="rId3">
+            <a:extLst>
+              <a:ext uri="{28A0092B-C50C-407E-A947-70E740481C1C}">
+                <a14:useLocalDpi xmlns:a14="http://schemas.microsoft.com/office/drawing/2010/main" val="0"/>
+              </a:ext>
+            </a:extLst>
+          </a:blip>
+          <a:stretch>
+            <a:fillRect/>
+          </a:stretch>
+        </p:blipFill>
+        <p:spPr>
+          <a:xfrm>
+            <a:off x="5680725" y="2917661"/>
+            <a:ext cx="5508659" cy="2394277"/>
+          </a:xfrm>
+          <a:prstGeom prst="rect">
+            <a:avLst/>
+          </a:prstGeom>
+        </p:spPr>
+      </p:pic>
     </p:spTree>
     <p:extLst>
       <p:ext uri="{BB962C8B-B14F-4D97-AF65-F5344CB8AC3E}">
@@ -5957,8 +6128,8 @@
         </p:blipFill>
         <p:spPr bwMode="auto">
           <a:xfrm>
-            <a:off x="1300775" y="1607724"/>
-            <a:ext cx="2110946" cy="2110946"/>
+            <a:off x="709790" y="1676594"/>
+            <a:ext cx="1561361" cy="1561361"/>
           </a:xfrm>
           <a:prstGeom prst="rect">
             <a:avLst/>
@@ -6004,8 +6175,8 @@
         </p:blipFill>
         <p:spPr bwMode="auto">
           <a:xfrm>
-            <a:off x="1482014" y="4390860"/>
-            <a:ext cx="1748467" cy="1965490"/>
+            <a:off x="795991" y="4203487"/>
+            <a:ext cx="1388961" cy="1561361"/>
           </a:xfrm>
           <a:prstGeom prst="rect">
             <a:avLst/>
@@ -6051,7 +6222,7 @@
         </p:blipFill>
         <p:spPr bwMode="auto">
           <a:xfrm>
-            <a:off x="7709614" y="2116776"/>
+            <a:off x="4883125" y="2073822"/>
             <a:ext cx="3181611" cy="847601"/>
           </a:xfrm>
           <a:prstGeom prst="rect">
@@ -6098,7 +6269,7 @@
         </p:blipFill>
         <p:spPr bwMode="auto">
           <a:xfrm>
-            <a:off x="4703880" y="4630943"/>
+            <a:off x="3022759" y="4360377"/>
             <a:ext cx="2031682" cy="1382673"/>
           </a:xfrm>
           <a:prstGeom prst="rect">
@@ -6145,7 +6316,7 @@
         </p:blipFill>
         <p:spPr bwMode="auto">
           <a:xfrm>
-            <a:off x="4452876" y="1535720"/>
+            <a:off x="2520750" y="1306920"/>
             <a:ext cx="2533691" cy="2254954"/>
           </a:xfrm>
           <a:prstGeom prst="rect">
@@ -6192,8 +6363,102 @@
         </p:blipFill>
         <p:spPr bwMode="auto">
           <a:xfrm>
-            <a:off x="8208961" y="3510798"/>
+            <a:off x="5585254" y="3584752"/>
             <a:ext cx="2110946" cy="2600310"/>
+          </a:xfrm>
+          <a:prstGeom prst="rect">
+            <a:avLst/>
+          </a:prstGeom>
+          <a:noFill/>
+          <a:extLst>
+            <a:ext uri="{909E8E84-426E-40DD-AFC4-6F175D3DCCD1}">
+              <a14:hiddenFill xmlns:a14="http://schemas.microsoft.com/office/drawing/2010/main">
+                <a:solidFill>
+                  <a:srgbClr val="FFFFFF"/>
+                </a:solidFill>
+              </a14:hiddenFill>
+            </a:ext>
+          </a:extLst>
+        </p:spPr>
+      </p:pic>
+      <p:pic>
+        <p:nvPicPr>
+          <p:cNvPr id="1028" name="Picture 4" descr="Resultado de imagem para github icon png">
+            <a:extLst>
+              <a:ext uri="{FF2B5EF4-FFF2-40B4-BE49-F238E27FC236}">
+                <a16:creationId xmlns:a16="http://schemas.microsoft.com/office/drawing/2014/main" id="{DDD1588A-86F6-4FD0-A6EA-61C8410E7974}"/>
+              </a:ext>
+            </a:extLst>
+          </p:cNvPr>
+          <p:cNvPicPr>
+            <a:picLocks noChangeAspect="1" noChangeArrowheads="1"/>
+          </p:cNvPicPr>
+          <p:nvPr/>
+        </p:nvPicPr>
+        <p:blipFill>
+          <a:blip r:embed="rId8">
+            <a:extLst>
+              <a:ext uri="{28A0092B-C50C-407E-A947-70E740481C1C}">
+                <a14:useLocalDpi xmlns:a14="http://schemas.microsoft.com/office/drawing/2010/main" val="0"/>
+              </a:ext>
+            </a:extLst>
+          </a:blip>
+          <a:srcRect/>
+          <a:stretch>
+            <a:fillRect/>
+          </a:stretch>
+        </p:blipFill>
+        <p:spPr bwMode="auto">
+          <a:xfrm>
+            <a:off x="7643382" y="4024521"/>
+            <a:ext cx="4677636" cy="1733844"/>
+          </a:xfrm>
+          <a:prstGeom prst="rect">
+            <a:avLst/>
+          </a:prstGeom>
+          <a:noFill/>
+          <a:extLst>
+            <a:ext uri="{909E8E84-426E-40DD-AFC4-6F175D3DCCD1}">
+              <a14:hiddenFill xmlns:a14="http://schemas.microsoft.com/office/drawing/2010/main">
+                <a:solidFill>
+                  <a:srgbClr val="FFFFFF"/>
+                </a:solidFill>
+              </a14:hiddenFill>
+            </a:ext>
+          </a:extLst>
+        </p:spPr>
+      </p:pic>
+      <p:pic>
+        <p:nvPicPr>
+          <p:cNvPr id="1030" name="Picture 6" descr="Resultado de imagem para trello icon png">
+            <a:extLst>
+              <a:ext uri="{FF2B5EF4-FFF2-40B4-BE49-F238E27FC236}">
+                <a16:creationId xmlns:a16="http://schemas.microsoft.com/office/drawing/2014/main" id="{3A73D4D6-2B95-4F4C-998C-CD2F1492F5F0}"/>
+              </a:ext>
+            </a:extLst>
+          </p:cNvPr>
+          <p:cNvPicPr>
+            <a:picLocks noChangeAspect="1" noChangeArrowheads="1"/>
+          </p:cNvPicPr>
+          <p:nvPr/>
+        </p:nvPicPr>
+        <p:blipFill>
+          <a:blip r:embed="rId9">
+            <a:extLst>
+              <a:ext uri="{28A0092B-C50C-407E-A947-70E740481C1C}">
+                <a14:useLocalDpi xmlns:a14="http://schemas.microsoft.com/office/drawing/2010/main" val="0"/>
+              </a:ext>
+            </a:extLst>
+          </a:blip>
+          <a:srcRect/>
+          <a:stretch>
+            <a:fillRect/>
+          </a:stretch>
+        </p:blipFill>
+        <p:spPr bwMode="auto">
+          <a:xfrm>
+            <a:off x="8294840" y="2073822"/>
+            <a:ext cx="3374720" cy="1037024"/>
           </a:xfrm>
           <a:prstGeom prst="rect">
             <a:avLst/>

</xml_diff>

<commit_message>
ALTERAÇOES DE ORGANIZAÇÃO DE SLIDE
</commit_message>
<xml_diff>
--- a/Slide.pptx
+++ b/Slide.pptx
@@ -12,9 +12,9 @@
     <p:sldId id="257" r:id="rId3"/>
     <p:sldId id="258" r:id="rId4"/>
     <p:sldId id="259" r:id="rId5"/>
-    <p:sldId id="267" r:id="rId6"/>
-    <p:sldId id="260" r:id="rId7"/>
-    <p:sldId id="262" r:id="rId8"/>
+    <p:sldId id="260" r:id="rId6"/>
+    <p:sldId id="262" r:id="rId7"/>
+    <p:sldId id="267" r:id="rId8"/>
     <p:sldId id="261" r:id="rId9"/>
     <p:sldId id="264" r:id="rId10"/>
     <p:sldId id="265" r:id="rId11"/>
@@ -220,7 +220,7 @@
           <a:p>
             <a:fld id="{355DB5B6-2099-4182-8370-BE40CE79ECA1}" type="datetimeFigureOut">
               <a:rPr lang="pt-BR" smtClean="0"/>
-              <a:t>16/04/2019</a:t>
+              <a:t>19/04/2019</a:t>
             </a:fld>
             <a:endParaRPr lang="pt-BR"/>
           </a:p>
@@ -1064,7 +1064,7 @@
           <a:p>
             <a:fld id="{4539A389-483A-4E9F-9AAB-6D6A3D56DCF6}" type="datetime1">
               <a:rPr lang="pt-BR" smtClean="0"/>
-              <a:t>16/04/2019</a:t>
+              <a:t>19/04/2019</a:t>
             </a:fld>
             <a:endParaRPr lang="pt-BR"/>
           </a:p>
@@ -1272,7 +1272,7 @@
           <a:p>
             <a:fld id="{FF985126-5AE9-4104-BD84-FF9EDB02A973}" type="datetime1">
               <a:rPr lang="pt-BR" smtClean="0"/>
-              <a:t>16/04/2019</a:t>
+              <a:t>19/04/2019</a:t>
             </a:fld>
             <a:endParaRPr lang="pt-BR"/>
           </a:p>
@@ -1442,7 +1442,7 @@
           <a:p>
             <a:fld id="{C346E3E3-2072-42D8-AE5D-F06D0424005B}" type="datetime1">
               <a:rPr lang="pt-BR" smtClean="0"/>
-              <a:t>16/04/2019</a:t>
+              <a:t>19/04/2019</a:t>
             </a:fld>
             <a:endParaRPr lang="pt-BR"/>
           </a:p>
@@ -1759,7 +1759,7 @@
           <a:p>
             <a:fld id="{E19C2350-4C2B-4882-8B71-1D519621A934}" type="datetime1">
               <a:rPr lang="pt-BR" smtClean="0"/>
-              <a:t>16/04/2019</a:t>
+              <a:t>19/04/2019</a:t>
             </a:fld>
             <a:endParaRPr lang="pt-BR"/>
           </a:p>
@@ -2071,7 +2071,7 @@
           <a:p>
             <a:fld id="{62C1FAA8-89AE-4E7D-A200-C08DFE01393F}" type="datetime1">
               <a:rPr lang="pt-BR" smtClean="0"/>
-              <a:t>16/04/2019</a:t>
+              <a:t>19/04/2019</a:t>
             </a:fld>
             <a:endParaRPr lang="pt-BR"/>
           </a:p>
@@ -2483,7 +2483,7 @@
           <a:p>
             <a:fld id="{48AFFE0E-9767-4588-A361-7E006DEE2CC4}" type="datetime1">
               <a:rPr lang="pt-BR" smtClean="0"/>
-              <a:t>16/04/2019</a:t>
+              <a:t>19/04/2019</a:t>
             </a:fld>
             <a:endParaRPr lang="pt-BR"/>
           </a:p>
@@ -2624,7 +2624,7 @@
           <a:p>
             <a:fld id="{D14657F0-A892-42D8-9C26-D1730EC81330}" type="datetime1">
               <a:rPr lang="pt-BR" smtClean="0"/>
-              <a:t>16/04/2019</a:t>
+              <a:t>19/04/2019</a:t>
             </a:fld>
             <a:endParaRPr lang="pt-BR"/>
           </a:p>
@@ -2737,7 +2737,7 @@
           <a:p>
             <a:fld id="{B4972C2A-9C12-4B5C-8BB0-8A51A2CBCCE7}" type="datetime1">
               <a:rPr lang="pt-BR" smtClean="0"/>
-              <a:t>16/04/2019</a:t>
+              <a:t>19/04/2019</a:t>
             </a:fld>
             <a:endParaRPr lang="pt-BR"/>
           </a:p>
@@ -3048,7 +3048,7 @@
           <a:p>
             <a:fld id="{0B0607DD-BDC6-4187-96EB-482D6E26C5A4}" type="datetime1">
               <a:rPr lang="pt-BR" smtClean="0"/>
-              <a:t>16/04/2019</a:t>
+              <a:t>19/04/2019</a:t>
             </a:fld>
             <a:endParaRPr lang="pt-BR"/>
           </a:p>
@@ -3336,7 +3336,7 @@
           <a:p>
             <a:fld id="{F412D6E7-6296-4A22-98F7-939D137D1CF6}" type="datetime1">
               <a:rPr lang="pt-BR" smtClean="0"/>
-              <a:t>16/04/2019</a:t>
+              <a:t>19/04/2019</a:t>
             </a:fld>
             <a:endParaRPr lang="pt-BR"/>
           </a:p>
@@ -3959,7 +3959,7 @@
           <a:p>
             <a:fld id="{55887BB8-E30A-4046-95CD-0643E512C401}" type="datetime1">
               <a:rPr lang="pt-BR" smtClean="0"/>
-              <a:t>16/04/2019</a:t>
+              <a:t>19/04/2019</a:t>
             </a:fld>
             <a:endParaRPr lang="pt-BR"/>
           </a:p>
@@ -4758,30 +4758,26 @@
               <a:t>et al</a:t>
             </a:r>
             <a:r>
+              <a:rPr lang="pt-BR" sz="2700" b="1" dirty="0"/>
+              <a:t>. Implementação de um robô para competição baseado em visão computacional</a:t>
+            </a:r>
+            <a:r>
               <a:rPr lang="pt-BR" sz="2700" dirty="0"/>
-              <a:t>. IMPLEMENTAÇÃO DE UM ROBÔ PARA COMPETIÇÃO BASEADO EM VISÃO COMPUTACIONAL. </a:t>
-            </a:r>
-            <a:r>
-              <a:rPr lang="pt-BR" sz="2700" b="1" dirty="0"/>
-              <a:t>Anais da Mostra Nacional de Robótica</a:t>
-            </a:r>
-            <a:r>
-              <a:rPr lang="pt-BR" sz="2700" dirty="0"/>
-              <a:t>, http://www.mnr.org.br/, 2018.</a:t>
+              <a:t>. Anais da Mostra Nacional de Robótica, http://www.mnr.org.br/, 2018.</a:t>
             </a:r>
           </a:p>
           <a:p>
             <a:r>
               <a:rPr lang="pt-BR" dirty="0"/>
-              <a:t>MARINATO, Gabriela P. ; SOARES, Joyce A. P.; AMARAL, Eduardo M. A. SISTEMA DE DETECÇÃO E RESGATE DE VÍTIMA PARA UM ROBÔ AUTÔNOMO SEGUIDOR DE LINHA BASEADO EM VISÃO COMPUTACIONAL. </a:t>
+              <a:t>MARINATO, Gabriela P. ; SOARES, Joyce A. P.; AMARAL, Eduardo M. A. </a:t>
             </a:r>
             <a:r>
               <a:rPr lang="pt-BR" b="1" dirty="0"/>
-              <a:t>Mostra Nacional de Robótica (MNR) </a:t>
+              <a:t>Sistema de detecção e resgate de vítima para um robô autônomo seguidor de linha baseado em visão computacional</a:t>
             </a:r>
             <a:r>
               <a:rPr lang="pt-BR" dirty="0"/>
-              <a:t>, Serra - ES - Brasil, 2017. Disponível em: http://sistemaolimpo.org. Acesso em: 16 abr. 2019.</a:t>
+              <a:t>. Mostra Nacional de Robótica (MNR) , Serra - ES - Brasil, 2017. Disponível em: http://sistemaolimpo.org. Acesso em: 16 abr. 2019.</a:t>
             </a:r>
           </a:p>
         </p:txBody>
@@ -5463,19 +5459,19 @@
           <a:p>
             <a:r>
               <a:rPr lang="pt-BR" dirty="0"/>
-              <a:t>Difícil acesso em áreas de desastre;</a:t>
+              <a:t>Complexidade do acesso a áreas de desastre;</a:t>
+            </a:r>
+          </a:p>
+          <a:p>
+            <a:r>
+              <a:rPr lang="pt-BR" dirty="0"/>
+              <a:t>Risco mútuo (resgatadores correm risco);</a:t>
             </a:r>
           </a:p>
           <a:p>
             <a:r>
               <a:rPr lang="pt-BR" dirty="0"/>
               <a:t>Poucos equipamentos precisos que identifiquem vítimas;</a:t>
-            </a:r>
-          </a:p>
-          <a:p>
-            <a:r>
-              <a:rPr lang="pt-BR" dirty="0"/>
-              <a:t>Risco mútuo (resgatadores correm risco);</a:t>
             </a:r>
           </a:p>
         </p:txBody>
@@ -5787,12 +5783,6 @@
             <a:r>
               <a:rPr lang="pt-BR" dirty="0"/>
               <a:t>Objetivo geral:</a:t>
-            </a:r>
-          </a:p>
-          <a:p>
-            <a:r>
-              <a:rPr lang="pt-BR" sz="2000" dirty="0"/>
-              <a:t>Complexidade do acesso a áreas de desastre;</a:t>
             </a:r>
           </a:p>
           <a:p>
@@ -5918,7 +5908,7 @@
           <p:cNvPr id="2" name="Espaço Reservado para Conteúdo 1">
             <a:extLst>
               <a:ext uri="{FF2B5EF4-FFF2-40B4-BE49-F238E27FC236}">
-                <a16:creationId xmlns:a16="http://schemas.microsoft.com/office/drawing/2014/main" id="{42C16D62-E4F4-4D6E-9D13-862B9469A03E}"/>
+                <a16:creationId xmlns:a16="http://schemas.microsoft.com/office/drawing/2014/main" id="{9B176969-9450-481C-9497-E3EA97AC4250}"/>
               </a:ext>
             </a:extLst>
           </p:cNvPr>
@@ -5929,77 +5919,33 @@
             <p:ph idx="1"/>
           </p:nvPr>
         </p:nvSpPr>
-        <p:spPr/>
-        <p:txBody>
-          <a:bodyPr/>
+        <p:spPr>
+          <a:xfrm>
+            <a:off x="838198" y="1406963"/>
+            <a:ext cx="4114800" cy="917574"/>
+          </a:xfrm>
+        </p:spPr>
+        <p:txBody>
+          <a:bodyPr>
+            <a:noAutofit/>
+          </a:bodyPr>
           <a:lstStyle/>
           <a:p>
             <a:r>
-              <a:rPr lang="pt-BR" sz="3600" dirty="0"/>
-              <a:t>Programação estruturada e orientada a objetos;</a:t>
-            </a:r>
-          </a:p>
-          <a:p>
-            <a:r>
-              <a:rPr lang="pt-BR" sz="3600" dirty="0"/>
-              <a:t>Eletrônica analógica e digital;</a:t>
-            </a:r>
-          </a:p>
-          <a:p>
-            <a:r>
-              <a:rPr lang="pt-BR" sz="3600" dirty="0"/>
-              <a:t>Fundamentos de lógica e algoritmo;</a:t>
-            </a:r>
-          </a:p>
-          <a:p>
-            <a:r>
-              <a:rPr lang="pt-BR" sz="3600" dirty="0"/>
-              <a:t>Matemática;</a:t>
-            </a:r>
-          </a:p>
-          <a:p>
-            <a:endParaRPr lang="pt-BR" dirty="0"/>
-          </a:p>
-        </p:txBody>
-      </p:sp>
-      <p:sp>
-        <p:nvSpPr>
-          <p:cNvPr id="3" name="Espaço Reservado para Rodapé 2">
-            <a:extLst>
-              <a:ext uri="{FF2B5EF4-FFF2-40B4-BE49-F238E27FC236}">
-                <a16:creationId xmlns:a16="http://schemas.microsoft.com/office/drawing/2014/main" id="{75D1B8D1-7B2A-4F21-BCEF-C6AA443A529B}"/>
-              </a:ext>
-            </a:extLst>
-          </p:cNvPr>
-          <p:cNvSpPr>
-            <a:spLocks noGrp="1"/>
-          </p:cNvSpPr>
-          <p:nvPr>
-            <p:ph type="ftr" sz="quarter" idx="11"/>
-          </p:nvPr>
-        </p:nvSpPr>
-        <p:spPr/>
-        <p:txBody>
-          <a:bodyPr/>
-          <a:lstStyle/>
-          <a:p>
-            <a:r>
-              <a:rPr lang="pt-BR" dirty="0" err="1"/>
-              <a:t>Byakugan</a:t>
-            </a:r>
-            <a:r>
-              <a:rPr lang="pt-BR" dirty="0"/>
-              <a:t>: Visão Computacional</a:t>
-            </a:r>
-          </a:p>
-        </p:txBody>
-      </p:sp>
-      <p:sp>
-        <p:nvSpPr>
-          <p:cNvPr id="4" name="Espaço Reservado para Número de Slide 3">
-            <a:extLst>
-              <a:ext uri="{FF2B5EF4-FFF2-40B4-BE49-F238E27FC236}">
-                <a16:creationId xmlns:a16="http://schemas.microsoft.com/office/drawing/2014/main" id="{CBDD1A5A-0080-4215-9BFF-DB5F86754687}"/>
+              <a:rPr lang="pt-BR" sz="2000" dirty="0">
+                <a:cs typeface="Arial" panose="020B0604020202020204" pitchFamily="34" charset="0"/>
+              </a:rPr>
+              <a:t>IMPLEMENTAÇÃO DE UM ROBÔ PARA OBR BASEADO EM VISÃO COMPUTACIONAL </a:t>
+            </a:r>
+          </a:p>
+        </p:txBody>
+      </p:sp>
+      <p:sp>
+        <p:nvSpPr>
+          <p:cNvPr id="3" name="Espaço Reservado para Número de Slide 2">
+            <a:extLst>
+              <a:ext uri="{FF2B5EF4-FFF2-40B4-BE49-F238E27FC236}">
+                <a16:creationId xmlns:a16="http://schemas.microsoft.com/office/drawing/2014/main" id="{D0D742AF-C764-436B-8667-282022DBEB2D}"/>
               </a:ext>
             </a:extLst>
           </p:cNvPr>
@@ -6025,10 +5971,10 @@
       </p:sp>
       <p:sp>
         <p:nvSpPr>
-          <p:cNvPr id="5" name="Título 4">
-            <a:extLst>
-              <a:ext uri="{FF2B5EF4-FFF2-40B4-BE49-F238E27FC236}">
-                <a16:creationId xmlns:a16="http://schemas.microsoft.com/office/drawing/2014/main" id="{1566DED6-B701-41ED-84A3-B6543908B6EE}"/>
+          <p:cNvPr id="4" name="Título 3">
+            <a:extLst>
+              <a:ext uri="{FF2B5EF4-FFF2-40B4-BE49-F238E27FC236}">
+                <a16:creationId xmlns:a16="http://schemas.microsoft.com/office/drawing/2014/main" id="{D2587431-3788-4EB1-BE7F-072A4FA3AF46}"/>
               </a:ext>
             </a:extLst>
           </p:cNvPr>
@@ -6046,15 +5992,148 @@
           <a:p>
             <a:r>
               <a:rPr lang="pt-BR" dirty="0"/>
-              <a:t>Disciplinas Integradas</a:t>
-            </a:r>
-          </a:p>
-        </p:txBody>
-      </p:sp>
+              <a:t>SOLUÇÕES SIMILARES</a:t>
+            </a:r>
+          </a:p>
+        </p:txBody>
+      </p:sp>
+      <p:sp>
+        <p:nvSpPr>
+          <p:cNvPr id="5" name="Espaço Reservado para Rodapé 4">
+            <a:extLst>
+              <a:ext uri="{FF2B5EF4-FFF2-40B4-BE49-F238E27FC236}">
+                <a16:creationId xmlns:a16="http://schemas.microsoft.com/office/drawing/2014/main" id="{8ECB9C2D-4478-45CF-9486-69530DA50C59}"/>
+              </a:ext>
+            </a:extLst>
+          </p:cNvPr>
+          <p:cNvSpPr>
+            <a:spLocks noGrp="1"/>
+          </p:cNvSpPr>
+          <p:nvPr>
+            <p:ph type="ftr" sz="quarter" idx="11"/>
+          </p:nvPr>
+        </p:nvSpPr>
+        <p:spPr/>
+        <p:txBody>
+          <a:bodyPr/>
+          <a:lstStyle/>
+          <a:p>
+            <a:r>
+              <a:rPr lang="pt-BR" dirty="0"/>
+              <a:t>Byakugan: Visão Computacional</a:t>
+            </a:r>
+          </a:p>
+        </p:txBody>
+      </p:sp>
+      <p:pic>
+        <p:nvPicPr>
+          <p:cNvPr id="7" name="Imagem 6" descr="Uma imagem contendo chão, interior&#10;&#10;Descrição gerada com muito alta confiança">
+            <a:extLst>
+              <a:ext uri="{FF2B5EF4-FFF2-40B4-BE49-F238E27FC236}">
+                <a16:creationId xmlns:a16="http://schemas.microsoft.com/office/drawing/2014/main" id="{9EF9418B-7B5D-4092-AD48-EA65F586D3CF}"/>
+              </a:ext>
+            </a:extLst>
+          </p:cNvPr>
+          <p:cNvPicPr>
+            <a:picLocks noChangeAspect="1"/>
+          </p:cNvPicPr>
+          <p:nvPr/>
+        </p:nvPicPr>
+        <p:blipFill>
+          <a:blip r:embed="rId2">
+            <a:extLst>
+              <a:ext uri="{28A0092B-C50C-407E-A947-70E740481C1C}">
+                <a14:useLocalDpi xmlns:a14="http://schemas.microsoft.com/office/drawing/2010/main" val="0"/>
+              </a:ext>
+            </a:extLst>
+          </a:blip>
+          <a:stretch>
+            <a:fillRect/>
+          </a:stretch>
+        </p:blipFill>
+        <p:spPr>
+          <a:xfrm>
+            <a:off x="838198" y="2761763"/>
+            <a:ext cx="4165959" cy="3157359"/>
+          </a:xfrm>
+          <a:prstGeom prst="rect">
+            <a:avLst/>
+          </a:prstGeom>
+        </p:spPr>
+      </p:pic>
+      <p:sp>
+        <p:nvSpPr>
+          <p:cNvPr id="8" name="CaixaDeTexto 7">
+            <a:extLst>
+              <a:ext uri="{FF2B5EF4-FFF2-40B4-BE49-F238E27FC236}">
+                <a16:creationId xmlns:a16="http://schemas.microsoft.com/office/drawing/2014/main" id="{F82AB182-A500-4722-B477-74068A570B22}"/>
+              </a:ext>
+            </a:extLst>
+          </p:cNvPr>
+          <p:cNvSpPr txBox="1"/>
+          <p:nvPr/>
+        </p:nvSpPr>
+        <p:spPr>
+          <a:xfrm>
+            <a:off x="6096000" y="1323330"/>
+            <a:ext cx="4114800" cy="1631216"/>
+          </a:xfrm>
+          <a:prstGeom prst="rect">
+            <a:avLst/>
+          </a:prstGeom>
+          <a:noFill/>
+        </p:spPr>
+        <p:txBody>
+          <a:bodyPr wrap="square" rtlCol="0">
+            <a:spAutoFit/>
+          </a:bodyPr>
+          <a:lstStyle/>
+          <a:p>
+            <a:pPr marL="342900" indent="-342900">
+              <a:buFont typeface="Arial" panose="020B0604020202020204" pitchFamily="34" charset="0"/>
+              <a:buChar char="•"/>
+            </a:pPr>
+            <a:r>
+              <a:rPr lang="pt-BR" sz="2000" dirty="0"/>
+              <a:t>SISTEMA DE DETECÇÃO E RESGATE DE VÍTIMA PARA UM ROBÔ AUTÔNOMO SEGUIDOR DE LINHA BASEADO EM VISÃO COMPUTACIONAL </a:t>
+            </a:r>
+          </a:p>
+        </p:txBody>
+      </p:sp>
+      <p:pic>
+        <p:nvPicPr>
+          <p:cNvPr id="6" name="Imagem 5">
+            <a:extLst>
+              <a:ext uri="{FF2B5EF4-FFF2-40B4-BE49-F238E27FC236}">
+                <a16:creationId xmlns:a16="http://schemas.microsoft.com/office/drawing/2014/main" id="{79D6B788-BB10-48DD-999B-7EE7634367F2}"/>
+              </a:ext>
+            </a:extLst>
+          </p:cNvPr>
+          <p:cNvPicPr>
+            <a:picLocks noChangeAspect="1"/>
+          </p:cNvPicPr>
+          <p:nvPr/>
+        </p:nvPicPr>
+        <p:blipFill>
+          <a:blip r:embed="rId3"/>
+          <a:stretch>
+            <a:fillRect/>
+          </a:stretch>
+        </p:blipFill>
+        <p:spPr>
+          <a:xfrm>
+            <a:off x="6096000" y="3011746"/>
+            <a:ext cx="3714750" cy="2907376"/>
+          </a:xfrm>
+          <a:prstGeom prst="rect">
+            <a:avLst/>
+          </a:prstGeom>
+        </p:spPr>
+      </p:pic>
     </p:spTree>
     <p:extLst>
       <p:ext uri="{BB962C8B-B14F-4D97-AF65-F5344CB8AC3E}">
-        <p14:creationId xmlns:p14="http://schemas.microsoft.com/office/powerpoint/2010/main" val="1225811333"/>
+        <p14:creationId xmlns:p14="http://schemas.microsoft.com/office/powerpoint/2010/main" val="3357810014"/>
       </p:ext>
     </p:extLst>
   </p:cSld>
@@ -6083,43 +6162,6 @@
       </p:grpSpPr>
       <p:sp>
         <p:nvSpPr>
-          <p:cNvPr id="2" name="Espaço Reservado para Conteúdo 1">
-            <a:extLst>
-              <a:ext uri="{FF2B5EF4-FFF2-40B4-BE49-F238E27FC236}">
-                <a16:creationId xmlns:a16="http://schemas.microsoft.com/office/drawing/2014/main" id="{9B176969-9450-481C-9497-E3EA97AC4250}"/>
-              </a:ext>
-            </a:extLst>
-          </p:cNvPr>
-          <p:cNvSpPr>
-            <a:spLocks noGrp="1"/>
-          </p:cNvSpPr>
-          <p:nvPr>
-            <p:ph idx="1"/>
-          </p:nvPr>
-        </p:nvSpPr>
-        <p:spPr>
-          <a:xfrm>
-            <a:off x="838198" y="1406963"/>
-            <a:ext cx="4114800" cy="917574"/>
-          </a:xfrm>
-        </p:spPr>
-        <p:txBody>
-          <a:bodyPr>
-            <a:noAutofit/>
-          </a:bodyPr>
-          <a:lstStyle/>
-          <a:p>
-            <a:r>
-              <a:rPr lang="pt-BR" sz="2000" dirty="0">
-                <a:cs typeface="Arial" panose="020B0604020202020204" pitchFamily="34" charset="0"/>
-              </a:rPr>
-              <a:t>IMPLEMENTAÇÃO DE UM ROBÔ PARA OBR BASEADO EM VISÃO COMPUTACIONAL </a:t>
-            </a:r>
-          </a:p>
-        </p:txBody>
-      </p:sp>
-      <p:sp>
-        <p:nvSpPr>
           <p:cNvPr id="3" name="Espaço Reservado para Número de Slide 2">
             <a:extLst>
               <a:ext uri="{FF2B5EF4-FFF2-40B4-BE49-F238E27FC236}">
@@ -6142,226 +6184,6 @@
             <a:fld id="{00CBB334-6205-492F-9410-6332D321FA39}" type="slidenum">
               <a:rPr lang="pt-BR" smtClean="0"/>
               <a:t>6</a:t>
-            </a:fld>
-            <a:endParaRPr lang="pt-BR"/>
-          </a:p>
-        </p:txBody>
-      </p:sp>
-      <p:sp>
-        <p:nvSpPr>
-          <p:cNvPr id="4" name="Título 3">
-            <a:extLst>
-              <a:ext uri="{FF2B5EF4-FFF2-40B4-BE49-F238E27FC236}">
-                <a16:creationId xmlns:a16="http://schemas.microsoft.com/office/drawing/2014/main" id="{D2587431-3788-4EB1-BE7F-072A4FA3AF46}"/>
-              </a:ext>
-            </a:extLst>
-          </p:cNvPr>
-          <p:cNvSpPr>
-            <a:spLocks noGrp="1"/>
-          </p:cNvSpPr>
-          <p:nvPr>
-            <p:ph type="title"/>
-          </p:nvPr>
-        </p:nvSpPr>
-        <p:spPr/>
-        <p:txBody>
-          <a:bodyPr/>
-          <a:lstStyle/>
-          <a:p>
-            <a:r>
-              <a:rPr lang="pt-BR" dirty="0"/>
-              <a:t>SOLUÇÕES SIMILARES</a:t>
-            </a:r>
-          </a:p>
-        </p:txBody>
-      </p:sp>
-      <p:sp>
-        <p:nvSpPr>
-          <p:cNvPr id="5" name="Espaço Reservado para Rodapé 4">
-            <a:extLst>
-              <a:ext uri="{FF2B5EF4-FFF2-40B4-BE49-F238E27FC236}">
-                <a16:creationId xmlns:a16="http://schemas.microsoft.com/office/drawing/2014/main" id="{8ECB9C2D-4478-45CF-9486-69530DA50C59}"/>
-              </a:ext>
-            </a:extLst>
-          </p:cNvPr>
-          <p:cNvSpPr>
-            <a:spLocks noGrp="1"/>
-          </p:cNvSpPr>
-          <p:nvPr>
-            <p:ph type="ftr" sz="quarter" idx="11"/>
-          </p:nvPr>
-        </p:nvSpPr>
-        <p:spPr/>
-        <p:txBody>
-          <a:bodyPr/>
-          <a:lstStyle/>
-          <a:p>
-            <a:r>
-              <a:rPr lang="pt-BR" dirty="0"/>
-              <a:t>Byakugan: Visão Computacional</a:t>
-            </a:r>
-          </a:p>
-        </p:txBody>
-      </p:sp>
-      <p:pic>
-        <p:nvPicPr>
-          <p:cNvPr id="7" name="Imagem 6" descr="Uma imagem contendo chão, interior&#10;&#10;Descrição gerada com muito alta confiança">
-            <a:extLst>
-              <a:ext uri="{FF2B5EF4-FFF2-40B4-BE49-F238E27FC236}">
-                <a16:creationId xmlns:a16="http://schemas.microsoft.com/office/drawing/2014/main" id="{9EF9418B-7B5D-4092-AD48-EA65F586D3CF}"/>
-              </a:ext>
-            </a:extLst>
-          </p:cNvPr>
-          <p:cNvPicPr>
-            <a:picLocks noChangeAspect="1"/>
-          </p:cNvPicPr>
-          <p:nvPr/>
-        </p:nvPicPr>
-        <p:blipFill>
-          <a:blip r:embed="rId2">
-            <a:extLst>
-              <a:ext uri="{28A0092B-C50C-407E-A947-70E740481C1C}">
-                <a14:useLocalDpi xmlns:a14="http://schemas.microsoft.com/office/drawing/2010/main" val="0"/>
-              </a:ext>
-            </a:extLst>
-          </a:blip>
-          <a:stretch>
-            <a:fillRect/>
-          </a:stretch>
-        </p:blipFill>
-        <p:spPr>
-          <a:xfrm>
-            <a:off x="838198" y="2761764"/>
-            <a:ext cx="4165959" cy="3157359"/>
-          </a:xfrm>
-          <a:prstGeom prst="rect">
-            <a:avLst/>
-          </a:prstGeom>
-        </p:spPr>
-      </p:pic>
-      <p:sp>
-        <p:nvSpPr>
-          <p:cNvPr id="8" name="CaixaDeTexto 7">
-            <a:extLst>
-              <a:ext uri="{FF2B5EF4-FFF2-40B4-BE49-F238E27FC236}">
-                <a16:creationId xmlns:a16="http://schemas.microsoft.com/office/drawing/2014/main" id="{F82AB182-A500-4722-B477-74068A570B22}"/>
-              </a:ext>
-            </a:extLst>
-          </p:cNvPr>
-          <p:cNvSpPr txBox="1"/>
-          <p:nvPr/>
-        </p:nvSpPr>
-        <p:spPr>
-          <a:xfrm>
-            <a:off x="6096000" y="1323330"/>
-            <a:ext cx="4114800" cy="1631216"/>
-          </a:xfrm>
-          <a:prstGeom prst="rect">
-            <a:avLst/>
-          </a:prstGeom>
-          <a:noFill/>
-        </p:spPr>
-        <p:txBody>
-          <a:bodyPr wrap="square" rtlCol="0">
-            <a:spAutoFit/>
-          </a:bodyPr>
-          <a:lstStyle/>
-          <a:p>
-            <a:pPr marL="342900" indent="-342900">
-              <a:buFont typeface="Arial" panose="020B0604020202020204" pitchFamily="34" charset="0"/>
-              <a:buChar char="•"/>
-            </a:pPr>
-            <a:r>
-              <a:rPr lang="pt-BR" sz="2000" dirty="0"/>
-              <a:t>SISTEMA DE DETECÇÃO E RESGATE DE VÍTIMA PARA UM ROBÔ AUTÔNOMO SEGUIDOR DE LINHA BASEADO EM VISÃO COMPUTACIONAL </a:t>
-            </a:r>
-          </a:p>
-        </p:txBody>
-      </p:sp>
-      <p:pic>
-        <p:nvPicPr>
-          <p:cNvPr id="6" name="Imagem 5">
-            <a:extLst>
-              <a:ext uri="{FF2B5EF4-FFF2-40B4-BE49-F238E27FC236}">
-                <a16:creationId xmlns:a16="http://schemas.microsoft.com/office/drawing/2014/main" id="{79D6B788-BB10-48DD-999B-7EE7634367F2}"/>
-              </a:ext>
-            </a:extLst>
-          </p:cNvPr>
-          <p:cNvPicPr>
-            <a:picLocks noChangeAspect="1"/>
-          </p:cNvPicPr>
-          <p:nvPr/>
-        </p:nvPicPr>
-        <p:blipFill>
-          <a:blip r:embed="rId3"/>
-          <a:stretch>
-            <a:fillRect/>
-          </a:stretch>
-        </p:blipFill>
-        <p:spPr>
-          <a:xfrm>
-            <a:off x="6496050" y="3011747"/>
-            <a:ext cx="3714750" cy="3213045"/>
-          </a:xfrm>
-          <a:prstGeom prst="rect">
-            <a:avLst/>
-          </a:prstGeom>
-        </p:spPr>
-      </p:pic>
-    </p:spTree>
-    <p:extLst>
-      <p:ext uri="{BB962C8B-B14F-4D97-AF65-F5344CB8AC3E}">
-        <p14:creationId xmlns:p14="http://schemas.microsoft.com/office/powerpoint/2010/main" val="3357810014"/>
-      </p:ext>
-    </p:extLst>
-  </p:cSld>
-  <p:clrMapOvr>
-    <a:masterClrMapping/>
-  </p:clrMapOvr>
-</p:sld>
-</file>
-
-<file path=ppt/slides/slide7.xml><?xml version="1.0" encoding="utf-8"?>
-<p:sld xmlns:a="http://schemas.openxmlformats.org/drawingml/2006/main" xmlns:r="http://schemas.openxmlformats.org/officeDocument/2006/relationships" xmlns:p="http://schemas.openxmlformats.org/presentationml/2006/main">
-  <p:cSld>
-    <p:spTree>
-      <p:nvGrpSpPr>
-        <p:cNvPr id="1" name=""/>
-        <p:cNvGrpSpPr/>
-        <p:nvPr/>
-      </p:nvGrpSpPr>
-      <p:grpSpPr>
-        <a:xfrm>
-          <a:off x="0" y="0"/>
-          <a:ext cx="0" cy="0"/>
-          <a:chOff x="0" y="0"/>
-          <a:chExt cx="0" cy="0"/>
-        </a:xfrm>
-      </p:grpSpPr>
-      <p:sp>
-        <p:nvSpPr>
-          <p:cNvPr id="3" name="Espaço Reservado para Número de Slide 2">
-            <a:extLst>
-              <a:ext uri="{FF2B5EF4-FFF2-40B4-BE49-F238E27FC236}">
-                <a16:creationId xmlns:a16="http://schemas.microsoft.com/office/drawing/2014/main" id="{D0D742AF-C764-436B-8667-282022DBEB2D}"/>
-              </a:ext>
-            </a:extLst>
-          </p:cNvPr>
-          <p:cNvSpPr>
-            <a:spLocks noGrp="1"/>
-          </p:cNvSpPr>
-          <p:nvPr>
-            <p:ph type="sldNum" sz="quarter" idx="12"/>
-          </p:nvPr>
-        </p:nvSpPr>
-        <p:spPr/>
-        <p:txBody>
-          <a:bodyPr/>
-          <a:lstStyle/>
-          <a:p>
-            <a:fld id="{00CBB334-6205-492F-9410-6332D321FA39}" type="slidenum">
-              <a:rPr lang="pt-BR" smtClean="0"/>
-              <a:t>7</a:t>
             </a:fld>
             <a:endParaRPr lang="pt-BR"/>
           </a:p>
@@ -6803,6 +6625,174 @@
     <p:extLst>
       <p:ext uri="{BB962C8B-B14F-4D97-AF65-F5344CB8AC3E}">
         <p14:creationId xmlns:p14="http://schemas.microsoft.com/office/powerpoint/2010/main" val="1423554379"/>
+      </p:ext>
+    </p:extLst>
+  </p:cSld>
+  <p:clrMapOvr>
+    <a:masterClrMapping/>
+  </p:clrMapOvr>
+</p:sld>
+</file>
+
+<file path=ppt/slides/slide7.xml><?xml version="1.0" encoding="utf-8"?>
+<p:sld xmlns:a="http://schemas.openxmlformats.org/drawingml/2006/main" xmlns:r="http://schemas.openxmlformats.org/officeDocument/2006/relationships" xmlns:p="http://schemas.openxmlformats.org/presentationml/2006/main">
+  <p:cSld>
+    <p:spTree>
+      <p:nvGrpSpPr>
+        <p:cNvPr id="1" name=""/>
+        <p:cNvGrpSpPr/>
+        <p:nvPr/>
+      </p:nvGrpSpPr>
+      <p:grpSpPr>
+        <a:xfrm>
+          <a:off x="0" y="0"/>
+          <a:ext cx="0" cy="0"/>
+          <a:chOff x="0" y="0"/>
+          <a:chExt cx="0" cy="0"/>
+        </a:xfrm>
+      </p:grpSpPr>
+      <p:sp>
+        <p:nvSpPr>
+          <p:cNvPr id="2" name="Espaço Reservado para Conteúdo 1">
+            <a:extLst>
+              <a:ext uri="{FF2B5EF4-FFF2-40B4-BE49-F238E27FC236}">
+                <a16:creationId xmlns:a16="http://schemas.microsoft.com/office/drawing/2014/main" id="{42C16D62-E4F4-4D6E-9D13-862B9469A03E}"/>
+              </a:ext>
+            </a:extLst>
+          </p:cNvPr>
+          <p:cNvSpPr>
+            <a:spLocks noGrp="1"/>
+          </p:cNvSpPr>
+          <p:nvPr>
+            <p:ph idx="1"/>
+          </p:nvPr>
+        </p:nvSpPr>
+        <p:spPr/>
+        <p:txBody>
+          <a:bodyPr/>
+          <a:lstStyle/>
+          <a:p>
+            <a:r>
+              <a:rPr lang="pt-BR" sz="3600" dirty="0"/>
+              <a:t>Fundamentos de lógica e algoritmo;</a:t>
+            </a:r>
+          </a:p>
+          <a:p>
+            <a:r>
+              <a:rPr lang="pt-BR" sz="3600" dirty="0"/>
+              <a:t>Programação estruturada e orientada a objetos;</a:t>
+            </a:r>
+          </a:p>
+          <a:p>
+            <a:r>
+              <a:rPr lang="pt-BR" sz="3600" dirty="0"/>
+              <a:t>Matemática;</a:t>
+            </a:r>
+          </a:p>
+          <a:p>
+            <a:r>
+              <a:rPr lang="pt-BR" sz="3600" dirty="0"/>
+              <a:t>Eletrônica analógica e digital;</a:t>
+            </a:r>
+          </a:p>
+          <a:p>
+            <a:endParaRPr lang="pt-BR" dirty="0"/>
+          </a:p>
+        </p:txBody>
+      </p:sp>
+      <p:sp>
+        <p:nvSpPr>
+          <p:cNvPr id="3" name="Espaço Reservado para Rodapé 2">
+            <a:extLst>
+              <a:ext uri="{FF2B5EF4-FFF2-40B4-BE49-F238E27FC236}">
+                <a16:creationId xmlns:a16="http://schemas.microsoft.com/office/drawing/2014/main" id="{75D1B8D1-7B2A-4F21-BCEF-C6AA443A529B}"/>
+              </a:ext>
+            </a:extLst>
+          </p:cNvPr>
+          <p:cNvSpPr>
+            <a:spLocks noGrp="1"/>
+          </p:cNvSpPr>
+          <p:nvPr>
+            <p:ph type="ftr" sz="quarter" idx="11"/>
+          </p:nvPr>
+        </p:nvSpPr>
+        <p:spPr/>
+        <p:txBody>
+          <a:bodyPr/>
+          <a:lstStyle/>
+          <a:p>
+            <a:r>
+              <a:rPr lang="pt-BR" dirty="0" err="1"/>
+              <a:t>Byakugan</a:t>
+            </a:r>
+            <a:r>
+              <a:rPr lang="pt-BR" dirty="0"/>
+              <a:t>: Visão Computacional</a:t>
+            </a:r>
+          </a:p>
+        </p:txBody>
+      </p:sp>
+      <p:sp>
+        <p:nvSpPr>
+          <p:cNvPr id="4" name="Espaço Reservado para Número de Slide 3">
+            <a:extLst>
+              <a:ext uri="{FF2B5EF4-FFF2-40B4-BE49-F238E27FC236}">
+                <a16:creationId xmlns:a16="http://schemas.microsoft.com/office/drawing/2014/main" id="{CBDD1A5A-0080-4215-9BFF-DB5F86754687}"/>
+              </a:ext>
+            </a:extLst>
+          </p:cNvPr>
+          <p:cNvSpPr>
+            <a:spLocks noGrp="1"/>
+          </p:cNvSpPr>
+          <p:nvPr>
+            <p:ph type="sldNum" sz="quarter" idx="12"/>
+          </p:nvPr>
+        </p:nvSpPr>
+        <p:spPr/>
+        <p:txBody>
+          <a:bodyPr/>
+          <a:lstStyle/>
+          <a:p>
+            <a:fld id="{00CBB334-6205-492F-9410-6332D321FA39}" type="slidenum">
+              <a:rPr lang="pt-BR" smtClean="0"/>
+              <a:t>7</a:t>
+            </a:fld>
+            <a:endParaRPr lang="pt-BR"/>
+          </a:p>
+        </p:txBody>
+      </p:sp>
+      <p:sp>
+        <p:nvSpPr>
+          <p:cNvPr id="5" name="Título 4">
+            <a:extLst>
+              <a:ext uri="{FF2B5EF4-FFF2-40B4-BE49-F238E27FC236}">
+                <a16:creationId xmlns:a16="http://schemas.microsoft.com/office/drawing/2014/main" id="{1566DED6-B701-41ED-84A3-B6543908B6EE}"/>
+              </a:ext>
+            </a:extLst>
+          </p:cNvPr>
+          <p:cNvSpPr>
+            <a:spLocks noGrp="1"/>
+          </p:cNvSpPr>
+          <p:nvPr>
+            <p:ph type="title"/>
+          </p:nvPr>
+        </p:nvSpPr>
+        <p:spPr/>
+        <p:txBody>
+          <a:bodyPr/>
+          <a:lstStyle/>
+          <a:p>
+            <a:r>
+              <a:rPr lang="pt-BR" dirty="0"/>
+              <a:t>DISCIPLINAS INTEGRADAS</a:t>
+            </a:r>
+          </a:p>
+        </p:txBody>
+      </p:sp>
+    </p:spTree>
+    <p:extLst>
+      <p:ext uri="{BB962C8B-B14F-4D97-AF65-F5344CB8AC3E}">
+        <p14:creationId xmlns:p14="http://schemas.microsoft.com/office/powerpoint/2010/main" val="1225811333"/>
       </p:ext>
     </p:extLst>
   </p:cSld>
@@ -7374,7 +7364,7 @@
             <p:ph idx="1"/>
             <p:extLst>
               <p:ext uri="{D42A27DB-BD31-4B8C-83A1-F6EECF244321}">
-                <p14:modId xmlns:p14="http://schemas.microsoft.com/office/powerpoint/2010/main" val="1352385116"/>
+                <p14:modId xmlns:p14="http://schemas.microsoft.com/office/powerpoint/2010/main" val="4224321748"/>
               </p:ext>
             </p:extLst>
           </p:nvPr>
@@ -7895,7 +7885,7 @@
                     <a:lstStyle/>
                     <a:p>
                       <a:pPr algn="ctr" fontAlgn="b"/>
-                      <a:endParaRPr lang="pt-BR" sz="2000" b="1" i="0" u="none" strike="noStrike">
+                      <a:endParaRPr lang="pt-BR" sz="2000" b="1" i="0" u="none" strike="noStrike" dirty="0">
                         <a:solidFill>
                           <a:srgbClr val="000000"/>
                         </a:solidFill>
@@ -8417,13 +8407,16 @@
                     <a:lstStyle/>
                     <a:p>
                       <a:pPr algn="ctr" fontAlgn="b"/>
-                      <a:endParaRPr lang="pt-BR" sz="2000" b="1" i="0" u="none" strike="noStrike" dirty="0">
-                        <a:solidFill>
-                          <a:srgbClr val="000000"/>
-                        </a:solidFill>
-                        <a:effectLst/>
-                        <a:latin typeface="Calibri" panose="020F0502020204030204" pitchFamily="34" charset="0"/>
-                      </a:endParaRPr>
+                      <a:r>
+                        <a:rPr lang="pt-BR" sz="2000" b="1" i="0" u="none" strike="noStrike" dirty="0">
+                          <a:solidFill>
+                            <a:srgbClr val="000000"/>
+                          </a:solidFill>
+                          <a:effectLst/>
+                          <a:latin typeface="Calibri" panose="020F0502020204030204" pitchFamily="34" charset="0"/>
+                        </a:rPr>
+                        <a:t>X</a:t>
+                      </a:r>
                     </a:p>
                   </a:txBody>
                   <a:tcPr marL="9525" marR="9525" marT="9525" marB="0" anchor="b"/>
@@ -8481,18 +8474,15 @@
                     <a:p>
                       <a:pPr algn="ctr" fontAlgn="b"/>
                       <a:r>
-                        <a:rPr lang="pt-BR" sz="2000" b="1" u="none" strike="noStrike">
+                        <a:rPr lang="pt-BR" sz="2000" b="1" i="0" u="none" strike="noStrike" dirty="0">
+                          <a:solidFill>
+                            <a:srgbClr val="000000"/>
+                          </a:solidFill>
                           <a:effectLst/>
+                          <a:latin typeface="Calibri" panose="020F0502020204030204" pitchFamily="34" charset="0"/>
                         </a:rPr>
                         <a:t>X</a:t>
                       </a:r>
-                      <a:endParaRPr lang="pt-BR" sz="2000" b="1" i="0" u="none" strike="noStrike">
-                        <a:solidFill>
-                          <a:srgbClr val="000000"/>
-                        </a:solidFill>
-                        <a:effectLst/>
-                        <a:latin typeface="Calibri" panose="020F0502020204030204" pitchFamily="34" charset="0"/>
-                      </a:endParaRPr>
                     </a:p>
                   </a:txBody>
                   <a:tcPr marL="9525" marR="9525" marT="9525" marB="0" anchor="b"/>
@@ -9346,24 +9336,7 @@
                     <a:lstStyle/>
                     <a:p>
                       <a:pPr algn="ctr" fontAlgn="b"/>
-                      <a:endParaRPr lang="pt-BR" sz="2000" b="1" i="0" u="none" strike="noStrike">
-                        <a:solidFill>
-                          <a:srgbClr val="000000"/>
-                        </a:solidFill>
-                        <a:effectLst/>
-                        <a:latin typeface="Calibri" panose="020F0502020204030204" pitchFamily="34" charset="0"/>
-                      </a:endParaRPr>
-                    </a:p>
-                  </a:txBody>
-                  <a:tcPr marL="9525" marR="9525" marT="9525" marB="0" anchor="b"/>
-                </a:tc>
-                <a:tc>
-                  <a:txBody>
-                    <a:bodyPr/>
-                    <a:lstStyle/>
-                    <a:p>
-                      <a:pPr algn="ctr" fontAlgn="b"/>
-                      <a:endParaRPr lang="pt-BR" sz="2000" b="1" i="0" u="none" strike="noStrike">
+                      <a:endParaRPr lang="pt-BR" sz="2000" b="1" i="0" u="none" strike="noStrike" dirty="0">
                         <a:solidFill>
                           <a:srgbClr val="000000"/>
                         </a:solidFill>
@@ -9397,29 +9370,43 @@
                     <a:lstStyle/>
                     <a:p>
                       <a:pPr algn="ctr" fontAlgn="b"/>
-                      <a:endParaRPr lang="pt-BR" sz="2000" b="1" i="0" u="none" strike="noStrike" dirty="0">
-                        <a:solidFill>
-                          <a:srgbClr val="000000"/>
-                        </a:solidFill>
-                        <a:effectLst/>
-                        <a:latin typeface="Calibri" panose="020F0502020204030204" pitchFamily="34" charset="0"/>
-                      </a:endParaRPr>
-                    </a:p>
-                  </a:txBody>
-                  <a:tcPr marL="9525" marR="9525" marT="9525" marB="0" anchor="b"/>
-                </a:tc>
-                <a:tc>
-                  <a:txBody>
-                    <a:bodyPr/>
-                    <a:lstStyle/>
-                    <a:p>
-                      <a:pPr algn="ctr" fontAlgn="b"/>
                       <a:r>
-                        <a:rPr lang="pt-BR" sz="2000" b="1" u="none" strike="noStrike" dirty="0">
+                        <a:rPr lang="pt-BR" sz="2000" b="1" i="0" u="none" strike="noStrike" dirty="0">
+                          <a:solidFill>
+                            <a:srgbClr val="000000"/>
+                          </a:solidFill>
                           <a:effectLst/>
+                          <a:latin typeface="Calibri" panose="020F0502020204030204" pitchFamily="34" charset="0"/>
                         </a:rPr>
                         <a:t>X</a:t>
                       </a:r>
+                    </a:p>
+                  </a:txBody>
+                  <a:tcPr marL="9525" marR="9525" marT="9525" marB="0" anchor="b"/>
+                </a:tc>
+                <a:tc>
+                  <a:txBody>
+                    <a:bodyPr/>
+                    <a:lstStyle/>
+                    <a:p>
+                      <a:pPr algn="ctr" fontAlgn="b"/>
+                      <a:endParaRPr lang="pt-BR" sz="2000" b="1" i="0" u="none" strike="noStrike" dirty="0">
+                        <a:solidFill>
+                          <a:srgbClr val="000000"/>
+                        </a:solidFill>
+                        <a:effectLst/>
+                        <a:latin typeface="Calibri" panose="020F0502020204030204" pitchFamily="34" charset="0"/>
+                      </a:endParaRPr>
+                    </a:p>
+                  </a:txBody>
+                  <a:tcPr marL="9525" marR="9525" marT="9525" marB="0" anchor="b"/>
+                </a:tc>
+                <a:tc>
+                  <a:txBody>
+                    <a:bodyPr/>
+                    <a:lstStyle/>
+                    <a:p>
+                      <a:pPr algn="ctr" fontAlgn="b"/>
                       <a:endParaRPr lang="pt-BR" sz="2000" b="1" i="0" u="none" strike="noStrike" dirty="0">
                         <a:solidFill>
                           <a:srgbClr val="000000"/>
@@ -9586,7 +9573,7 @@
                     <a:lstStyle/>
                     <a:p>
                       <a:pPr algn="ctr" fontAlgn="b"/>
-                      <a:endParaRPr lang="pt-BR" sz="2000" b="1" i="0" u="none" strike="noStrike">
+                      <a:endParaRPr lang="pt-BR" sz="2000" b="1" i="0" u="none" strike="noStrike" dirty="0">
                         <a:solidFill>
                           <a:srgbClr val="000000"/>
                         </a:solidFill>

</xml_diff>

<commit_message>
Alterações no slide: Nova arte na capa
- Referências de figuras em "Introdução & Problemática"
- Alterações em "Solução tecnológica"
</commit_message>
<xml_diff>
--- a/Slide.pptx
+++ b/Slide.pptx
@@ -220,7 +220,7 @@
           <a:p>
             <a:fld id="{355DB5B6-2099-4182-8370-BE40CE79ECA1}" type="datetimeFigureOut">
               <a:rPr lang="pt-BR" smtClean="0"/>
-              <a:t>19/04/2019</a:t>
+              <a:t>21/04/2019</a:t>
             </a:fld>
             <a:endParaRPr lang="pt-BR"/>
           </a:p>
@@ -1064,7 +1064,7 @@
           <a:p>
             <a:fld id="{4539A389-483A-4E9F-9AAB-6D6A3D56DCF6}" type="datetime1">
               <a:rPr lang="pt-BR" smtClean="0"/>
-              <a:t>19/04/2019</a:t>
+              <a:t>21/04/2019</a:t>
             </a:fld>
             <a:endParaRPr lang="pt-BR"/>
           </a:p>
@@ -1272,7 +1272,7 @@
           <a:p>
             <a:fld id="{FF985126-5AE9-4104-BD84-FF9EDB02A973}" type="datetime1">
               <a:rPr lang="pt-BR" smtClean="0"/>
-              <a:t>19/04/2019</a:t>
+              <a:t>21/04/2019</a:t>
             </a:fld>
             <a:endParaRPr lang="pt-BR"/>
           </a:p>
@@ -1442,7 +1442,7 @@
           <a:p>
             <a:fld id="{C346E3E3-2072-42D8-AE5D-F06D0424005B}" type="datetime1">
               <a:rPr lang="pt-BR" smtClean="0"/>
-              <a:t>19/04/2019</a:t>
+              <a:t>21/04/2019</a:t>
             </a:fld>
             <a:endParaRPr lang="pt-BR"/>
           </a:p>
@@ -1759,7 +1759,7 @@
           <a:p>
             <a:fld id="{E19C2350-4C2B-4882-8B71-1D519621A934}" type="datetime1">
               <a:rPr lang="pt-BR" smtClean="0"/>
-              <a:t>19/04/2019</a:t>
+              <a:t>21/04/2019</a:t>
             </a:fld>
             <a:endParaRPr lang="pt-BR"/>
           </a:p>
@@ -2071,7 +2071,7 @@
           <a:p>
             <a:fld id="{62C1FAA8-89AE-4E7D-A200-C08DFE01393F}" type="datetime1">
               <a:rPr lang="pt-BR" smtClean="0"/>
-              <a:t>19/04/2019</a:t>
+              <a:t>21/04/2019</a:t>
             </a:fld>
             <a:endParaRPr lang="pt-BR"/>
           </a:p>
@@ -2483,7 +2483,7 @@
           <a:p>
             <a:fld id="{48AFFE0E-9767-4588-A361-7E006DEE2CC4}" type="datetime1">
               <a:rPr lang="pt-BR" smtClean="0"/>
-              <a:t>19/04/2019</a:t>
+              <a:t>21/04/2019</a:t>
             </a:fld>
             <a:endParaRPr lang="pt-BR"/>
           </a:p>
@@ -2624,7 +2624,7 @@
           <a:p>
             <a:fld id="{D14657F0-A892-42D8-9C26-D1730EC81330}" type="datetime1">
               <a:rPr lang="pt-BR" smtClean="0"/>
-              <a:t>19/04/2019</a:t>
+              <a:t>21/04/2019</a:t>
             </a:fld>
             <a:endParaRPr lang="pt-BR"/>
           </a:p>
@@ -2737,7 +2737,7 @@
           <a:p>
             <a:fld id="{B4972C2A-9C12-4B5C-8BB0-8A51A2CBCCE7}" type="datetime1">
               <a:rPr lang="pt-BR" smtClean="0"/>
-              <a:t>19/04/2019</a:t>
+              <a:t>21/04/2019</a:t>
             </a:fld>
             <a:endParaRPr lang="pt-BR"/>
           </a:p>
@@ -3048,7 +3048,7 @@
           <a:p>
             <a:fld id="{0B0607DD-BDC6-4187-96EB-482D6E26C5A4}" type="datetime1">
               <a:rPr lang="pt-BR" smtClean="0"/>
-              <a:t>19/04/2019</a:t>
+              <a:t>21/04/2019</a:t>
             </a:fld>
             <a:endParaRPr lang="pt-BR"/>
           </a:p>
@@ -3336,7 +3336,7 @@
           <a:p>
             <a:fld id="{F412D6E7-6296-4A22-98F7-939D137D1CF6}" type="datetime1">
               <a:rPr lang="pt-BR" smtClean="0"/>
-              <a:t>19/04/2019</a:t>
+              <a:t>21/04/2019</a:t>
             </a:fld>
             <a:endParaRPr lang="pt-BR"/>
           </a:p>
@@ -3884,35 +3884,35 @@
           <a:p>
             <a:pPr lvl="0"/>
             <a:r>
-              <a:rPr lang="pt-BR"/>
+              <a:rPr lang="pt-BR" dirty="0"/>
               <a:t>Clique para editar os estilos de texto Mestres</a:t>
             </a:r>
           </a:p>
           <a:p>
             <a:pPr lvl="1"/>
             <a:r>
-              <a:rPr lang="pt-BR"/>
+              <a:rPr lang="pt-BR" dirty="0"/>
               <a:t>Segundo nível</a:t>
             </a:r>
           </a:p>
           <a:p>
             <a:pPr lvl="2"/>
             <a:r>
-              <a:rPr lang="pt-BR"/>
+              <a:rPr lang="pt-BR" dirty="0"/>
               <a:t>Terceiro nível</a:t>
             </a:r>
           </a:p>
           <a:p>
             <a:pPr lvl="3"/>
             <a:r>
-              <a:rPr lang="pt-BR"/>
+              <a:rPr lang="pt-BR" dirty="0"/>
               <a:t>Quarto nível</a:t>
             </a:r>
           </a:p>
           <a:p>
             <a:pPr lvl="4"/>
             <a:r>
-              <a:rPr lang="pt-BR"/>
+              <a:rPr lang="pt-BR" dirty="0"/>
               <a:t>Quinto nível</a:t>
             </a:r>
           </a:p>
@@ -3959,7 +3959,7 @@
           <a:p>
             <a:fld id="{55887BB8-E30A-4046-95CD-0643E512C401}" type="datetime1">
               <a:rPr lang="pt-BR" smtClean="0"/>
-              <a:t>19/04/2019</a:t>
+              <a:t>21/04/2019</a:t>
             </a:fld>
             <a:endParaRPr lang="pt-BR"/>
           </a:p>
@@ -4400,6 +4400,14 @@
 <file path=ppt/slides/slide1.xml><?xml version="1.0" encoding="utf-8"?>
 <p:sld xmlns:a="http://schemas.openxmlformats.org/drawingml/2006/main" xmlns:r="http://schemas.openxmlformats.org/officeDocument/2006/relationships" xmlns:p="http://schemas.openxmlformats.org/presentationml/2006/main">
   <p:cSld>
+    <p:bg>
+      <p:bgPr>
+        <a:solidFill>
+          <a:schemeClr val="bg1"/>
+        </a:solidFill>
+        <a:effectLst/>
+      </p:bgPr>
+    </p:bg>
     <p:spTree>
       <p:nvGrpSpPr>
         <p:cNvPr id="1" name=""/>
@@ -4414,6 +4422,38 @@
           <a:chExt cx="0" cy="0"/>
         </a:xfrm>
       </p:grpSpPr>
+      <p:pic>
+        <p:nvPicPr>
+          <p:cNvPr id="20" name="Imagem 19">
+            <a:extLst>
+              <a:ext uri="{FF2B5EF4-FFF2-40B4-BE49-F238E27FC236}">
+                <a16:creationId xmlns:a16="http://schemas.microsoft.com/office/drawing/2014/main" id="{C9D0F21B-9081-4AFE-AC57-8495046AF607}"/>
+              </a:ext>
+            </a:extLst>
+          </p:cNvPr>
+          <p:cNvPicPr>
+            <a:picLocks noChangeAspect="1"/>
+          </p:cNvPicPr>
+          <p:nvPr/>
+        </p:nvPicPr>
+        <p:blipFill>
+          <a:blip r:embed="rId2">
+            <a:alphaModFix amt="18000"/>
+          </a:blip>
+          <a:stretch>
+            <a:fillRect/>
+          </a:stretch>
+        </p:blipFill>
+        <p:spPr>
+          <a:xfrm>
+            <a:off x="0" y="1782303"/>
+            <a:ext cx="6096000" cy="3685781"/>
+          </a:xfrm>
+          <a:prstGeom prst="rect">
+            <a:avLst/>
+          </a:prstGeom>
+        </p:spPr>
+      </p:pic>
       <p:sp>
         <p:nvSpPr>
           <p:cNvPr id="2" name="Subtítulo 1">
@@ -4430,13 +4470,19 @@
             <p:ph type="subTitle" idx="1"/>
           </p:nvPr>
         </p:nvSpPr>
-        <p:spPr/>
+        <p:spPr>
+          <a:xfrm>
+            <a:off x="5481070" y="3527822"/>
+            <a:ext cx="3691065" cy="365125"/>
+          </a:xfrm>
+        </p:spPr>
         <p:txBody>
           <a:bodyPr>
             <a:normAutofit fontScale="85000" lnSpcReduction="20000"/>
           </a:bodyPr>
           <a:lstStyle/>
           <a:p>
+            <a:pPr algn="r"/>
             <a:r>
               <a:rPr lang="pt-BR" dirty="0"/>
               <a:t>Visão Computacional</a:t>
@@ -4460,85 +4506,22 @@
             <p:ph type="ctrTitle"/>
           </p:nvPr>
         </p:nvSpPr>
-        <p:spPr/>
-        <p:txBody>
-          <a:bodyPr/>
+        <p:spPr>
+          <a:xfrm>
+            <a:off x="4149973" y="2528364"/>
+            <a:ext cx="4965891" cy="969485"/>
+          </a:xfrm>
+        </p:spPr>
+        <p:txBody>
+          <a:bodyPr>
+            <a:normAutofit/>
+          </a:bodyPr>
           <a:lstStyle/>
           <a:p>
-            <a:r>
-              <a:rPr lang="pt-BR" dirty="0"/>
-              <a:t>Byakugan</a:t>
-            </a:r>
-          </a:p>
-        </p:txBody>
-      </p:sp>
-      <p:sp>
-        <p:nvSpPr>
-          <p:cNvPr id="4" name="Espaço Reservado para Texto 3">
-            <a:extLst>
-              <a:ext uri="{FF2B5EF4-FFF2-40B4-BE49-F238E27FC236}">
-                <a16:creationId xmlns:a16="http://schemas.microsoft.com/office/drawing/2014/main" id="{D5F6B771-D4C7-4B76-A01B-38F370E3D7B5}"/>
-              </a:ext>
-            </a:extLst>
-          </p:cNvPr>
-          <p:cNvSpPr>
-            <a:spLocks noGrp="1"/>
-          </p:cNvSpPr>
-          <p:nvPr>
-            <p:ph type="body" sz="quarter" idx="13"/>
-          </p:nvPr>
-        </p:nvSpPr>
-        <p:spPr/>
-        <p:txBody>
-          <a:bodyPr/>
-          <a:lstStyle/>
-          <a:p>
-            <a:r>
-              <a:rPr lang="pt-BR" dirty="0"/>
-              <a:t>Douglas Gabriel da Silva Araújo;</a:t>
-            </a:r>
-          </a:p>
-          <a:p>
-            <a:r>
-              <a:rPr lang="pt-BR" dirty="0"/>
-              <a:t>Isaac Marlon da Silva Lourenço;</a:t>
-            </a:r>
-          </a:p>
-          <a:p>
-            <a:r>
-              <a:rPr lang="pt-BR" dirty="0"/>
-              <a:t>Paulo Vitor Lima Borges.</a:t>
-            </a:r>
-          </a:p>
-          <a:p>
-            <a:endParaRPr lang="pt-BR" dirty="0"/>
-          </a:p>
-        </p:txBody>
-      </p:sp>
-      <p:sp>
-        <p:nvSpPr>
-          <p:cNvPr id="5" name="Espaço Reservado para Texto 4">
-            <a:extLst>
-              <a:ext uri="{FF2B5EF4-FFF2-40B4-BE49-F238E27FC236}">
-                <a16:creationId xmlns:a16="http://schemas.microsoft.com/office/drawing/2014/main" id="{1A345C81-C545-41BF-ADCB-D16CEB412135}"/>
-              </a:ext>
-            </a:extLst>
-          </p:cNvPr>
-          <p:cNvSpPr>
-            <a:spLocks noGrp="1"/>
-          </p:cNvSpPr>
-          <p:nvPr>
-            <p:ph type="body" sz="quarter" idx="14"/>
-          </p:nvPr>
-        </p:nvSpPr>
-        <p:spPr/>
-        <p:txBody>
-          <a:bodyPr/>
-          <a:lstStyle/>
-          <a:p>
-            <a:r>
-              <a:rPr lang="pt-BR" dirty="0"/>
-              <a:t>Lennedy Campos Soares</a:t>
+            <a:pPr algn="r"/>
+            <a:r>
+              <a:rPr lang="pt-BR" sz="4800" dirty="0"/>
+              <a:t>Byakugan </a:t>
             </a:r>
           </a:p>
         </p:txBody>
@@ -4578,10 +4561,10 @@
       </p:sp>
       <p:pic>
         <p:nvPicPr>
-          <p:cNvPr id="2050" name="Picture 2" descr="Resultado de imagem para byakugan">
-            <a:extLst>
-              <a:ext uri="{FF2B5EF4-FFF2-40B4-BE49-F238E27FC236}">
-                <a16:creationId xmlns:a16="http://schemas.microsoft.com/office/drawing/2014/main" id="{477981B7-7156-470C-B624-85EC4A934274}"/>
+          <p:cNvPr id="1026" name="Picture 2" descr="Resultado de imagem para BYAKUGAN PNG">
+            <a:extLst>
+              <a:ext uri="{FF2B5EF4-FFF2-40B4-BE49-F238E27FC236}">
+                <a16:creationId xmlns:a16="http://schemas.microsoft.com/office/drawing/2014/main" id="{BA6E7915-B080-4752-96B1-13E654C9205C}"/>
               </a:ext>
             </a:extLst>
           </p:cNvPr>
@@ -4591,7 +4574,7 @@
           <p:nvPr/>
         </p:nvPicPr>
         <p:blipFill>
-          <a:blip r:embed="rId2">
+          <a:blip r:embed="rId3">
             <a:extLst>
               <a:ext uri="{28A0092B-C50C-407E-A947-70E740481C1C}">
                 <a14:useLocalDpi xmlns:a14="http://schemas.microsoft.com/office/drawing/2010/main" val="0"/>
@@ -4605,8 +4588,8 @@
         </p:blipFill>
         <p:spPr bwMode="auto">
           <a:xfrm>
-            <a:off x="772437" y="3582650"/>
-            <a:ext cx="3974927" cy="2981195"/>
+            <a:off x="9583000" y="2321169"/>
+            <a:ext cx="700477" cy="679154"/>
           </a:xfrm>
           <a:prstGeom prst="rect">
             <a:avLst/>
@@ -4623,6 +4606,298 @@
           </a:extLst>
         </p:spPr>
       </p:pic>
+      <p:cxnSp>
+        <p:nvCxnSpPr>
+          <p:cNvPr id="16" name="Conector reto 15">
+            <a:extLst>
+              <a:ext uri="{FF2B5EF4-FFF2-40B4-BE49-F238E27FC236}">
+                <a16:creationId xmlns:a16="http://schemas.microsoft.com/office/drawing/2014/main" id="{F0A51D4C-2F1D-4769-9281-3B9C8F2EEE13}"/>
+              </a:ext>
+            </a:extLst>
+          </p:cNvPr>
+          <p:cNvCxnSpPr>
+            <a:cxnSpLocks/>
+          </p:cNvCxnSpPr>
+          <p:nvPr/>
+        </p:nvCxnSpPr>
+        <p:spPr>
+          <a:xfrm>
+            <a:off x="9222014" y="2166425"/>
+            <a:ext cx="0" cy="2138289"/>
+          </a:xfrm>
+          <a:prstGeom prst="line">
+            <a:avLst/>
+          </a:prstGeom>
+          <a:ln w="28575"/>
+        </p:spPr>
+        <p:style>
+          <a:lnRef idx="1">
+            <a:schemeClr val="dk1"/>
+          </a:lnRef>
+          <a:fillRef idx="0">
+            <a:schemeClr val="dk1"/>
+          </a:fillRef>
+          <a:effectRef idx="0">
+            <a:schemeClr val="dk1"/>
+          </a:effectRef>
+          <a:fontRef idx="minor">
+            <a:schemeClr val="tx1"/>
+          </a:fontRef>
+        </p:style>
+      </p:cxnSp>
+      <p:pic>
+        <p:nvPicPr>
+          <p:cNvPr id="25" name="Imagem 24" descr="Uma imagem contendo sentado, branco&#10;&#10;Descrição gerada automaticamente">
+            <a:extLst>
+              <a:ext uri="{FF2B5EF4-FFF2-40B4-BE49-F238E27FC236}">
+                <a16:creationId xmlns:a16="http://schemas.microsoft.com/office/drawing/2014/main" id="{4D217611-C2F7-438B-A56E-C5F2CEDD8090}"/>
+              </a:ext>
+            </a:extLst>
+          </p:cNvPr>
+          <p:cNvPicPr>
+            <a:picLocks noChangeAspect="1"/>
+          </p:cNvPicPr>
+          <p:nvPr/>
+        </p:nvPicPr>
+        <p:blipFill>
+          <a:blip r:embed="rId4">
+            <a:alphaModFix amt="44000"/>
+            <a:extLst>
+              <a:ext uri="{28A0092B-C50C-407E-A947-70E740481C1C}">
+                <a14:useLocalDpi xmlns:a14="http://schemas.microsoft.com/office/drawing/2010/main" val="0"/>
+              </a:ext>
+            </a:extLst>
+          </a:blip>
+          <a:stretch>
+            <a:fillRect/>
+          </a:stretch>
+        </p:blipFill>
+        <p:spPr>
+          <a:xfrm>
+            <a:off x="10163697" y="5068299"/>
+            <a:ext cx="1625242" cy="1506930"/>
+          </a:xfrm>
+          <a:prstGeom prst="rect">
+            <a:avLst/>
+          </a:prstGeom>
+        </p:spPr>
+      </p:pic>
+      <p:sp>
+        <p:nvSpPr>
+          <p:cNvPr id="28" name="Subtítulo 1">
+            <a:extLst>
+              <a:ext uri="{FF2B5EF4-FFF2-40B4-BE49-F238E27FC236}">
+                <a16:creationId xmlns:a16="http://schemas.microsoft.com/office/drawing/2014/main" id="{70796903-4A9B-401B-ABCE-25DE740134BB}"/>
+              </a:ext>
+            </a:extLst>
+          </p:cNvPr>
+          <p:cNvSpPr txBox="1">
+            <a:spLocks/>
+          </p:cNvSpPr>
+          <p:nvPr/>
+        </p:nvSpPr>
+        <p:spPr>
+          <a:xfrm>
+            <a:off x="9457971" y="3246437"/>
+            <a:ext cx="2485499" cy="1285400"/>
+          </a:xfrm>
+          <a:prstGeom prst="rect">
+            <a:avLst/>
+          </a:prstGeom>
+        </p:spPr>
+        <p:txBody>
+          <a:bodyPr vert="horz" lIns="91440" tIns="45720" rIns="91440" bIns="45720" rtlCol="0">
+            <a:normAutofit/>
+          </a:bodyPr>
+          <a:lstStyle>
+            <a:lvl1pPr marL="0" indent="0" algn="ctr" defTabSz="914400" rtl="0" eaLnBrk="1" latinLnBrk="0" hangingPunct="1">
+              <a:lnSpc>
+                <a:spcPct val="90000"/>
+              </a:lnSpc>
+              <a:spcBef>
+                <a:spcPts val="1000"/>
+              </a:spcBef>
+              <a:buFont typeface="Arial" panose="020B0604020202020204" pitchFamily="34" charset="0"/>
+              <a:buNone/>
+              <a:defRPr sz="2800" kern="1200">
+                <a:solidFill>
+                  <a:schemeClr val="tx1"/>
+                </a:solidFill>
+                <a:latin typeface="+mn-lt"/>
+                <a:ea typeface="+mn-ea"/>
+                <a:cs typeface="+mn-cs"/>
+              </a:defRPr>
+            </a:lvl1pPr>
+            <a:lvl2pPr marL="457200" indent="0" algn="ctr" defTabSz="914400" rtl="0" eaLnBrk="1" latinLnBrk="0" hangingPunct="1">
+              <a:lnSpc>
+                <a:spcPct val="90000"/>
+              </a:lnSpc>
+              <a:spcBef>
+                <a:spcPts val="500"/>
+              </a:spcBef>
+              <a:buFont typeface="Arial" panose="020B0604020202020204" pitchFamily="34" charset="0"/>
+              <a:buNone/>
+              <a:defRPr sz="2000" kern="1200">
+                <a:solidFill>
+                  <a:schemeClr val="tx1"/>
+                </a:solidFill>
+                <a:latin typeface="+mn-lt"/>
+                <a:ea typeface="+mn-ea"/>
+                <a:cs typeface="+mn-cs"/>
+              </a:defRPr>
+            </a:lvl2pPr>
+            <a:lvl3pPr marL="914400" indent="0" algn="ctr" defTabSz="914400" rtl="0" eaLnBrk="1" latinLnBrk="0" hangingPunct="1">
+              <a:lnSpc>
+                <a:spcPct val="90000"/>
+              </a:lnSpc>
+              <a:spcBef>
+                <a:spcPts val="500"/>
+              </a:spcBef>
+              <a:buFont typeface="Arial" panose="020B0604020202020204" pitchFamily="34" charset="0"/>
+              <a:buNone/>
+              <a:defRPr sz="1800" kern="1200">
+                <a:solidFill>
+                  <a:schemeClr val="tx1"/>
+                </a:solidFill>
+                <a:latin typeface="+mn-lt"/>
+                <a:ea typeface="+mn-ea"/>
+                <a:cs typeface="+mn-cs"/>
+              </a:defRPr>
+            </a:lvl3pPr>
+            <a:lvl4pPr marL="1371600" indent="0" algn="ctr" defTabSz="914400" rtl="0" eaLnBrk="1" latinLnBrk="0" hangingPunct="1">
+              <a:lnSpc>
+                <a:spcPct val="90000"/>
+              </a:lnSpc>
+              <a:spcBef>
+                <a:spcPts val="500"/>
+              </a:spcBef>
+              <a:buFont typeface="Arial" panose="020B0604020202020204" pitchFamily="34" charset="0"/>
+              <a:buNone/>
+              <a:defRPr sz="1600" kern="1200">
+                <a:solidFill>
+                  <a:schemeClr val="tx1"/>
+                </a:solidFill>
+                <a:latin typeface="+mn-lt"/>
+                <a:ea typeface="+mn-ea"/>
+                <a:cs typeface="+mn-cs"/>
+              </a:defRPr>
+            </a:lvl4pPr>
+            <a:lvl5pPr marL="1828800" indent="0" algn="ctr" defTabSz="914400" rtl="0" eaLnBrk="1" latinLnBrk="0" hangingPunct="1">
+              <a:lnSpc>
+                <a:spcPct val="90000"/>
+              </a:lnSpc>
+              <a:spcBef>
+                <a:spcPts val="500"/>
+              </a:spcBef>
+              <a:buFont typeface="Arial" panose="020B0604020202020204" pitchFamily="34" charset="0"/>
+              <a:buNone/>
+              <a:defRPr sz="1600" kern="1200">
+                <a:solidFill>
+                  <a:schemeClr val="tx1"/>
+                </a:solidFill>
+                <a:latin typeface="+mn-lt"/>
+                <a:ea typeface="+mn-ea"/>
+                <a:cs typeface="+mn-cs"/>
+              </a:defRPr>
+            </a:lvl5pPr>
+            <a:lvl6pPr marL="2286000" indent="0" algn="ctr" defTabSz="914400" rtl="0" eaLnBrk="1" latinLnBrk="0" hangingPunct="1">
+              <a:lnSpc>
+                <a:spcPct val="90000"/>
+              </a:lnSpc>
+              <a:spcBef>
+                <a:spcPts val="500"/>
+              </a:spcBef>
+              <a:buFont typeface="Arial" panose="020B0604020202020204" pitchFamily="34" charset="0"/>
+              <a:buNone/>
+              <a:defRPr sz="1600" kern="1200">
+                <a:solidFill>
+                  <a:schemeClr val="tx1"/>
+                </a:solidFill>
+                <a:latin typeface="+mn-lt"/>
+                <a:ea typeface="+mn-ea"/>
+                <a:cs typeface="+mn-cs"/>
+              </a:defRPr>
+            </a:lvl6pPr>
+            <a:lvl7pPr marL="2743200" indent="0" algn="ctr" defTabSz="914400" rtl="0" eaLnBrk="1" latinLnBrk="0" hangingPunct="1">
+              <a:lnSpc>
+                <a:spcPct val="90000"/>
+              </a:lnSpc>
+              <a:spcBef>
+                <a:spcPts val="500"/>
+              </a:spcBef>
+              <a:buFont typeface="Arial" panose="020B0604020202020204" pitchFamily="34" charset="0"/>
+              <a:buNone/>
+              <a:defRPr sz="1600" kern="1200">
+                <a:solidFill>
+                  <a:schemeClr val="tx1"/>
+                </a:solidFill>
+                <a:latin typeface="+mn-lt"/>
+                <a:ea typeface="+mn-ea"/>
+                <a:cs typeface="+mn-cs"/>
+              </a:defRPr>
+            </a:lvl7pPr>
+            <a:lvl8pPr marL="3200400" indent="0" algn="ctr" defTabSz="914400" rtl="0" eaLnBrk="1" latinLnBrk="0" hangingPunct="1">
+              <a:lnSpc>
+                <a:spcPct val="90000"/>
+              </a:lnSpc>
+              <a:spcBef>
+                <a:spcPts val="500"/>
+              </a:spcBef>
+              <a:buFont typeface="Arial" panose="020B0604020202020204" pitchFamily="34" charset="0"/>
+              <a:buNone/>
+              <a:defRPr sz="1600" kern="1200">
+                <a:solidFill>
+                  <a:schemeClr val="tx1"/>
+                </a:solidFill>
+                <a:latin typeface="+mn-lt"/>
+                <a:ea typeface="+mn-ea"/>
+                <a:cs typeface="+mn-cs"/>
+              </a:defRPr>
+            </a:lvl8pPr>
+            <a:lvl9pPr marL="3657600" indent="0" algn="ctr" defTabSz="914400" rtl="0" eaLnBrk="1" latinLnBrk="0" hangingPunct="1">
+              <a:lnSpc>
+                <a:spcPct val="90000"/>
+              </a:lnSpc>
+              <a:spcBef>
+                <a:spcPts val="500"/>
+              </a:spcBef>
+              <a:buFont typeface="Arial" panose="020B0604020202020204" pitchFamily="34" charset="0"/>
+              <a:buNone/>
+              <a:defRPr sz="1600" kern="1200">
+                <a:solidFill>
+                  <a:schemeClr val="tx1"/>
+                </a:solidFill>
+                <a:latin typeface="+mn-lt"/>
+                <a:ea typeface="+mn-ea"/>
+                <a:cs typeface="+mn-cs"/>
+              </a:defRPr>
+            </a:lvl9pPr>
+          </a:lstStyle>
+          <a:p>
+            <a:pPr algn="l"/>
+            <a:r>
+              <a:rPr lang="ja-JP" altLang="pt-BR" dirty="0"/>
+              <a:t>白眼</a:t>
+            </a:r>
+            <a:r>
+              <a:rPr lang="es-MX" altLang="ja-JP" dirty="0"/>
+              <a:t>,</a:t>
+            </a:r>
+            <a:endParaRPr lang="pt-BR" altLang="ja-JP" dirty="0"/>
+          </a:p>
+          <a:p>
+            <a:pPr algn="l"/>
+            <a:r>
+              <a:rPr lang="pt-BR" altLang="ja-JP" sz="2000" dirty="0"/>
+              <a:t>“Aquele que tudo vê”</a:t>
+            </a:r>
+            <a:r>
+              <a:rPr lang="es-MX" altLang="ja-JP" sz="2000" dirty="0"/>
+              <a:t> </a:t>
+            </a:r>
+          </a:p>
+        </p:txBody>
+      </p:sp>
     </p:spTree>
     <p:extLst>
       <p:ext uri="{BB962C8B-B14F-4D97-AF65-F5344CB8AC3E}">
@@ -5314,25 +5589,25 @@
           <a:p>
             <a:r>
               <a:rPr lang="pt-BR" dirty="0"/>
+              <a:t>Soluções Similares;</a:t>
+            </a:r>
+          </a:p>
+          <a:p>
+            <a:r>
+              <a:rPr lang="pt-BR" dirty="0"/>
+              <a:t>Tecnologias Utilizadas; </a:t>
+            </a:r>
+          </a:p>
+          <a:p>
+            <a:r>
+              <a:rPr lang="pt-BR" dirty="0"/>
               <a:t>Disciplinas Integradas;</a:t>
-            </a:r>
-          </a:p>
-          <a:p>
-            <a:r>
-              <a:rPr lang="pt-BR" dirty="0"/>
-              <a:t>Soluções Similares;</a:t>
             </a:r>
           </a:p>
           <a:p>
             <a:r>
               <a:rPr lang="pt-BR" dirty="0"/>
               <a:t>Solução Tecnológica;</a:t>
-            </a:r>
-          </a:p>
-          <a:p>
-            <a:r>
-              <a:rPr lang="pt-BR" dirty="0"/>
-              <a:t>Tecnologias Utilizadas; </a:t>
             </a:r>
           </a:p>
           <a:p>
@@ -5452,25 +5727,32 @@
             <p:ph idx="1"/>
           </p:nvPr>
         </p:nvSpPr>
-        <p:spPr/>
-        <p:txBody>
-          <a:bodyPr/>
+        <p:spPr>
+          <a:xfrm>
+            <a:off x="838200" y="1550824"/>
+            <a:ext cx="10515600" cy="4351338"/>
+          </a:xfrm>
+        </p:spPr>
+        <p:txBody>
+          <a:bodyPr>
+            <a:normAutofit/>
+          </a:bodyPr>
           <a:lstStyle/>
           <a:p>
             <a:r>
-              <a:rPr lang="pt-BR" dirty="0"/>
+              <a:rPr lang="pt-BR" sz="2400" dirty="0"/>
               <a:t>Complexidade do acesso a áreas de desastre;</a:t>
             </a:r>
           </a:p>
           <a:p>
             <a:r>
-              <a:rPr lang="pt-BR" dirty="0"/>
+              <a:rPr lang="pt-BR" sz="2400" dirty="0"/>
               <a:t>Risco mútuo (resgatadores correm risco);</a:t>
             </a:r>
           </a:p>
           <a:p>
             <a:r>
-              <a:rPr lang="pt-BR" dirty="0"/>
+              <a:rPr lang="pt-BR" sz="2400" dirty="0"/>
               <a:t>Poucos equipamentos precisos que identifiquem vítimas;</a:t>
             </a:r>
           </a:p>
@@ -5592,28 +5874,86 @@
         </p:blipFill>
         <p:spPr>
           <a:xfrm>
-            <a:off x="6877791" y="3429000"/>
-            <a:ext cx="4476009" cy="2526497"/>
+            <a:off x="6691786" y="3080182"/>
+            <a:ext cx="4417742" cy="2629837"/>
           </a:xfrm>
           <a:prstGeom prst="rect">
             <a:avLst/>
           </a:prstGeom>
         </p:spPr>
       </p:pic>
+      <p:sp>
+        <p:nvSpPr>
+          <p:cNvPr id="6" name="CaixaDeTexto 5">
+            <a:extLst>
+              <a:ext uri="{FF2B5EF4-FFF2-40B4-BE49-F238E27FC236}">
+                <a16:creationId xmlns:a16="http://schemas.microsoft.com/office/drawing/2014/main" id="{87E12A50-D4F4-4F9F-8029-E1FB197969AC}"/>
+              </a:ext>
+            </a:extLst>
+          </p:cNvPr>
+          <p:cNvSpPr txBox="1"/>
+          <p:nvPr/>
+        </p:nvSpPr>
+        <p:spPr>
+          <a:xfrm>
+            <a:off x="1826054" y="5781684"/>
+            <a:ext cx="3598934" cy="584775"/>
+          </a:xfrm>
+          <a:prstGeom prst="rect">
+            <a:avLst/>
+          </a:prstGeom>
+          <a:noFill/>
+        </p:spPr>
+        <p:txBody>
+          <a:bodyPr wrap="none" rtlCol="0">
+            <a:spAutoFit/>
+          </a:bodyPr>
+          <a:lstStyle/>
+          <a:p>
+            <a:r>
+              <a:rPr lang="pt-BR" sz="1600" b="1" dirty="0"/>
+              <a:t>Figura 1 – </a:t>
+            </a:r>
+            <a:r>
+              <a:rPr lang="pt-BR" sz="1600" dirty="0"/>
+              <a:t>Terremoto na Indonésia,  2004</a:t>
+            </a:r>
+          </a:p>
+          <a:p>
+            <a:r>
+              <a:rPr lang="pt-BR" sz="1600" i="1" dirty="0"/>
+              <a:t>(</a:t>
+            </a:r>
+            <a:r>
+              <a:rPr lang="pt-BR" sz="1600" i="1" dirty="0" err="1"/>
+              <a:t>Getty</a:t>
+            </a:r>
+            <a:r>
+              <a:rPr lang="pt-BR" sz="1600" i="1" dirty="0"/>
+              <a:t> </a:t>
+            </a:r>
+            <a:r>
+              <a:rPr lang="pt-BR" sz="1600" i="1" dirty="0" err="1"/>
+              <a:t>Images</a:t>
+            </a:r>
+            <a:r>
+              <a:rPr lang="pt-BR" sz="1600" i="1" dirty="0"/>
+              <a:t>)</a:t>
+            </a:r>
+          </a:p>
+        </p:txBody>
+      </p:sp>
       <p:pic>
         <p:nvPicPr>
-          <p:cNvPr id="9" name="Imagem 8" descr="Escombros em um desastre">
-            <a:extLst>
-              <a:ext uri="{FF2B5EF4-FFF2-40B4-BE49-F238E27FC236}">
-                <a16:creationId xmlns:a16="http://schemas.microsoft.com/office/drawing/2014/main" id="{C38D68EA-152B-40B7-A2D0-DA948A36CC3C}"/>
-              </a:ext>
-              <a:ext uri="{C183D7F6-B498-43B3-948B-1728B52AA6E4}">
-                <adec:decorative xmlns:adec="http://schemas.microsoft.com/office/drawing/2017/decorative" val="0"/>
+          <p:cNvPr id="2054" name="Picture 6" descr="https://abrilexame.files.wordpress.com/2016/09/size_960_16_9_tailandia.jpg?quality=70&amp;strip=info&amp;w=920">
+            <a:extLst>
+              <a:ext uri="{FF2B5EF4-FFF2-40B4-BE49-F238E27FC236}">
+                <a16:creationId xmlns:a16="http://schemas.microsoft.com/office/drawing/2014/main" id="{AF8C25E7-ECE1-45DD-8FD7-49D12046BF2B}"/>
               </a:ext>
             </a:extLst>
           </p:cNvPr>
           <p:cNvPicPr>
-            <a:picLocks noChangeAspect="1"/>
+            <a:picLocks noChangeAspect="1" noChangeArrowheads="1"/>
           </p:cNvPicPr>
           <p:nvPr/>
         </p:nvPicPr>
@@ -5625,20 +5965,84 @@
               </a:ext>
             </a:extLst>
           </a:blip>
+          <a:srcRect/>
           <a:stretch>
             <a:fillRect/>
           </a:stretch>
         </p:blipFill>
-        <p:spPr>
+        <p:spPr bwMode="auto">
           <a:xfrm>
-            <a:off x="1960373" y="3429000"/>
-            <a:ext cx="3969566" cy="2629837"/>
+            <a:off x="1826054" y="3080182"/>
+            <a:ext cx="4417742" cy="2700141"/>
           </a:xfrm>
           <a:prstGeom prst="rect">
             <a:avLst/>
           </a:prstGeom>
+          <a:noFill/>
+          <a:extLst>
+            <a:ext uri="{909E8E84-426E-40DD-AFC4-6F175D3DCCD1}">
+              <a14:hiddenFill xmlns:a14="http://schemas.microsoft.com/office/drawing/2010/main">
+                <a:solidFill>
+                  <a:srgbClr val="FFFFFF"/>
+                </a:solidFill>
+              </a14:hiddenFill>
+            </a:ext>
+          </a:extLst>
         </p:spPr>
       </p:pic>
+      <p:sp>
+        <p:nvSpPr>
+          <p:cNvPr id="13" name="CaixaDeTexto 12">
+            <a:extLst>
+              <a:ext uri="{FF2B5EF4-FFF2-40B4-BE49-F238E27FC236}">
+                <a16:creationId xmlns:a16="http://schemas.microsoft.com/office/drawing/2014/main" id="{536B69E5-053E-40B3-A8E9-6B5021E3C38C}"/>
+              </a:ext>
+            </a:extLst>
+          </p:cNvPr>
+          <p:cNvSpPr txBox="1"/>
+          <p:nvPr/>
+        </p:nvSpPr>
+        <p:spPr>
+          <a:xfrm>
+            <a:off x="6640727" y="5727546"/>
+            <a:ext cx="3234925" cy="584775"/>
+          </a:xfrm>
+          <a:prstGeom prst="rect">
+            <a:avLst/>
+          </a:prstGeom>
+          <a:noFill/>
+        </p:spPr>
+        <p:txBody>
+          <a:bodyPr wrap="none" rtlCol="0">
+            <a:spAutoFit/>
+          </a:bodyPr>
+          <a:lstStyle/>
+          <a:p>
+            <a:r>
+              <a:rPr lang="pt-BR" sz="1600" b="1" dirty="0"/>
+              <a:t>Figura 2 – </a:t>
+            </a:r>
+            <a:r>
+              <a:rPr lang="pt-BR" sz="1600" dirty="0"/>
+              <a:t>Terremoto na Itália,  2016</a:t>
+            </a:r>
+          </a:p>
+          <a:p>
+            <a:r>
+              <a:rPr lang="pt-BR" sz="1600" i="1" dirty="0"/>
+              <a:t>(REUTERS/Stefano </a:t>
+            </a:r>
+            <a:r>
+              <a:rPr lang="pt-BR" sz="1600" i="1" dirty="0" err="1"/>
+              <a:t>Rellandini</a:t>
+            </a:r>
+            <a:r>
+              <a:rPr lang="pt-BR" sz="1600" i="1" dirty="0"/>
+              <a:t>)</a:t>
+            </a:r>
+          </a:p>
+        </p:txBody>
+      </p:sp>
     </p:spTree>
     <p:extLst>
       <p:ext uri="{BB962C8B-B14F-4D97-AF65-F5344CB8AC3E}">
@@ -5777,48 +6181,55 @@
           </a:xfrm>
         </p:spPr>
         <p:txBody>
-          <a:bodyPr/>
+          <a:bodyPr>
+            <a:normAutofit/>
+          </a:bodyPr>
           <a:lstStyle/>
           <a:p>
             <a:r>
-              <a:rPr lang="pt-BR" dirty="0"/>
+              <a:rPr lang="pt-BR" sz="3600" dirty="0"/>
               <a:t>Objetivo geral:</a:t>
             </a:r>
           </a:p>
           <a:p>
+            <a:pPr lvl="1"/>
             <a:r>
               <a:rPr lang="pt-BR" sz="2000" dirty="0"/>
               <a:t>Olimpíada Brasileira de Robótica (OBR);</a:t>
             </a:r>
           </a:p>
           <a:p>
+            <a:pPr lvl="1"/>
             <a:r>
               <a:rPr lang="pt-BR" sz="2000" dirty="0"/>
               <a:t>Emulação de resgate de vítimas em áreas de desastre;</a:t>
             </a:r>
           </a:p>
           <a:p>
-            <a:endParaRPr lang="pt-BR" sz="2000" dirty="0"/>
-          </a:p>
-          <a:p>
-            <a:r>
-              <a:rPr lang="pt-BR" dirty="0"/>
+            <a:endParaRPr lang="pt-BR" dirty="0"/>
+          </a:p>
+          <a:p>
+            <a:r>
+              <a:rPr lang="pt-BR" sz="3600" dirty="0"/>
               <a:t>Objetivo específico:</a:t>
             </a:r>
           </a:p>
           <a:p>
+            <a:pPr lvl="1"/>
             <a:r>
               <a:rPr lang="pt-BR" sz="2000" dirty="0"/>
               <a:t>Desenvolver uma solução para um dos desafios propostos pela OBR;</a:t>
             </a:r>
           </a:p>
           <a:p>
+            <a:pPr lvl="1"/>
             <a:r>
               <a:rPr lang="pt-BR" sz="2000" dirty="0"/>
               <a:t>Resgate das vítimas;</a:t>
             </a:r>
           </a:p>
           <a:p>
+            <a:pPr lvl="1"/>
             <a:r>
               <a:rPr lang="pt-BR" sz="2000" dirty="0"/>
               <a:t>Implementar métodos de tratamento de imagem ao robô;</a:t>
@@ -5921,7 +6332,7 @@
         </p:nvSpPr>
         <p:spPr>
           <a:xfrm>
-            <a:off x="838198" y="1406963"/>
+            <a:off x="1295398" y="1543985"/>
             <a:ext cx="4114800" cy="917574"/>
           </a:xfrm>
         </p:spPr>
@@ -5985,7 +6396,12 @@
             <p:ph type="title"/>
           </p:nvPr>
         </p:nvSpPr>
-        <p:spPr/>
+        <p:spPr>
+          <a:xfrm>
+            <a:off x="1927654" y="201929"/>
+            <a:ext cx="9426146" cy="958218"/>
+          </a:xfrm>
+        </p:spPr>
         <p:txBody>
           <a:bodyPr/>
           <a:lstStyle/>
@@ -6053,8 +6469,8 @@
         </p:blipFill>
         <p:spPr>
           <a:xfrm>
-            <a:off x="838198" y="2761763"/>
-            <a:ext cx="4165959" cy="3157359"/>
+            <a:off x="1295398" y="3148768"/>
+            <a:ext cx="4165959" cy="2907376"/>
           </a:xfrm>
           <a:prstGeom prst="rect">
             <a:avLst/>
@@ -6075,7 +6491,7 @@
         </p:nvSpPr>
         <p:spPr>
           <a:xfrm>
-            <a:off x="6096000" y="1323330"/>
+            <a:off x="6553200" y="1460352"/>
             <a:ext cx="4114800" cy="1631216"/>
           </a:xfrm>
           <a:prstGeom prst="rect">
@@ -6122,7 +6538,7 @@
         </p:blipFill>
         <p:spPr>
           <a:xfrm>
-            <a:off x="6096000" y="3011746"/>
+            <a:off x="6553200" y="3148768"/>
             <a:ext cx="3714750" cy="2907376"/>
           </a:xfrm>
           <a:prstGeom prst="rect">
@@ -6722,12 +7138,8 @@
           <a:lstStyle/>
           <a:p>
             <a:r>
-              <a:rPr lang="pt-BR" dirty="0" err="1"/>
-              <a:t>Byakugan</a:t>
-            </a:r>
-            <a:r>
               <a:rPr lang="pt-BR" dirty="0"/>
-              <a:t>: Visão Computacional</a:t>
+              <a:t>Byakugan: Visão Computacional</a:t>
             </a:r>
           </a:p>
         </p:txBody>
@@ -6949,57 +7361,6 @@
           </a:extLst>
         </p:spPr>
       </p:pic>
-      <p:cxnSp>
-        <p:nvCxnSpPr>
-          <p:cNvPr id="21" name="Conector de Seta Reta 20">
-            <a:extLst>
-              <a:ext uri="{FF2B5EF4-FFF2-40B4-BE49-F238E27FC236}">
-                <a16:creationId xmlns:a16="http://schemas.microsoft.com/office/drawing/2014/main" id="{3BFB8C97-DCD1-4CD1-83A2-0B5A71E82BAB}"/>
-              </a:ext>
-            </a:extLst>
-          </p:cNvPr>
-          <p:cNvCxnSpPr>
-            <a:cxnSpLocks/>
-          </p:cNvCxnSpPr>
-          <p:nvPr/>
-        </p:nvCxnSpPr>
-        <p:spPr>
-          <a:xfrm>
-            <a:off x="1764816" y="3708587"/>
-            <a:ext cx="693246" cy="0"/>
-          </a:xfrm>
-          <a:prstGeom prst="straightConnector1">
-            <a:avLst/>
-          </a:prstGeom>
-          <a:ln w="57150">
-            <a:solidFill>
-              <a:schemeClr val="tx1"/>
-            </a:solidFill>
-            <a:tailEnd type="triangle"/>
-          </a:ln>
-          <a:effectLst>
-            <a:outerShdw blurRad="50800" dist="38100" algn="l" rotWithShape="0">
-              <a:prstClr val="black">
-                <a:alpha val="40000"/>
-              </a:prstClr>
-            </a:outerShdw>
-          </a:effectLst>
-        </p:spPr>
-        <p:style>
-          <a:lnRef idx="1">
-            <a:schemeClr val="accent1"/>
-          </a:lnRef>
-          <a:fillRef idx="0">
-            <a:schemeClr val="accent1"/>
-          </a:fillRef>
-          <a:effectRef idx="0">
-            <a:schemeClr val="accent1"/>
-          </a:effectRef>
-          <a:fontRef idx="minor">
-            <a:schemeClr val="tx1"/>
-          </a:fontRef>
-        </p:style>
-      </p:cxnSp>
       <p:pic>
         <p:nvPicPr>
           <p:cNvPr id="1028" name="Picture 4" descr="Resultado de imagem para raspberry pi 3">
@@ -7029,7 +7390,7 @@
         </p:blipFill>
         <p:spPr bwMode="auto">
           <a:xfrm>
-            <a:off x="2620900" y="3082119"/>
+            <a:off x="2618061" y="3198092"/>
             <a:ext cx="2427623" cy="1352262"/>
           </a:xfrm>
           <a:prstGeom prst="rect">
@@ -7074,7 +7435,7 @@
         </p:blipFill>
         <p:spPr bwMode="auto">
           <a:xfrm>
-            <a:off x="5741769" y="2844919"/>
+            <a:off x="5741769" y="2888274"/>
             <a:ext cx="2452796" cy="1837204"/>
           </a:xfrm>
           <a:prstGeom prst="rect">
@@ -7092,12 +7453,160 @@
           </a:extLst>
         </p:spPr>
       </p:pic>
+      <p:sp>
+        <p:nvSpPr>
+          <p:cNvPr id="2" name="CaixaDeTexto 1">
+            <a:extLst>
+              <a:ext uri="{FF2B5EF4-FFF2-40B4-BE49-F238E27FC236}">
+                <a16:creationId xmlns:a16="http://schemas.microsoft.com/office/drawing/2014/main" id="{7DDDA774-3276-4C09-824F-5A98E1CF1398}"/>
+              </a:ext>
+            </a:extLst>
+          </p:cNvPr>
+          <p:cNvSpPr txBox="1"/>
+          <p:nvPr/>
+        </p:nvSpPr>
+        <p:spPr>
+          <a:xfrm>
+            <a:off x="238555" y="4682123"/>
+            <a:ext cx="1689099" cy="923330"/>
+          </a:xfrm>
+          <a:prstGeom prst="rect">
+            <a:avLst/>
+          </a:prstGeom>
+          <a:noFill/>
+        </p:spPr>
+        <p:txBody>
+          <a:bodyPr wrap="square" rtlCol="0">
+            <a:spAutoFit/>
+          </a:bodyPr>
+          <a:lstStyle/>
+          <a:p>
+            <a:pPr algn="ctr"/>
+            <a:r>
+              <a:rPr lang="it-IT" b="1" dirty="0"/>
+              <a:t>Raspberry Pi Camera Module V2</a:t>
+            </a:r>
+            <a:endParaRPr lang="pt-BR" b="1" dirty="0"/>
+          </a:p>
+        </p:txBody>
+      </p:sp>
+      <p:sp>
+        <p:nvSpPr>
+          <p:cNvPr id="14" name="CaixaDeTexto 13">
+            <a:extLst>
+              <a:ext uri="{FF2B5EF4-FFF2-40B4-BE49-F238E27FC236}">
+                <a16:creationId xmlns:a16="http://schemas.microsoft.com/office/drawing/2014/main" id="{CB73B2C6-DC36-49AA-8370-6306E9DF0F44}"/>
+              </a:ext>
+            </a:extLst>
+          </p:cNvPr>
+          <p:cNvSpPr txBox="1"/>
+          <p:nvPr/>
+        </p:nvSpPr>
+        <p:spPr>
+          <a:xfrm>
+            <a:off x="2979681" y="4774456"/>
+            <a:ext cx="1689099" cy="369332"/>
+          </a:xfrm>
+          <a:prstGeom prst="rect">
+            <a:avLst/>
+          </a:prstGeom>
+          <a:noFill/>
+        </p:spPr>
+        <p:txBody>
+          <a:bodyPr wrap="square" rtlCol="0">
+            <a:spAutoFit/>
+          </a:bodyPr>
+          <a:lstStyle/>
+          <a:p>
+            <a:pPr algn="ctr"/>
+            <a:r>
+              <a:rPr lang="it-IT" b="1" dirty="0"/>
+              <a:t>Raspberry PI</a:t>
+            </a:r>
+            <a:endParaRPr lang="pt-BR" b="1" dirty="0"/>
+          </a:p>
+        </p:txBody>
+      </p:sp>
+      <p:sp>
+        <p:nvSpPr>
+          <p:cNvPr id="15" name="CaixaDeTexto 14">
+            <a:extLst>
+              <a:ext uri="{FF2B5EF4-FFF2-40B4-BE49-F238E27FC236}">
+                <a16:creationId xmlns:a16="http://schemas.microsoft.com/office/drawing/2014/main" id="{D50EF629-467E-482A-8CB1-B214A2221EDF}"/>
+              </a:ext>
+            </a:extLst>
+          </p:cNvPr>
+          <p:cNvSpPr txBox="1"/>
+          <p:nvPr/>
+        </p:nvSpPr>
+        <p:spPr>
+          <a:xfrm>
+            <a:off x="6096000" y="4713537"/>
+            <a:ext cx="1689099" cy="646331"/>
+          </a:xfrm>
+          <a:prstGeom prst="rect">
+            <a:avLst/>
+          </a:prstGeom>
+          <a:noFill/>
+        </p:spPr>
+        <p:txBody>
+          <a:bodyPr wrap="square" rtlCol="0">
+            <a:spAutoFit/>
+          </a:bodyPr>
+          <a:lstStyle/>
+          <a:p>
+            <a:pPr algn="ctr"/>
+            <a:r>
+              <a:rPr lang="it-IT" b="1" dirty="0"/>
+              <a:t>Arduno Mega ADK</a:t>
+            </a:r>
+            <a:endParaRPr lang="pt-BR" b="1" dirty="0"/>
+          </a:p>
+        </p:txBody>
+      </p:sp>
+      <p:sp>
+        <p:nvSpPr>
+          <p:cNvPr id="16" name="CaixaDeTexto 15">
+            <a:extLst>
+              <a:ext uri="{FF2B5EF4-FFF2-40B4-BE49-F238E27FC236}">
+                <a16:creationId xmlns:a16="http://schemas.microsoft.com/office/drawing/2014/main" id="{90863D6E-CC48-49B4-AF70-5A479FC659CF}"/>
+              </a:ext>
+            </a:extLst>
+          </p:cNvPr>
+          <p:cNvSpPr txBox="1"/>
+          <p:nvPr/>
+        </p:nvSpPr>
+        <p:spPr>
+          <a:xfrm>
+            <a:off x="9892311" y="4667370"/>
+            <a:ext cx="1689099" cy="369332"/>
+          </a:xfrm>
+          <a:prstGeom prst="rect">
+            <a:avLst/>
+          </a:prstGeom>
+          <a:noFill/>
+        </p:spPr>
+        <p:txBody>
+          <a:bodyPr wrap="square" rtlCol="0">
+            <a:spAutoFit/>
+          </a:bodyPr>
+          <a:lstStyle/>
+          <a:p>
+            <a:pPr algn="ctr"/>
+            <a:r>
+              <a:rPr lang="it-IT" b="1" dirty="0"/>
+              <a:t>Robô</a:t>
+            </a:r>
+            <a:endParaRPr lang="pt-BR" b="1" dirty="0"/>
+          </a:p>
+        </p:txBody>
+      </p:sp>
       <p:pic>
         <p:nvPicPr>
-          <p:cNvPr id="47" name="Imagem 46" descr="Uma imagem contendo metalúrgico, engrenagem, interior&#10;&#10;Descrição gerada automaticamente">
-            <a:extLst>
-              <a:ext uri="{FF2B5EF4-FFF2-40B4-BE49-F238E27FC236}">
-                <a16:creationId xmlns:a16="http://schemas.microsoft.com/office/drawing/2014/main" id="{0B1A06F9-4F8F-4312-8486-A4F625FD788B}"/>
+          <p:cNvPr id="17" name="Imagem 16">
+            <a:extLst>
+              <a:ext uri="{FF2B5EF4-FFF2-40B4-BE49-F238E27FC236}">
+                <a16:creationId xmlns:a16="http://schemas.microsoft.com/office/drawing/2014/main" id="{3BF91E90-5BB0-4231-96F6-BEDB7BB4638E}"/>
               </a:ext>
             </a:extLst>
           </p:cNvPr>
@@ -7106,21 +7615,59 @@
           </p:cNvPicPr>
           <p:nvPr/>
         </p:nvPicPr>
-        <p:blipFill rotWithShape="1">
+        <p:blipFill>
           <a:blip r:embed="rId5">
-            <a:extLst>
-              <a:ext uri="{28A0092B-C50C-407E-A947-70E740481C1C}">
-                <a14:useLocalDpi xmlns:a14="http://schemas.microsoft.com/office/drawing/2010/main" val="0"/>
+            <a:alphaModFix/>
+            <a:extLst>
+              <a:ext uri="{BEBA8EAE-BF5A-486C-A8C5-ECC9F3942E4B}">
+                <a14:imgProps xmlns:a14="http://schemas.microsoft.com/office/drawing/2010/main">
+                  <a14:imgLayer r:embed="rId6">
+                    <a14:imgEffect>
+                      <a14:backgroundRemoval t="9658" b="97183" l="9976" r="96837">
+                        <a14:foregroundMark x1="52433" y1="84507" x2="52433" y2="84507"/>
+                        <a14:foregroundMark x1="51460" y1="74648" x2="53771" y2="74245"/>
+                        <a14:foregroundMark x1="68248" y1="78873" x2="54988" y2="72636"/>
+                        <a14:foregroundMark x1="54988" y1="72636" x2="64355" y2="81288"/>
+                        <a14:foregroundMark x1="84550" y1="81891" x2="82238" y2="83501"/>
+                        <a14:foregroundMark x1="92092" y1="81891" x2="92214" y2="74044"/>
+                        <a14:foregroundMark x1="95012" y1="70423" x2="96837" y2="84708"/>
+                        <a14:foregroundMark x1="48297" y1="97183" x2="43917" y2="96579"/>
+                        <a14:foregroundMark x1="55961" y1="40241" x2="57056" y2="42857"/>
+                        <a14:backgroundMark x1="67153" y1="32596" x2="67153" y2="32596"/>
+                        <a14:backgroundMark x1="66180" y1="31388" x2="66180" y2="31388"/>
+                        <a14:backgroundMark x1="69830" y1="27364" x2="65815" y2="36217"/>
+                        <a14:backgroundMark x1="64842" y1="31187" x2="64842" y2="33602"/>
+                        <a14:backgroundMark x1="71776" y1="33400" x2="70316" y2="28773"/>
+                        <a14:backgroundMark x1="71776" y1="29175" x2="66302" y2="51509"/>
+                        <a14:backgroundMark x1="66302" y1="51509" x2="62774" y2="46076"/>
+                        <a14:backgroundMark x1="33698" y1="30584" x2="33333" y2="38632"/>
+                        <a14:backgroundMark x1="34428" y1="34205" x2="31022" y2="41449"/>
+                        <a14:backgroundMark x1="39173" y1="34608" x2="30414" y2="40644"/>
+                        <a14:backgroundMark x1="37956" y1="36821" x2="32968" y2="39839"/>
+                        <a14:backgroundMark x1="31873" y1="40241" x2="36496" y2="41650"/>
+                        <a14:backgroundMark x1="57166" y1="42747" x2="57178" y2="43058"/>
+                        <a14:backgroundMark x1="54015" y1="29175" x2="59976" y2="23541"/>
+                        <a14:backgroundMark x1="52555" y1="32596" x2="42579" y2="20322"/>
+                        <a14:backgroundMark x1="72141" y1="47887" x2="68248" y2="53320"/>
+                        <a14:backgroundMark x1="66910" y1="53521" x2="65937" y2="55533"/>
+                        <a14:backgroundMark x1="73236" y1="57746" x2="73236" y2="57746"/>
+                        <a14:backgroundMark x1="74088" y1="56740" x2="74088" y2="56740"/>
+                        <a14:backgroundMark x1="75182" y1="60161" x2="74574" y2="60161"/>
+                      </a14:backgroundRemoval>
+                    </a14:imgEffect>
+                  </a14:imgLayer>
+                </a14:imgProps>
               </a:ext>
             </a:extLst>
           </a:blip>
-          <a:srcRect l="13972" t="1869" r="14435" b="3442"/>
-          <a:stretch/>
+          <a:stretch>
+            <a:fillRect/>
+          </a:stretch>
         </p:blipFill>
         <p:spPr>
           <a:xfrm>
-            <a:off x="8938817" y="2448963"/>
-            <a:ext cx="2968408" cy="2618571"/>
+            <a:off x="8498552" y="2399553"/>
+            <a:ext cx="3557261" cy="2150801"/>
           </a:xfrm>
           <a:prstGeom prst="rect">
             <a:avLst/>
@@ -7129,110 +7676,255 @@
       </p:pic>
       <p:cxnSp>
         <p:nvCxnSpPr>
-          <p:cNvPr id="12" name="Conector de Seta Reta 11">
-            <a:extLst>
-              <a:ext uri="{FF2B5EF4-FFF2-40B4-BE49-F238E27FC236}">
-                <a16:creationId xmlns:a16="http://schemas.microsoft.com/office/drawing/2014/main" id="{441A86EB-3EC5-43C9-8367-313130A0EE7F}"/>
+          <p:cNvPr id="8" name="Conector: Curvo 7">
+            <a:extLst>
+              <a:ext uri="{FF2B5EF4-FFF2-40B4-BE49-F238E27FC236}">
+                <a16:creationId xmlns:a16="http://schemas.microsoft.com/office/drawing/2014/main" id="{C65D3A23-469A-430E-934C-5FECF7D74EFB}"/>
               </a:ext>
             </a:extLst>
           </p:cNvPr>
           <p:cNvCxnSpPr>
             <a:cxnSpLocks/>
-            <a:stCxn id="1028" idx="3"/>
-            <a:endCxn id="1030" idx="1"/>
           </p:cNvCxnSpPr>
           <p:nvPr/>
         </p:nvCxnSpPr>
         <p:spPr>
           <a:xfrm>
-            <a:off x="5048523" y="3758250"/>
-            <a:ext cx="693246" cy="5271"/>
+            <a:off x="1681183" y="2862553"/>
+            <a:ext cx="2150689" cy="237198"/>
           </a:xfrm>
-          <a:prstGeom prst="straightConnector1">
+          <a:prstGeom prst="curvedConnector2">
             <a:avLst/>
           </a:prstGeom>
-          <a:ln w="57150">
+          <a:ln w="76200">
             <a:solidFill>
-              <a:schemeClr val="tx1"/>
+              <a:schemeClr val="tx1">
+                <a:lumMod val="95000"/>
+                <a:lumOff val="5000"/>
+              </a:schemeClr>
             </a:solidFill>
             <a:tailEnd type="triangle"/>
           </a:ln>
-          <a:effectLst>
-            <a:outerShdw blurRad="50800" dist="38100" algn="l" rotWithShape="0">
-              <a:prstClr val="black">
-                <a:alpha val="40000"/>
-              </a:prstClr>
-            </a:outerShdw>
-          </a:effectLst>
         </p:spPr>
         <p:style>
           <a:lnRef idx="1">
-            <a:schemeClr val="accent1"/>
+            <a:schemeClr val="dk1"/>
           </a:lnRef>
           <a:fillRef idx="0">
-            <a:schemeClr val="accent1"/>
+            <a:schemeClr val="dk1"/>
           </a:fillRef>
           <a:effectRef idx="0">
-            <a:schemeClr val="accent1"/>
+            <a:schemeClr val="dk1"/>
           </a:effectRef>
           <a:fontRef idx="minor">
             <a:schemeClr val="tx1"/>
           </a:fontRef>
         </p:style>
       </p:cxnSp>
+      <p:sp>
+        <p:nvSpPr>
+          <p:cNvPr id="22" name="CaixaDeTexto 21">
+            <a:extLst>
+              <a:ext uri="{FF2B5EF4-FFF2-40B4-BE49-F238E27FC236}">
+                <a16:creationId xmlns:a16="http://schemas.microsoft.com/office/drawing/2014/main" id="{A521D0EA-665C-46DE-9D4F-1C335004403A}"/>
+              </a:ext>
+            </a:extLst>
+          </p:cNvPr>
+          <p:cNvSpPr txBox="1"/>
+          <p:nvPr/>
+        </p:nvSpPr>
+        <p:spPr>
+          <a:xfrm>
+            <a:off x="1914817" y="2399553"/>
+            <a:ext cx="1689099" cy="369332"/>
+          </a:xfrm>
+          <a:prstGeom prst="rect">
+            <a:avLst/>
+          </a:prstGeom>
+          <a:noFill/>
+        </p:spPr>
+        <p:txBody>
+          <a:bodyPr wrap="square" rtlCol="0">
+            <a:spAutoFit/>
+          </a:bodyPr>
+          <a:lstStyle/>
+          <a:p>
+            <a:pPr algn="ctr"/>
+            <a:r>
+              <a:rPr lang="it-IT" dirty="0"/>
+              <a:t>Imagem</a:t>
+            </a:r>
+            <a:endParaRPr lang="pt-BR" dirty="0"/>
+          </a:p>
+        </p:txBody>
+      </p:sp>
       <p:cxnSp>
         <p:nvCxnSpPr>
-          <p:cNvPr id="13" name="Conector de Seta Reta 12">
-            <a:extLst>
-              <a:ext uri="{FF2B5EF4-FFF2-40B4-BE49-F238E27FC236}">
-                <a16:creationId xmlns:a16="http://schemas.microsoft.com/office/drawing/2014/main" id="{BB7E3651-88A7-415E-83AE-911FF46EA05F}"/>
+          <p:cNvPr id="23" name="Conector: Curvo 22">
+            <a:extLst>
+              <a:ext uri="{FF2B5EF4-FFF2-40B4-BE49-F238E27FC236}">
+                <a16:creationId xmlns:a16="http://schemas.microsoft.com/office/drawing/2014/main" id="{47CCC499-10CA-4EBD-A2C3-A593AF0BEE4B}"/>
               </a:ext>
             </a:extLst>
           </p:cNvPr>
           <p:cNvCxnSpPr>
             <a:cxnSpLocks/>
-            <a:stCxn id="1030" idx="3"/>
-            <a:endCxn id="47" idx="1"/>
           </p:cNvCxnSpPr>
           <p:nvPr/>
         </p:nvCxnSpPr>
         <p:spPr>
-          <a:xfrm flipV="1">
-            <a:off x="8194565" y="3758249"/>
-            <a:ext cx="744252" cy="5272"/>
+          <a:xfrm>
+            <a:off x="4599841" y="2844921"/>
+            <a:ext cx="2150689" cy="237198"/>
           </a:xfrm>
-          <a:prstGeom prst="straightConnector1">
+          <a:prstGeom prst="curvedConnector2">
             <a:avLst/>
           </a:prstGeom>
-          <a:ln w="57150">
+          <a:ln w="76200">
             <a:solidFill>
-              <a:schemeClr val="tx1"/>
+              <a:schemeClr val="tx1">
+                <a:lumMod val="95000"/>
+                <a:lumOff val="5000"/>
+              </a:schemeClr>
             </a:solidFill>
             <a:tailEnd type="triangle"/>
           </a:ln>
-          <a:effectLst>
-            <a:outerShdw blurRad="50800" dist="38100" algn="l" rotWithShape="0">
-              <a:prstClr val="black">
-                <a:alpha val="40000"/>
-              </a:prstClr>
-            </a:outerShdw>
-          </a:effectLst>
         </p:spPr>
         <p:style>
           <a:lnRef idx="1">
-            <a:schemeClr val="accent1"/>
+            <a:schemeClr val="dk1"/>
           </a:lnRef>
           <a:fillRef idx="0">
-            <a:schemeClr val="accent1"/>
+            <a:schemeClr val="dk1"/>
           </a:fillRef>
           <a:effectRef idx="0">
-            <a:schemeClr val="accent1"/>
+            <a:schemeClr val="dk1"/>
           </a:effectRef>
           <a:fontRef idx="minor">
             <a:schemeClr val="tx1"/>
           </a:fontRef>
         </p:style>
       </p:cxnSp>
+      <p:sp>
+        <p:nvSpPr>
+          <p:cNvPr id="24" name="CaixaDeTexto 23">
+            <a:extLst>
+              <a:ext uri="{FF2B5EF4-FFF2-40B4-BE49-F238E27FC236}">
+                <a16:creationId xmlns:a16="http://schemas.microsoft.com/office/drawing/2014/main" id="{A76D24BD-9CC6-4DDD-9959-D475B9989A13}"/>
+              </a:ext>
+            </a:extLst>
+          </p:cNvPr>
+          <p:cNvSpPr txBox="1"/>
+          <p:nvPr/>
+        </p:nvSpPr>
+        <p:spPr>
+          <a:xfrm>
+            <a:off x="4830635" y="2374722"/>
+            <a:ext cx="1689099" cy="369332"/>
+          </a:xfrm>
+          <a:prstGeom prst="rect">
+            <a:avLst/>
+          </a:prstGeom>
+          <a:noFill/>
+        </p:spPr>
+        <p:txBody>
+          <a:bodyPr wrap="square" rtlCol="0">
+            <a:spAutoFit/>
+          </a:bodyPr>
+          <a:lstStyle/>
+          <a:p>
+            <a:pPr algn="ctr"/>
+            <a:r>
+              <a:rPr lang="it-IT" dirty="0"/>
+              <a:t>Coordenadas</a:t>
+            </a:r>
+            <a:endParaRPr lang="pt-BR" dirty="0"/>
+          </a:p>
+        </p:txBody>
+      </p:sp>
+      <p:cxnSp>
+        <p:nvCxnSpPr>
+          <p:cNvPr id="30" name="Conector: Curvo 29">
+            <a:extLst>
+              <a:ext uri="{FF2B5EF4-FFF2-40B4-BE49-F238E27FC236}">
+                <a16:creationId xmlns:a16="http://schemas.microsoft.com/office/drawing/2014/main" id="{37E73A21-6B49-4E6B-B4BF-400D936EADEF}"/>
+              </a:ext>
+            </a:extLst>
+          </p:cNvPr>
+          <p:cNvCxnSpPr>
+            <a:cxnSpLocks/>
+          </p:cNvCxnSpPr>
+          <p:nvPr/>
+        </p:nvCxnSpPr>
+        <p:spPr>
+          <a:xfrm>
+            <a:off x="7812466" y="2862553"/>
+            <a:ext cx="2150689" cy="237198"/>
+          </a:xfrm>
+          <a:prstGeom prst="curvedConnector2">
+            <a:avLst/>
+          </a:prstGeom>
+          <a:ln w="76200">
+            <a:solidFill>
+              <a:schemeClr val="tx1">
+                <a:lumMod val="95000"/>
+                <a:lumOff val="5000"/>
+              </a:schemeClr>
+            </a:solidFill>
+            <a:tailEnd type="triangle"/>
+          </a:ln>
+        </p:spPr>
+        <p:style>
+          <a:lnRef idx="1">
+            <a:schemeClr val="dk1"/>
+          </a:lnRef>
+          <a:fillRef idx="0">
+            <a:schemeClr val="dk1"/>
+          </a:fillRef>
+          <a:effectRef idx="0">
+            <a:schemeClr val="dk1"/>
+          </a:effectRef>
+          <a:fontRef idx="minor">
+            <a:schemeClr val="tx1"/>
+          </a:fontRef>
+        </p:style>
+      </p:cxnSp>
+      <p:sp>
+        <p:nvSpPr>
+          <p:cNvPr id="31" name="CaixaDeTexto 30">
+            <a:extLst>
+              <a:ext uri="{FF2B5EF4-FFF2-40B4-BE49-F238E27FC236}">
+                <a16:creationId xmlns:a16="http://schemas.microsoft.com/office/drawing/2014/main" id="{6A309C53-BBBF-400E-8D73-D48E73E216C0}"/>
+              </a:ext>
+            </a:extLst>
+          </p:cNvPr>
+          <p:cNvSpPr txBox="1"/>
+          <p:nvPr/>
+        </p:nvSpPr>
+        <p:spPr>
+          <a:xfrm>
+            <a:off x="8043260" y="2392354"/>
+            <a:ext cx="1689099" cy="369332"/>
+          </a:xfrm>
+          <a:prstGeom prst="rect">
+            <a:avLst/>
+          </a:prstGeom>
+          <a:noFill/>
+        </p:spPr>
+        <p:txBody>
+          <a:bodyPr wrap="square" rtlCol="0">
+            <a:spAutoFit/>
+          </a:bodyPr>
+          <a:lstStyle/>
+          <a:p>
+            <a:pPr algn="ctr"/>
+            <a:r>
+              <a:rPr lang="pt-BR" dirty="0"/>
+              <a:t>Controle</a:t>
+            </a:r>
+          </a:p>
+        </p:txBody>
+      </p:sp>
     </p:spTree>
     <p:extLst>
       <p:ext uri="{BB962C8B-B14F-4D97-AF65-F5344CB8AC3E}">

</xml_diff>

<commit_message>
Novas artes no slide
</commit_message>
<xml_diff>
--- a/Slide.pptx
+++ b/Slide.pptx
@@ -5,7 +5,7 @@
     <p:sldMasterId id="2147483648" r:id="rId1"/>
   </p:sldMasterIdLst>
   <p:notesMasterIdLst>
-    <p:notesMasterId r:id="rId14"/>
+    <p:notesMasterId r:id="rId15"/>
   </p:notesMasterIdLst>
   <p:sldIdLst>
     <p:sldId id="256" r:id="rId2"/>
@@ -20,6 +20,7 @@
     <p:sldId id="265" r:id="rId11"/>
     <p:sldId id="268" r:id="rId12"/>
     <p:sldId id="266" r:id="rId13"/>
+    <p:sldId id="269" r:id="rId14"/>
   </p:sldIdLst>
   <p:sldSz cx="12192000" cy="6858000"/>
   <p:notesSz cx="6858000" cy="9144000"/>
@@ -4438,7 +4439,7 @@
         </p:nvPicPr>
         <p:blipFill>
           <a:blip r:embed="rId2">
-            <a:alphaModFix amt="18000"/>
+            <a:alphaModFix amt="35000"/>
           </a:blip>
           <a:stretch>
             <a:fillRect/>
@@ -4472,19 +4473,19 @@
         </p:nvSpPr>
         <p:spPr>
           <a:xfrm>
-            <a:off x="5481070" y="3527822"/>
-            <a:ext cx="3691065" cy="365125"/>
+            <a:off x="4604004" y="3458973"/>
+            <a:ext cx="4568131" cy="365125"/>
           </a:xfrm>
         </p:spPr>
         <p:txBody>
           <a:bodyPr>
-            <a:normAutofit fontScale="85000" lnSpcReduction="20000"/>
+            <a:noAutofit/>
           </a:bodyPr>
           <a:lstStyle/>
           <a:p>
             <a:pPr algn="r"/>
             <a:r>
-              <a:rPr lang="pt-BR" dirty="0"/>
+              <a:rPr lang="pt-BR" sz="3600" dirty="0"/>
               <a:t>Visão Computacional</a:t>
             </a:r>
           </a:p>
@@ -4508,19 +4509,19 @@
         </p:nvSpPr>
         <p:spPr>
           <a:xfrm>
-            <a:off x="4149973" y="2528364"/>
-            <a:ext cx="4965891" cy="969485"/>
+            <a:off x="2969985" y="2459515"/>
+            <a:ext cx="6145879" cy="969485"/>
           </a:xfrm>
         </p:spPr>
         <p:txBody>
           <a:bodyPr>
-            <a:normAutofit/>
+            <a:normAutofit fontScale="90000"/>
           </a:bodyPr>
           <a:lstStyle/>
           <a:p>
             <a:pPr algn="r"/>
             <a:r>
-              <a:rPr lang="pt-BR" sz="4800" dirty="0"/>
+              <a:rPr lang="pt-BR" sz="6600" dirty="0"/>
               <a:t>Byakugan </a:t>
             </a:r>
           </a:p>
@@ -4559,53 +4560,6 @@
           </a:p>
         </p:txBody>
       </p:sp>
-      <p:pic>
-        <p:nvPicPr>
-          <p:cNvPr id="1026" name="Picture 2" descr="Resultado de imagem para BYAKUGAN PNG">
-            <a:extLst>
-              <a:ext uri="{FF2B5EF4-FFF2-40B4-BE49-F238E27FC236}">
-                <a16:creationId xmlns:a16="http://schemas.microsoft.com/office/drawing/2014/main" id="{BA6E7915-B080-4752-96B1-13E654C9205C}"/>
-              </a:ext>
-            </a:extLst>
-          </p:cNvPr>
-          <p:cNvPicPr>
-            <a:picLocks noChangeAspect="1" noChangeArrowheads="1"/>
-          </p:cNvPicPr>
-          <p:nvPr/>
-        </p:nvPicPr>
-        <p:blipFill>
-          <a:blip r:embed="rId3">
-            <a:extLst>
-              <a:ext uri="{28A0092B-C50C-407E-A947-70E740481C1C}">
-                <a14:useLocalDpi xmlns:a14="http://schemas.microsoft.com/office/drawing/2010/main" val="0"/>
-              </a:ext>
-            </a:extLst>
-          </a:blip>
-          <a:srcRect/>
-          <a:stretch>
-            <a:fillRect/>
-          </a:stretch>
-        </p:blipFill>
-        <p:spPr bwMode="auto">
-          <a:xfrm>
-            <a:off x="9583000" y="2321169"/>
-            <a:ext cx="700477" cy="679154"/>
-          </a:xfrm>
-          <a:prstGeom prst="rect">
-            <a:avLst/>
-          </a:prstGeom>
-          <a:noFill/>
-          <a:extLst>
-            <a:ext uri="{909E8E84-426E-40DD-AFC4-6F175D3DCCD1}">
-              <a14:hiddenFill xmlns:a14="http://schemas.microsoft.com/office/drawing/2010/main">
-                <a:solidFill>
-                  <a:srgbClr val="FFFFFF"/>
-                </a:solidFill>
-              </a14:hiddenFill>
-            </a:ext>
-          </a:extLst>
-        </p:spPr>
-      </p:pic>
       <p:cxnSp>
         <p:nvCxnSpPr>
           <p:cNvPr id="16" name="Conector reto 15">
@@ -4660,8 +4614,8 @@
           <p:nvPr/>
         </p:nvPicPr>
         <p:blipFill>
-          <a:blip r:embed="rId4">
-            <a:alphaModFix amt="44000"/>
+          <a:blip r:embed="rId3">
+            <a:alphaModFix amt="50000"/>
             <a:extLst>
               <a:ext uri="{28A0092B-C50C-407E-A947-70E740481C1C}">
                 <a14:useLocalDpi xmlns:a14="http://schemas.microsoft.com/office/drawing/2010/main" val="0"/>
@@ -4674,7 +4628,7 @@
         </p:blipFill>
         <p:spPr>
           <a:xfrm>
-            <a:off x="10163697" y="5068299"/>
+            <a:off x="10231416" y="5068299"/>
             <a:ext cx="1625242" cy="1506930"/>
           </a:xfrm>
           <a:prstGeom prst="rect">
@@ -4889,7 +4843,7 @@
             <a:pPr algn="l"/>
             <a:r>
               <a:rPr lang="pt-BR" altLang="ja-JP" sz="2000" dirty="0"/>
-              <a:t>“Aquele que tudo vê”</a:t>
+              <a:t>“O olho que tudo vê”</a:t>
             </a:r>
             <a:r>
               <a:rPr lang="es-MX" altLang="ja-JP" sz="2000" dirty="0"/>
@@ -4898,6 +4852,53 @@
           </a:p>
         </p:txBody>
       </p:sp>
+      <p:pic>
+        <p:nvPicPr>
+          <p:cNvPr id="11" name="Picture 2" descr="Resultado de imagem para BYAKUGAN PNG">
+            <a:extLst>
+              <a:ext uri="{FF2B5EF4-FFF2-40B4-BE49-F238E27FC236}">
+                <a16:creationId xmlns:a16="http://schemas.microsoft.com/office/drawing/2014/main" id="{C470A618-787A-4139-977D-24A69002F2F5}"/>
+              </a:ext>
+            </a:extLst>
+          </p:cNvPr>
+          <p:cNvPicPr>
+            <a:picLocks noChangeAspect="1" noChangeArrowheads="1"/>
+          </p:cNvPicPr>
+          <p:nvPr/>
+        </p:nvPicPr>
+        <p:blipFill>
+          <a:blip r:embed="rId4">
+            <a:extLst>
+              <a:ext uri="{28A0092B-C50C-407E-A947-70E740481C1C}">
+                <a14:useLocalDpi xmlns:a14="http://schemas.microsoft.com/office/drawing/2010/main" val="0"/>
+              </a:ext>
+            </a:extLst>
+          </a:blip>
+          <a:srcRect/>
+          <a:stretch>
+            <a:fillRect/>
+          </a:stretch>
+        </p:blipFill>
+        <p:spPr bwMode="auto">
+          <a:xfrm>
+            <a:off x="9556045" y="2382569"/>
+            <a:ext cx="675371" cy="654811"/>
+          </a:xfrm>
+          <a:prstGeom prst="rect">
+            <a:avLst/>
+          </a:prstGeom>
+          <a:noFill/>
+          <a:extLst>
+            <a:ext uri="{909E8E84-426E-40DD-AFC4-6F175D3DCCD1}">
+              <a14:hiddenFill xmlns:a14="http://schemas.microsoft.com/office/drawing/2010/main">
+                <a:solidFill>
+                  <a:srgbClr val="FFFFFF"/>
+                </a:solidFill>
+              </a14:hiddenFill>
+            </a:ext>
+          </a:extLst>
+        </p:spPr>
+      </p:pic>
     </p:spTree>
     <p:extLst>
       <p:ext uri="{BB962C8B-B14F-4D97-AF65-F5344CB8AC3E}">
@@ -5395,7 +5396,12 @@
             <p:ph type="title"/>
           </p:nvPr>
         </p:nvSpPr>
-        <p:spPr/>
+        <p:spPr>
+          <a:xfrm>
+            <a:off x="1676400" y="1736726"/>
+            <a:ext cx="10515600" cy="2852737"/>
+          </a:xfrm>
+        </p:spPr>
         <p:txBody>
           <a:bodyPr/>
           <a:lstStyle/>
@@ -5493,6 +5499,512 @@
     <p:extLst>
       <p:ext uri="{BB962C8B-B14F-4D97-AF65-F5344CB8AC3E}">
         <p14:creationId xmlns:p14="http://schemas.microsoft.com/office/powerpoint/2010/main" val="1377654784"/>
+      </p:ext>
+    </p:extLst>
+  </p:cSld>
+  <p:clrMapOvr>
+    <a:masterClrMapping/>
+  </p:clrMapOvr>
+</p:sld>
+</file>
+
+<file path=ppt/slides/slide13.xml><?xml version="1.0" encoding="utf-8"?>
+<p:sld xmlns:a="http://schemas.openxmlformats.org/drawingml/2006/main" xmlns:r="http://schemas.openxmlformats.org/officeDocument/2006/relationships" xmlns:p="http://schemas.openxmlformats.org/presentationml/2006/main">
+  <p:cSld>
+    <p:spTree>
+      <p:nvGrpSpPr>
+        <p:cNvPr id="1" name=""/>
+        <p:cNvGrpSpPr/>
+        <p:nvPr/>
+      </p:nvGrpSpPr>
+      <p:grpSpPr>
+        <a:xfrm>
+          <a:off x="0" y="0"/>
+          <a:ext cx="0" cy="0"/>
+          <a:chOff x="0" y="0"/>
+          <a:chExt cx="0" cy="0"/>
+        </a:xfrm>
+      </p:grpSpPr>
+      <p:pic>
+        <p:nvPicPr>
+          <p:cNvPr id="20" name="Imagem 19">
+            <a:extLst>
+              <a:ext uri="{FF2B5EF4-FFF2-40B4-BE49-F238E27FC236}">
+                <a16:creationId xmlns:a16="http://schemas.microsoft.com/office/drawing/2014/main" id="{C9D0F21B-9081-4AFE-AC57-8495046AF607}"/>
+              </a:ext>
+            </a:extLst>
+          </p:cNvPr>
+          <p:cNvPicPr>
+            <a:picLocks noChangeAspect="1"/>
+          </p:cNvPicPr>
+          <p:nvPr/>
+        </p:nvPicPr>
+        <p:blipFill>
+          <a:blip r:embed="rId2">
+            <a:alphaModFix amt="18000"/>
+          </a:blip>
+          <a:stretch>
+            <a:fillRect/>
+          </a:stretch>
+        </p:blipFill>
+        <p:spPr>
+          <a:xfrm>
+            <a:off x="0" y="1782303"/>
+            <a:ext cx="6096000" cy="3685781"/>
+          </a:xfrm>
+          <a:prstGeom prst="rect">
+            <a:avLst/>
+          </a:prstGeom>
+        </p:spPr>
+      </p:pic>
+      <p:sp>
+        <p:nvSpPr>
+          <p:cNvPr id="2" name="Subtítulo 1">
+            <a:extLst>
+              <a:ext uri="{FF2B5EF4-FFF2-40B4-BE49-F238E27FC236}">
+                <a16:creationId xmlns:a16="http://schemas.microsoft.com/office/drawing/2014/main" id="{7DB1E536-87A9-4FBF-9B44-CC8C81BC3AD4}"/>
+              </a:ext>
+            </a:extLst>
+          </p:cNvPr>
+          <p:cNvSpPr>
+            <a:spLocks noGrp="1"/>
+          </p:cNvSpPr>
+          <p:nvPr>
+            <p:ph type="subTitle" idx="1"/>
+          </p:nvPr>
+        </p:nvSpPr>
+        <p:spPr>
+          <a:xfrm>
+            <a:off x="4604004" y="3458973"/>
+            <a:ext cx="4568131" cy="365125"/>
+          </a:xfrm>
+        </p:spPr>
+        <p:txBody>
+          <a:bodyPr>
+            <a:noAutofit/>
+          </a:bodyPr>
+          <a:lstStyle/>
+          <a:p>
+            <a:pPr algn="r"/>
+            <a:r>
+              <a:rPr lang="pt-BR" sz="3600" dirty="0"/>
+              <a:t>Visão Computacional</a:t>
+            </a:r>
+          </a:p>
+        </p:txBody>
+      </p:sp>
+      <p:sp>
+        <p:nvSpPr>
+          <p:cNvPr id="3" name="Título 2">
+            <a:extLst>
+              <a:ext uri="{FF2B5EF4-FFF2-40B4-BE49-F238E27FC236}">
+                <a16:creationId xmlns:a16="http://schemas.microsoft.com/office/drawing/2014/main" id="{BE4CAA41-D4E0-46BF-8B02-806CA75561B8}"/>
+              </a:ext>
+            </a:extLst>
+          </p:cNvPr>
+          <p:cNvSpPr>
+            <a:spLocks noGrp="1"/>
+          </p:cNvSpPr>
+          <p:nvPr>
+            <p:ph type="ctrTitle"/>
+          </p:nvPr>
+        </p:nvSpPr>
+        <p:spPr>
+          <a:xfrm>
+            <a:off x="2969985" y="2459515"/>
+            <a:ext cx="6145879" cy="969485"/>
+          </a:xfrm>
+        </p:spPr>
+        <p:txBody>
+          <a:bodyPr>
+            <a:normAutofit fontScale="90000"/>
+          </a:bodyPr>
+          <a:lstStyle/>
+          <a:p>
+            <a:pPr algn="r"/>
+            <a:r>
+              <a:rPr lang="pt-BR" sz="6600" dirty="0"/>
+              <a:t>Byakugan </a:t>
+            </a:r>
+          </a:p>
+        </p:txBody>
+      </p:sp>
+      <p:sp>
+        <p:nvSpPr>
+          <p:cNvPr id="6" name="Espaço Reservado para Conteúdo 5">
+            <a:extLst>
+              <a:ext uri="{FF2B5EF4-FFF2-40B4-BE49-F238E27FC236}">
+                <a16:creationId xmlns:a16="http://schemas.microsoft.com/office/drawing/2014/main" id="{564B2B5B-29D9-45D5-9F3E-8FAC361E43BB}"/>
+              </a:ext>
+            </a:extLst>
+          </p:cNvPr>
+          <p:cNvSpPr>
+            <a:spLocks noGrp="1"/>
+          </p:cNvSpPr>
+          <p:nvPr>
+            <p:ph sz="quarter" idx="15"/>
+          </p:nvPr>
+        </p:nvSpPr>
+        <p:spPr>
+          <a:xfrm>
+            <a:off x="4038600" y="6392667"/>
+            <a:ext cx="4114800" cy="365125"/>
+          </a:xfrm>
+        </p:spPr>
+        <p:txBody>
+          <a:bodyPr/>
+          <a:lstStyle/>
+          <a:p>
+            <a:r>
+              <a:rPr lang="pt-BR" dirty="0"/>
+              <a:t>ABRIL/2019</a:t>
+            </a:r>
+          </a:p>
+        </p:txBody>
+      </p:sp>
+      <p:cxnSp>
+        <p:nvCxnSpPr>
+          <p:cNvPr id="16" name="Conector reto 15">
+            <a:extLst>
+              <a:ext uri="{FF2B5EF4-FFF2-40B4-BE49-F238E27FC236}">
+                <a16:creationId xmlns:a16="http://schemas.microsoft.com/office/drawing/2014/main" id="{F0A51D4C-2F1D-4769-9281-3B9C8F2EEE13}"/>
+              </a:ext>
+            </a:extLst>
+          </p:cNvPr>
+          <p:cNvCxnSpPr>
+            <a:cxnSpLocks/>
+          </p:cNvCxnSpPr>
+          <p:nvPr/>
+        </p:nvCxnSpPr>
+        <p:spPr>
+          <a:xfrm>
+            <a:off x="9222014" y="2166425"/>
+            <a:ext cx="0" cy="2138289"/>
+          </a:xfrm>
+          <a:prstGeom prst="line">
+            <a:avLst/>
+          </a:prstGeom>
+          <a:ln w="28575"/>
+        </p:spPr>
+        <p:style>
+          <a:lnRef idx="1">
+            <a:schemeClr val="dk1"/>
+          </a:lnRef>
+          <a:fillRef idx="0">
+            <a:schemeClr val="dk1"/>
+          </a:fillRef>
+          <a:effectRef idx="0">
+            <a:schemeClr val="dk1"/>
+          </a:effectRef>
+          <a:fontRef idx="minor">
+            <a:schemeClr val="tx1"/>
+          </a:fontRef>
+        </p:style>
+      </p:cxnSp>
+      <p:pic>
+        <p:nvPicPr>
+          <p:cNvPr id="25" name="Imagem 24" descr="Uma imagem contendo sentado, branco&#10;&#10;Descrição gerada automaticamente">
+            <a:extLst>
+              <a:ext uri="{FF2B5EF4-FFF2-40B4-BE49-F238E27FC236}">
+                <a16:creationId xmlns:a16="http://schemas.microsoft.com/office/drawing/2014/main" id="{4D217611-C2F7-438B-A56E-C5F2CEDD8090}"/>
+              </a:ext>
+            </a:extLst>
+          </p:cNvPr>
+          <p:cNvPicPr>
+            <a:picLocks noChangeAspect="1"/>
+          </p:cNvPicPr>
+          <p:nvPr/>
+        </p:nvPicPr>
+        <p:blipFill>
+          <a:blip r:embed="rId3">
+            <a:alphaModFix amt="44000"/>
+            <a:extLst>
+              <a:ext uri="{28A0092B-C50C-407E-A947-70E740481C1C}">
+                <a14:useLocalDpi xmlns:a14="http://schemas.microsoft.com/office/drawing/2010/main" val="0"/>
+              </a:ext>
+            </a:extLst>
+          </a:blip>
+          <a:stretch>
+            <a:fillRect/>
+          </a:stretch>
+        </p:blipFill>
+        <p:spPr>
+          <a:xfrm>
+            <a:off x="10163697" y="5068299"/>
+            <a:ext cx="1625242" cy="1506930"/>
+          </a:xfrm>
+          <a:prstGeom prst="rect">
+            <a:avLst/>
+          </a:prstGeom>
+        </p:spPr>
+      </p:pic>
+      <p:sp>
+        <p:nvSpPr>
+          <p:cNvPr id="28" name="Subtítulo 1">
+            <a:extLst>
+              <a:ext uri="{FF2B5EF4-FFF2-40B4-BE49-F238E27FC236}">
+                <a16:creationId xmlns:a16="http://schemas.microsoft.com/office/drawing/2014/main" id="{70796903-4A9B-401B-ABCE-25DE740134BB}"/>
+              </a:ext>
+            </a:extLst>
+          </p:cNvPr>
+          <p:cNvSpPr txBox="1">
+            <a:spLocks/>
+          </p:cNvSpPr>
+          <p:nvPr/>
+        </p:nvSpPr>
+        <p:spPr>
+          <a:xfrm>
+            <a:off x="9457971" y="3246437"/>
+            <a:ext cx="2485499" cy="1285400"/>
+          </a:xfrm>
+          <a:prstGeom prst="rect">
+            <a:avLst/>
+          </a:prstGeom>
+        </p:spPr>
+        <p:txBody>
+          <a:bodyPr vert="horz" lIns="91440" tIns="45720" rIns="91440" bIns="45720" rtlCol="0">
+            <a:normAutofit/>
+          </a:bodyPr>
+          <a:lstStyle>
+            <a:lvl1pPr marL="0" indent="0" algn="ctr" defTabSz="914400" rtl="0" eaLnBrk="1" latinLnBrk="0" hangingPunct="1">
+              <a:lnSpc>
+                <a:spcPct val="90000"/>
+              </a:lnSpc>
+              <a:spcBef>
+                <a:spcPts val="1000"/>
+              </a:spcBef>
+              <a:buFont typeface="Arial" panose="020B0604020202020204" pitchFamily="34" charset="0"/>
+              <a:buNone/>
+              <a:defRPr sz="2800" kern="1200">
+                <a:solidFill>
+                  <a:schemeClr val="tx1"/>
+                </a:solidFill>
+                <a:latin typeface="+mn-lt"/>
+                <a:ea typeface="+mn-ea"/>
+                <a:cs typeface="+mn-cs"/>
+              </a:defRPr>
+            </a:lvl1pPr>
+            <a:lvl2pPr marL="457200" indent="0" algn="ctr" defTabSz="914400" rtl="0" eaLnBrk="1" latinLnBrk="0" hangingPunct="1">
+              <a:lnSpc>
+                <a:spcPct val="90000"/>
+              </a:lnSpc>
+              <a:spcBef>
+                <a:spcPts val="500"/>
+              </a:spcBef>
+              <a:buFont typeface="Arial" panose="020B0604020202020204" pitchFamily="34" charset="0"/>
+              <a:buNone/>
+              <a:defRPr sz="2000" kern="1200">
+                <a:solidFill>
+                  <a:schemeClr val="tx1"/>
+                </a:solidFill>
+                <a:latin typeface="+mn-lt"/>
+                <a:ea typeface="+mn-ea"/>
+                <a:cs typeface="+mn-cs"/>
+              </a:defRPr>
+            </a:lvl2pPr>
+            <a:lvl3pPr marL="914400" indent="0" algn="ctr" defTabSz="914400" rtl="0" eaLnBrk="1" latinLnBrk="0" hangingPunct="1">
+              <a:lnSpc>
+                <a:spcPct val="90000"/>
+              </a:lnSpc>
+              <a:spcBef>
+                <a:spcPts val="500"/>
+              </a:spcBef>
+              <a:buFont typeface="Arial" panose="020B0604020202020204" pitchFamily="34" charset="0"/>
+              <a:buNone/>
+              <a:defRPr sz="1800" kern="1200">
+                <a:solidFill>
+                  <a:schemeClr val="tx1"/>
+                </a:solidFill>
+                <a:latin typeface="+mn-lt"/>
+                <a:ea typeface="+mn-ea"/>
+                <a:cs typeface="+mn-cs"/>
+              </a:defRPr>
+            </a:lvl3pPr>
+            <a:lvl4pPr marL="1371600" indent="0" algn="ctr" defTabSz="914400" rtl="0" eaLnBrk="1" latinLnBrk="0" hangingPunct="1">
+              <a:lnSpc>
+                <a:spcPct val="90000"/>
+              </a:lnSpc>
+              <a:spcBef>
+                <a:spcPts val="500"/>
+              </a:spcBef>
+              <a:buFont typeface="Arial" panose="020B0604020202020204" pitchFamily="34" charset="0"/>
+              <a:buNone/>
+              <a:defRPr sz="1600" kern="1200">
+                <a:solidFill>
+                  <a:schemeClr val="tx1"/>
+                </a:solidFill>
+                <a:latin typeface="+mn-lt"/>
+                <a:ea typeface="+mn-ea"/>
+                <a:cs typeface="+mn-cs"/>
+              </a:defRPr>
+            </a:lvl4pPr>
+            <a:lvl5pPr marL="1828800" indent="0" algn="ctr" defTabSz="914400" rtl="0" eaLnBrk="1" latinLnBrk="0" hangingPunct="1">
+              <a:lnSpc>
+                <a:spcPct val="90000"/>
+              </a:lnSpc>
+              <a:spcBef>
+                <a:spcPts val="500"/>
+              </a:spcBef>
+              <a:buFont typeface="Arial" panose="020B0604020202020204" pitchFamily="34" charset="0"/>
+              <a:buNone/>
+              <a:defRPr sz="1600" kern="1200">
+                <a:solidFill>
+                  <a:schemeClr val="tx1"/>
+                </a:solidFill>
+                <a:latin typeface="+mn-lt"/>
+                <a:ea typeface="+mn-ea"/>
+                <a:cs typeface="+mn-cs"/>
+              </a:defRPr>
+            </a:lvl5pPr>
+            <a:lvl6pPr marL="2286000" indent="0" algn="ctr" defTabSz="914400" rtl="0" eaLnBrk="1" latinLnBrk="0" hangingPunct="1">
+              <a:lnSpc>
+                <a:spcPct val="90000"/>
+              </a:lnSpc>
+              <a:spcBef>
+                <a:spcPts val="500"/>
+              </a:spcBef>
+              <a:buFont typeface="Arial" panose="020B0604020202020204" pitchFamily="34" charset="0"/>
+              <a:buNone/>
+              <a:defRPr sz="1600" kern="1200">
+                <a:solidFill>
+                  <a:schemeClr val="tx1"/>
+                </a:solidFill>
+                <a:latin typeface="+mn-lt"/>
+                <a:ea typeface="+mn-ea"/>
+                <a:cs typeface="+mn-cs"/>
+              </a:defRPr>
+            </a:lvl6pPr>
+            <a:lvl7pPr marL="2743200" indent="0" algn="ctr" defTabSz="914400" rtl="0" eaLnBrk="1" latinLnBrk="0" hangingPunct="1">
+              <a:lnSpc>
+                <a:spcPct val="90000"/>
+              </a:lnSpc>
+              <a:spcBef>
+                <a:spcPts val="500"/>
+              </a:spcBef>
+              <a:buFont typeface="Arial" panose="020B0604020202020204" pitchFamily="34" charset="0"/>
+              <a:buNone/>
+              <a:defRPr sz="1600" kern="1200">
+                <a:solidFill>
+                  <a:schemeClr val="tx1"/>
+                </a:solidFill>
+                <a:latin typeface="+mn-lt"/>
+                <a:ea typeface="+mn-ea"/>
+                <a:cs typeface="+mn-cs"/>
+              </a:defRPr>
+            </a:lvl7pPr>
+            <a:lvl8pPr marL="3200400" indent="0" algn="ctr" defTabSz="914400" rtl="0" eaLnBrk="1" latinLnBrk="0" hangingPunct="1">
+              <a:lnSpc>
+                <a:spcPct val="90000"/>
+              </a:lnSpc>
+              <a:spcBef>
+                <a:spcPts val="500"/>
+              </a:spcBef>
+              <a:buFont typeface="Arial" panose="020B0604020202020204" pitchFamily="34" charset="0"/>
+              <a:buNone/>
+              <a:defRPr sz="1600" kern="1200">
+                <a:solidFill>
+                  <a:schemeClr val="tx1"/>
+                </a:solidFill>
+                <a:latin typeface="+mn-lt"/>
+                <a:ea typeface="+mn-ea"/>
+                <a:cs typeface="+mn-cs"/>
+              </a:defRPr>
+            </a:lvl8pPr>
+            <a:lvl9pPr marL="3657600" indent="0" algn="ctr" defTabSz="914400" rtl="0" eaLnBrk="1" latinLnBrk="0" hangingPunct="1">
+              <a:lnSpc>
+                <a:spcPct val="90000"/>
+              </a:lnSpc>
+              <a:spcBef>
+                <a:spcPts val="500"/>
+              </a:spcBef>
+              <a:buFont typeface="Arial" panose="020B0604020202020204" pitchFamily="34" charset="0"/>
+              <a:buNone/>
+              <a:defRPr sz="1600" kern="1200">
+                <a:solidFill>
+                  <a:schemeClr val="tx1"/>
+                </a:solidFill>
+                <a:latin typeface="+mn-lt"/>
+                <a:ea typeface="+mn-ea"/>
+                <a:cs typeface="+mn-cs"/>
+              </a:defRPr>
+            </a:lvl9pPr>
+          </a:lstStyle>
+          <a:p>
+            <a:pPr algn="l"/>
+            <a:r>
+              <a:rPr lang="ja-JP" altLang="pt-BR" dirty="0"/>
+              <a:t>白眼</a:t>
+            </a:r>
+            <a:r>
+              <a:rPr lang="es-MX" altLang="ja-JP" dirty="0"/>
+              <a:t>,</a:t>
+            </a:r>
+            <a:endParaRPr lang="pt-BR" altLang="ja-JP" dirty="0"/>
+          </a:p>
+          <a:p>
+            <a:pPr algn="l"/>
+            <a:r>
+              <a:rPr lang="pt-BR" altLang="ja-JP" sz="2000" dirty="0"/>
+              <a:t>“O olho que tudo vê”</a:t>
+            </a:r>
+            <a:r>
+              <a:rPr lang="es-MX" altLang="ja-JP" sz="2000" dirty="0"/>
+              <a:t> </a:t>
+            </a:r>
+          </a:p>
+        </p:txBody>
+      </p:sp>
+      <p:pic>
+        <p:nvPicPr>
+          <p:cNvPr id="11" name="Picture 2" descr="Resultado de imagem para BYAKUGAN PNG">
+            <a:extLst>
+              <a:ext uri="{FF2B5EF4-FFF2-40B4-BE49-F238E27FC236}">
+                <a16:creationId xmlns:a16="http://schemas.microsoft.com/office/drawing/2014/main" id="{C470A618-787A-4139-977D-24A69002F2F5}"/>
+              </a:ext>
+            </a:extLst>
+          </p:cNvPr>
+          <p:cNvPicPr>
+            <a:picLocks noChangeAspect="1" noChangeArrowheads="1"/>
+          </p:cNvPicPr>
+          <p:nvPr/>
+        </p:nvPicPr>
+        <p:blipFill>
+          <a:blip r:embed="rId4">
+            <a:extLst>
+              <a:ext uri="{28A0092B-C50C-407E-A947-70E740481C1C}">
+                <a14:useLocalDpi xmlns:a14="http://schemas.microsoft.com/office/drawing/2010/main" val="0"/>
+              </a:ext>
+            </a:extLst>
+          </a:blip>
+          <a:srcRect/>
+          <a:stretch>
+            <a:fillRect/>
+          </a:stretch>
+        </p:blipFill>
+        <p:spPr bwMode="auto">
+          <a:xfrm>
+            <a:off x="9556045" y="2382569"/>
+            <a:ext cx="675371" cy="654811"/>
+          </a:xfrm>
+          <a:prstGeom prst="rect">
+            <a:avLst/>
+          </a:prstGeom>
+          <a:noFill/>
+          <a:extLst>
+            <a:ext uri="{909E8E84-426E-40DD-AFC4-6F175D3DCCD1}">
+              <a14:hiddenFill xmlns:a14="http://schemas.microsoft.com/office/drawing/2010/main">
+                <a:solidFill>
+                  <a:srgbClr val="FFFFFF"/>
+                </a:solidFill>
+              </a14:hiddenFill>
+            </a:ext>
+          </a:extLst>
+        </p:spPr>
+      </p:pic>
+    </p:spTree>
+    <p:extLst>
+      <p:ext uri="{BB962C8B-B14F-4D97-AF65-F5344CB8AC3E}">
+        <p14:creationId xmlns:p14="http://schemas.microsoft.com/office/powerpoint/2010/main" val="3834598145"/>
       </p:ext>
     </p:extLst>
   </p:cSld>
@@ -5681,6 +6193,143 @@
           </a:p>
         </p:txBody>
       </p:sp>
+      <p:pic>
+        <p:nvPicPr>
+          <p:cNvPr id="11" name="Imagem 10">
+            <a:extLst>
+              <a:ext uri="{FF2B5EF4-FFF2-40B4-BE49-F238E27FC236}">
+                <a16:creationId xmlns:a16="http://schemas.microsoft.com/office/drawing/2014/main" id="{956FF7E9-A22B-45EE-877E-6A967CA349A1}"/>
+              </a:ext>
+            </a:extLst>
+          </p:cNvPr>
+          <p:cNvPicPr>
+            <a:picLocks noChangeAspect="1"/>
+          </p:cNvPicPr>
+          <p:nvPr/>
+        </p:nvPicPr>
+        <p:blipFill>
+          <a:blip r:embed="rId2">
+            <a:alphaModFix amt="70000"/>
+            <a:extLst>
+              <a:ext uri="{BEBA8EAE-BF5A-486C-A8C5-ECC9F3942E4B}">
+                <a14:imgProps xmlns:a14="http://schemas.microsoft.com/office/drawing/2010/main">
+                  <a14:imgLayer r:embed="rId3">
+                    <a14:imgEffect>
+                      <a14:backgroundRemoval t="9658" b="97183" l="9976" r="96837">
+                        <a14:foregroundMark x1="52433" y1="84507" x2="52433" y2="84507"/>
+                        <a14:foregroundMark x1="51460" y1="74648" x2="53771" y2="74245"/>
+                        <a14:foregroundMark x1="68248" y1="78873" x2="54988" y2="72636"/>
+                        <a14:foregroundMark x1="54988" y1="72636" x2="64355" y2="81288"/>
+                        <a14:foregroundMark x1="84550" y1="81891" x2="82238" y2="83501"/>
+                        <a14:foregroundMark x1="92092" y1="81891" x2="92214" y2="74044"/>
+                        <a14:foregroundMark x1="95012" y1="70423" x2="96837" y2="84708"/>
+                        <a14:foregroundMark x1="48297" y1="97183" x2="43917" y2="96579"/>
+                        <a14:foregroundMark x1="55961" y1="40241" x2="57056" y2="42857"/>
+                        <a14:foregroundMark x1="32482" y1="75654" x2="31022" y2="82696"/>
+                        <a14:foregroundMark x1="73236" y1="62173" x2="73236" y2="62173"/>
+                        <a14:foregroundMark x1="30049" y1="75453" x2="28345" y2="75050"/>
+                        <a14:foregroundMark x1="30779" y1="85513" x2="29927" y2="78270"/>
+                        <a14:backgroundMark x1="67153" y1="32596" x2="67153" y2="32596"/>
+                        <a14:backgroundMark x1="66180" y1="31388" x2="66180" y2="31388"/>
+                        <a14:backgroundMark x1="69830" y1="27364" x2="65815" y2="36217"/>
+                        <a14:backgroundMark x1="64842" y1="31187" x2="64842" y2="33602"/>
+                        <a14:backgroundMark x1="71776" y1="33400" x2="70316" y2="28773"/>
+                        <a14:backgroundMark x1="71776" y1="29175" x2="66302" y2="51509"/>
+                        <a14:backgroundMark x1="66302" y1="51509" x2="62774" y2="46076"/>
+                        <a14:backgroundMark x1="33698" y1="30584" x2="33333" y2="38632"/>
+                        <a14:backgroundMark x1="34428" y1="34205" x2="31022" y2="41449"/>
+                        <a14:backgroundMark x1="39173" y1="34608" x2="30414" y2="40644"/>
+                        <a14:backgroundMark x1="37956" y1="36821" x2="32968" y2="39839"/>
+                        <a14:backgroundMark x1="31873" y1="40241" x2="36496" y2="41650"/>
+                        <a14:backgroundMark x1="57166" y1="42747" x2="57178" y2="43058"/>
+                        <a14:backgroundMark x1="54015" y1="29175" x2="59976" y2="23541"/>
+                        <a14:backgroundMark x1="52555" y1="32596" x2="42579" y2="20322"/>
+                        <a14:backgroundMark x1="72141" y1="47887" x2="68248" y2="53320"/>
+                        <a14:backgroundMark x1="66910" y1="53521" x2="65937" y2="55533"/>
+                        <a14:backgroundMark x1="73236" y1="57746" x2="73236" y2="57746"/>
+                        <a14:backgroundMark x1="74088" y1="56740" x2="74088" y2="56740"/>
+                        <a14:backgroundMark x1="75182" y1="60161" x2="74574" y2="60161"/>
+                        <a14:backgroundMark x1="29333" y1="81774" x2="29440" y2="88732"/>
+                        <a14:backgroundMark x1="39294" y1="92958" x2="32603" y2="94165"/>
+                        <a14:backgroundMark x1="32603" y1="94165" x2="28467" y2="91348"/>
+                        <a14:backgroundMark x1="72263" y1="96177" x2="65572" y2="92555"/>
+                        <a14:backgroundMark x1="65572" y1="92555" x2="52676" y2="98189"/>
+                        <a14:backgroundMark x1="52676" y1="98189" x2="51217" y2="98189"/>
+                        <a14:backgroundMark x1="85158" y1="68209" x2="81387" y2="67404"/>
+                        <a14:backgroundMark x1="27129" y1="57948" x2="27372" y2="69014"/>
+                        <a14:backgroundMark x1="31144" y1="54326" x2="28467" y2="55332"/>
+                        <a14:backgroundMark x1="34428" y1="44467" x2="34915" y2="45674"/>
+                        <a14:backgroundMark x1="53285" y1="41449" x2="50973" y2="44869"/>
+                        <a14:backgroundMark x1="27129" y1="69215" x2="26764" y2="73441"/>
+                        <a14:backgroundMark x1="26886" y1="74648" x2="28832" y2="78672"/>
+                        <a14:backgroundMark x1="66910" y1="87726" x2="66910" y2="87726"/>
+                        <a14:backgroundMark x1="59854" y1="86318" x2="59854" y2="86318"/>
+                        <a14:backgroundMark x1="70803" y1="62978" x2="70803" y2="62978"/>
+                        <a14:backgroundMark x1="71168" y1="61771" x2="70438" y2="64386"/>
+                      </a14:backgroundRemoval>
+                    </a14:imgEffect>
+                  </a14:imgLayer>
+                </a14:imgProps>
+              </a:ext>
+            </a:extLst>
+          </a:blip>
+          <a:stretch>
+            <a:fillRect/>
+          </a:stretch>
+        </p:blipFill>
+        <p:spPr>
+          <a:xfrm>
+            <a:off x="5713627" y="932591"/>
+            <a:ext cx="7430512" cy="4492657"/>
+          </a:xfrm>
+          <a:prstGeom prst="rect">
+            <a:avLst/>
+          </a:prstGeom>
+          <a:scene3d>
+            <a:camera prst="orthographicFront">
+              <a:rot lat="0" lon="9600000" rev="0"/>
+            </a:camera>
+            <a:lightRig rig="threePt" dir="t"/>
+          </a:scene3d>
+        </p:spPr>
+      </p:pic>
+      <p:pic>
+        <p:nvPicPr>
+          <p:cNvPr id="12" name="Imagem 11" descr="Uma imagem contendo sentado, branco&#10;&#10;Descrição gerada automaticamente">
+            <a:extLst>
+              <a:ext uri="{FF2B5EF4-FFF2-40B4-BE49-F238E27FC236}">
+                <a16:creationId xmlns:a16="http://schemas.microsoft.com/office/drawing/2014/main" id="{8FF1722D-2FAC-4E87-959C-95CAF6E76F85}"/>
+              </a:ext>
+            </a:extLst>
+          </p:cNvPr>
+          <p:cNvPicPr>
+            <a:picLocks noChangeAspect="1"/>
+          </p:cNvPicPr>
+          <p:nvPr/>
+        </p:nvPicPr>
+        <p:blipFill>
+          <a:blip r:embed="rId4">
+            <a:alphaModFix/>
+            <a:extLst>
+              <a:ext uri="{28A0092B-C50C-407E-A947-70E740481C1C}">
+                <a14:useLocalDpi xmlns:a14="http://schemas.microsoft.com/office/drawing/2010/main" val="0"/>
+              </a:ext>
+            </a:extLst>
+          </a:blip>
+          <a:stretch>
+            <a:fillRect/>
+          </a:stretch>
+        </p:blipFill>
+        <p:spPr>
+          <a:xfrm>
+            <a:off x="5929527" y="4418479"/>
+            <a:ext cx="1625242" cy="1506930"/>
+          </a:xfrm>
+          <a:prstGeom prst="rect">
+            <a:avLst/>
+          </a:prstGeom>
+        </p:spPr>
+      </p:pic>
     </p:spTree>
     <p:extLst>
       <p:ext uri="{BB962C8B-B14F-4D97-AF65-F5344CB8AC3E}">
@@ -5897,7 +6546,7 @@
         <p:spPr>
           <a:xfrm>
             <a:off x="1826054" y="5781684"/>
-            <a:ext cx="3598934" cy="584775"/>
+            <a:ext cx="3650230" cy="584775"/>
           </a:xfrm>
           <a:prstGeom prst="rect">
             <a:avLst/>
@@ -5916,7 +6565,7 @@
             </a:r>
             <a:r>
               <a:rPr lang="pt-BR" sz="1600" dirty="0"/>
-              <a:t>Terremoto na Indonésia,  2004</a:t>
+              <a:t>Terremoto na Indonésia,  2004.</a:t>
             </a:r>
           </a:p>
           <a:p>
@@ -6005,7 +6654,7 @@
         <p:spPr>
           <a:xfrm>
             <a:off x="6640727" y="5727546"/>
-            <a:ext cx="3234925" cy="584775"/>
+            <a:ext cx="3246979" cy="584775"/>
           </a:xfrm>
           <a:prstGeom prst="rect">
             <a:avLst/>
@@ -6024,7 +6673,7 @@
             </a:r>
             <a:r>
               <a:rPr lang="pt-BR" sz="1600" dirty="0"/>
-              <a:t>Terremoto na Itália,  2016</a:t>
+              <a:t>Terremoto na Itália,  2016.</a:t>
             </a:r>
           </a:p>
           <a:p>
@@ -6266,8 +6915,8 @@
         </p:blipFill>
         <p:spPr bwMode="auto">
           <a:xfrm>
-            <a:off x="8004477" y="2214751"/>
-            <a:ext cx="3955446" cy="3573086"/>
+            <a:off x="8153400" y="2004164"/>
+            <a:ext cx="3772574" cy="3407892"/>
           </a:xfrm>
           <a:prstGeom prst="rect">
             <a:avLst/>
@@ -6284,6 +6933,51 @@
           </a:extLst>
         </p:spPr>
       </p:pic>
+      <p:sp>
+        <p:nvSpPr>
+          <p:cNvPr id="7" name="CaixaDeTexto 6">
+            <a:extLst>
+              <a:ext uri="{FF2B5EF4-FFF2-40B4-BE49-F238E27FC236}">
+                <a16:creationId xmlns:a16="http://schemas.microsoft.com/office/drawing/2014/main" id="{D7D487D6-EAD7-4CA1-B757-265AEED68E43}"/>
+              </a:ext>
+            </a:extLst>
+          </p:cNvPr>
+          <p:cNvSpPr txBox="1"/>
+          <p:nvPr/>
+        </p:nvSpPr>
+        <p:spPr>
+          <a:xfrm>
+            <a:off x="8157085" y="5590595"/>
+            <a:ext cx="3867901" cy="830997"/>
+          </a:xfrm>
+          <a:prstGeom prst="rect">
+            <a:avLst/>
+          </a:prstGeom>
+          <a:noFill/>
+        </p:spPr>
+        <p:txBody>
+          <a:bodyPr wrap="square" rtlCol="0">
+            <a:spAutoFit/>
+          </a:bodyPr>
+          <a:lstStyle/>
+          <a:p>
+            <a:r>
+              <a:rPr lang="pt-BR" sz="1600" b="1" dirty="0"/>
+              <a:t>Figura 3 – </a:t>
+            </a:r>
+            <a:r>
+              <a:rPr lang="pt-BR" sz="1600" dirty="0"/>
+              <a:t>Logo da Olimpíada Brasileira de Robótica.</a:t>
+            </a:r>
+          </a:p>
+          <a:p>
+            <a:r>
+              <a:rPr lang="pt-BR" sz="1600" i="1" dirty="0"/>
+              <a:t>(Organização OBR)</a:t>
+            </a:r>
+          </a:p>
+        </p:txBody>
+      </p:sp>
     </p:spTree>
     <p:extLst>
       <p:ext uri="{BB962C8B-B14F-4D97-AF65-F5344CB8AC3E}">
@@ -6343,7 +7037,7 @@
           <a:lstStyle/>
           <a:p>
             <a:r>
-              <a:rPr lang="pt-BR" sz="2000" dirty="0">
+              <a:rPr lang="pt-BR" sz="1800" dirty="0">
                 <a:cs typeface="Arial" panose="020B0604020202020204" pitchFamily="34" charset="0"/>
               </a:rPr>
               <a:t>IMPLEMENTAÇÃO DE UM ROBÔ PARA OBR BASEADO EM VISÃO COMPUTACIONAL </a:t>
@@ -6469,7 +7163,7 @@
         </p:blipFill>
         <p:spPr>
           <a:xfrm>
-            <a:off x="1295398" y="3148768"/>
+            <a:off x="1295398" y="2660681"/>
             <a:ext cx="4165959" cy="2907376"/>
           </a:xfrm>
           <a:prstGeom prst="rect">
@@ -6492,7 +7186,7 @@
         <p:spPr>
           <a:xfrm>
             <a:off x="6553200" y="1460352"/>
-            <a:ext cx="4114800" cy="1631216"/>
+            <a:ext cx="4114800" cy="1200329"/>
           </a:xfrm>
           <a:prstGeom prst="rect">
             <a:avLst/>
@@ -6510,7 +7204,7 @@
               <a:buChar char="•"/>
             </a:pPr>
             <a:r>
-              <a:rPr lang="pt-BR" sz="2000" dirty="0"/>
+              <a:rPr lang="pt-BR" dirty="0"/>
               <a:t>SISTEMA DE DETECÇÃO E RESGATE DE VÍTIMA PARA UM ROBÔ AUTÔNOMO SEGUIDOR DE LINHA BASEADO EM VISÃO COMPUTACIONAL </a:t>
             </a:r>
           </a:p>
@@ -6538,7 +7232,7 @@
         </p:blipFill>
         <p:spPr>
           <a:xfrm>
-            <a:off x="6553200" y="3148768"/>
+            <a:off x="6553200" y="2660681"/>
             <a:ext cx="3714750" cy="2907376"/>
           </a:xfrm>
           <a:prstGeom prst="rect">
@@ -6546,6 +7240,96 @@
           </a:prstGeom>
         </p:spPr>
       </p:pic>
+      <p:sp>
+        <p:nvSpPr>
+          <p:cNvPr id="9" name="CaixaDeTexto 8">
+            <a:extLst>
+              <a:ext uri="{FF2B5EF4-FFF2-40B4-BE49-F238E27FC236}">
+                <a16:creationId xmlns:a16="http://schemas.microsoft.com/office/drawing/2014/main" id="{8701AFD5-00A0-4977-9EAB-413985B5CA21}"/>
+              </a:ext>
+            </a:extLst>
+          </p:cNvPr>
+          <p:cNvSpPr txBox="1"/>
+          <p:nvPr/>
+        </p:nvSpPr>
+        <p:spPr>
+          <a:xfrm>
+            <a:off x="1295397" y="5568057"/>
+            <a:ext cx="4165959" cy="830997"/>
+          </a:xfrm>
+          <a:prstGeom prst="rect">
+            <a:avLst/>
+          </a:prstGeom>
+          <a:noFill/>
+        </p:spPr>
+        <p:txBody>
+          <a:bodyPr wrap="square" rtlCol="0">
+            <a:spAutoFit/>
+          </a:bodyPr>
+          <a:lstStyle/>
+          <a:p>
+            <a:r>
+              <a:rPr lang="pt-BR" sz="1600" b="1" dirty="0"/>
+              <a:t>Figura 4 –  </a:t>
+            </a:r>
+            <a:r>
+              <a:rPr lang="pt-BR" sz="1600" dirty="0"/>
+              <a:t>Plataforma robótica utilizada no trabalho.</a:t>
+            </a:r>
+          </a:p>
+          <a:p>
+            <a:r>
+              <a:rPr lang="pt-BR" sz="1600" i="1" dirty="0"/>
+              <a:t>(AMORIM, Junior Aguilar)</a:t>
+            </a:r>
+          </a:p>
+        </p:txBody>
+      </p:sp>
+      <p:sp>
+        <p:nvSpPr>
+          <p:cNvPr id="10" name="CaixaDeTexto 9">
+            <a:extLst>
+              <a:ext uri="{FF2B5EF4-FFF2-40B4-BE49-F238E27FC236}">
+                <a16:creationId xmlns:a16="http://schemas.microsoft.com/office/drawing/2014/main" id="{3C29A8C7-E7A9-4318-8341-5A113082ACAA}"/>
+              </a:ext>
+            </a:extLst>
+          </p:cNvPr>
+          <p:cNvSpPr txBox="1"/>
+          <p:nvPr/>
+        </p:nvSpPr>
+        <p:spPr>
+          <a:xfrm>
+            <a:off x="6617917" y="5568057"/>
+            <a:ext cx="3867901" cy="861774"/>
+          </a:xfrm>
+          <a:prstGeom prst="rect">
+            <a:avLst/>
+          </a:prstGeom>
+          <a:noFill/>
+        </p:spPr>
+        <p:txBody>
+          <a:bodyPr wrap="square" rtlCol="0">
+            <a:spAutoFit/>
+          </a:bodyPr>
+          <a:lstStyle/>
+          <a:p>
+            <a:r>
+              <a:rPr lang="pt-BR" sz="1600" b="1" dirty="0"/>
+              <a:t>Figura 4 – </a:t>
+            </a:r>
+            <a:r>
+              <a:rPr lang="pt-BR" sz="1600" dirty="0"/>
+              <a:t>Logo da Olimpíada Brasileira de Robótica.</a:t>
+            </a:r>
+          </a:p>
+          <a:p>
+            <a:r>
+              <a:rPr lang="pt-BR" sz="1600" i="1" dirty="0"/>
+              <a:t>(?)</a:t>
+            </a:r>
+          </a:p>
+        </p:txBody>
+      </p:sp>
     </p:spTree>
     <p:extLst>
       <p:ext uri="{BB962C8B-B14F-4D97-AF65-F5344CB8AC3E}">

</xml_diff>